<commit_message>
Added molecule visualizer and updated ppt
</commit_message>
<xml_diff>
--- a/SMGAN.pptx
+++ b/SMGAN.pptx
@@ -2,28 +2,30 @@
 <file path=ppt/presentation.xml><?xml version="1.0" encoding="utf-8"?>
 <p:presentation xmlns:a="http://schemas.openxmlformats.org/drawingml/2006/main" xmlns:r="http://schemas.openxmlformats.org/officeDocument/2006/relationships" xmlns:p="http://schemas.openxmlformats.org/presentationml/2006/main" saveSubsetFonts="1">
   <p:sldMasterIdLst>
-    <p:sldMasterId id="2147484152" r:id="rId1"/>
+    <p:sldMasterId id="2147484224" r:id="rId1"/>
   </p:sldMasterIdLst>
   <p:notesMasterIdLst>
-    <p:notesMasterId r:id="rId18"/>
+    <p:notesMasterId r:id="rId20"/>
   </p:notesMasterIdLst>
   <p:sldIdLst>
     <p:sldId id="256" r:id="rId2"/>
     <p:sldId id="259" r:id="rId3"/>
     <p:sldId id="258" r:id="rId4"/>
     <p:sldId id="267" r:id="rId5"/>
-    <p:sldId id="268" r:id="rId6"/>
-    <p:sldId id="257" r:id="rId7"/>
-    <p:sldId id="270" r:id="rId8"/>
-    <p:sldId id="260" r:id="rId9"/>
+    <p:sldId id="257" r:id="rId6"/>
+    <p:sldId id="270" r:id="rId7"/>
+    <p:sldId id="260" r:id="rId8"/>
+    <p:sldId id="261" r:id="rId9"/>
     <p:sldId id="271" r:id="rId10"/>
-    <p:sldId id="261" r:id="rId11"/>
-    <p:sldId id="262" r:id="rId12"/>
-    <p:sldId id="263" r:id="rId13"/>
-    <p:sldId id="264" r:id="rId14"/>
-    <p:sldId id="265" r:id="rId15"/>
-    <p:sldId id="266" r:id="rId16"/>
-    <p:sldId id="269" r:id="rId17"/>
+    <p:sldId id="262" r:id="rId11"/>
+    <p:sldId id="263" r:id="rId12"/>
+    <p:sldId id="264" r:id="rId13"/>
+    <p:sldId id="272" r:id="rId14"/>
+    <p:sldId id="273" r:id="rId15"/>
+    <p:sldId id="265" r:id="rId16"/>
+    <p:sldId id="266" r:id="rId17"/>
+    <p:sldId id="269" r:id="rId18"/>
+    <p:sldId id="268" r:id="rId19"/>
   </p:sldIdLst>
   <p:sldSz cx="12192000" cy="6858000"/>
   <p:notesSz cx="6858000" cy="9144000"/>
@@ -511,9 +513,7 @@
             <a:avLst/>
           </a:prstGeom>
           <a:solidFill>
-            <a:schemeClr val="accent4">
-              <a:lumMod val="75000"/>
-            </a:schemeClr>
+            <a:schemeClr val="accent2"/>
           </a:solidFill>
           <a:ln>
             <a:noFill/>
@@ -551,7 +551,7 @@
             <a:avLst/>
           </a:prstGeom>
           <a:solidFill>
-            <a:schemeClr val="accent4"/>
+            <a:schemeClr val="accent1"/>
           </a:solidFill>
           <a:ln>
             <a:noFill/>
@@ -707,7 +707,7 @@
           <a:p>
             <a:fld id="{4F40F2FB-AF60-4DCA-8F1D-6E4E169D5979}" type="datetimeFigureOut">
               <a:rPr lang="en-US" smtClean="0"/>
-              <a:t>8/26/2024</a:t>
+              <a:t>8/27/2024</a:t>
             </a:fld>
             <a:endParaRPr lang="en-US"/>
           </a:p>
@@ -796,7 +796,7 @@
     </p:spTree>
     <p:extLst>
       <p:ext uri="{BB962C8B-B14F-4D97-AF65-F5344CB8AC3E}">
-        <p14:creationId xmlns:p14="http://schemas.microsoft.com/office/powerpoint/2010/main" val="1125373050"/>
+        <p14:creationId xmlns:p14="http://schemas.microsoft.com/office/powerpoint/2010/main" val="1266526310"/>
       </p:ext>
     </p:extLst>
   </p:cSld>
@@ -915,7 +915,7 @@
           <a:p>
             <a:fld id="{4F40F2FB-AF60-4DCA-8F1D-6E4E169D5979}" type="datetimeFigureOut">
               <a:rPr lang="en-US" smtClean="0"/>
-              <a:t>8/26/2024</a:t>
+              <a:t>8/27/2024</a:t>
             </a:fld>
             <a:endParaRPr lang="en-US"/>
           </a:p>
@@ -966,7 +966,7 @@
     </p:spTree>
     <p:extLst>
       <p:ext uri="{BB962C8B-B14F-4D97-AF65-F5344CB8AC3E}">
-        <p14:creationId xmlns:p14="http://schemas.microsoft.com/office/powerpoint/2010/main" val="2083082964"/>
+        <p14:creationId xmlns:p14="http://schemas.microsoft.com/office/powerpoint/2010/main" val="1904855327"/>
       </p:ext>
     </p:extLst>
   </p:cSld>
@@ -1008,9 +1008,7 @@
             <a:avLst/>
           </a:prstGeom>
           <a:solidFill>
-            <a:schemeClr val="accent4">
-              <a:lumMod val="75000"/>
-            </a:schemeClr>
+            <a:schemeClr val="accent2"/>
           </a:solidFill>
           <a:ln>
             <a:noFill/>
@@ -1048,7 +1046,7 @@
             <a:avLst/>
           </a:prstGeom>
           <a:solidFill>
-            <a:schemeClr val="accent4"/>
+            <a:schemeClr val="accent1"/>
           </a:solidFill>
           <a:ln>
             <a:noFill/>
@@ -1173,7 +1171,7 @@
           <a:p>
             <a:fld id="{4F40F2FB-AF60-4DCA-8F1D-6E4E169D5979}" type="datetimeFigureOut">
               <a:rPr lang="en-US" smtClean="0"/>
-              <a:t>8/26/2024</a:t>
+              <a:t>8/27/2024</a:t>
             </a:fld>
             <a:endParaRPr lang="en-US"/>
           </a:p>
@@ -1224,7 +1222,7 @@
     </p:spTree>
     <p:extLst>
       <p:ext uri="{BB962C8B-B14F-4D97-AF65-F5344CB8AC3E}">
-        <p14:creationId xmlns:p14="http://schemas.microsoft.com/office/powerpoint/2010/main" val="2623751700"/>
+        <p14:creationId xmlns:p14="http://schemas.microsoft.com/office/powerpoint/2010/main" val="412586378"/>
       </p:ext>
     </p:extLst>
   </p:cSld>
@@ -1343,7 +1341,7 @@
           <a:p>
             <a:fld id="{4F40F2FB-AF60-4DCA-8F1D-6E4E169D5979}" type="datetimeFigureOut">
               <a:rPr lang="en-US" smtClean="0"/>
-              <a:t>8/26/2024</a:t>
+              <a:t>8/27/2024</a:t>
             </a:fld>
             <a:endParaRPr lang="en-US"/>
           </a:p>
@@ -1394,7 +1392,7 @@
     </p:spTree>
     <p:extLst>
       <p:ext uri="{BB962C8B-B14F-4D97-AF65-F5344CB8AC3E}">
-        <p14:creationId xmlns:p14="http://schemas.microsoft.com/office/powerpoint/2010/main" val="815193149"/>
+        <p14:creationId xmlns:p14="http://schemas.microsoft.com/office/powerpoint/2010/main" val="4133346929"/>
       </p:ext>
     </p:extLst>
   </p:cSld>
@@ -1407,6 +1405,14 @@
 <file path=ppt/slideLayouts/slideLayout3.xml><?xml version="1.0" encoding="utf-8"?>
 <p:sldLayout xmlns:a="http://schemas.openxmlformats.org/drawingml/2006/main" xmlns:r="http://schemas.openxmlformats.org/officeDocument/2006/relationships" xmlns:p="http://schemas.openxmlformats.org/presentationml/2006/main" showMasterSp="0" type="secHead" preserve="1">
   <p:cSld name="Section Header">
+    <p:bg>
+      <p:bgPr>
+        <a:solidFill>
+          <a:schemeClr val="bg1"/>
+        </a:solidFill>
+        <a:effectLst/>
+      </p:bgPr>
+    </p:bg>
     <p:spTree>
       <p:nvGrpSpPr>
         <p:cNvPr id="1" name=""/>
@@ -1436,9 +1442,7 @@
             <a:avLst/>
           </a:prstGeom>
           <a:solidFill>
-            <a:schemeClr val="accent4">
-              <a:lumMod val="75000"/>
-            </a:schemeClr>
+            <a:schemeClr val="accent2"/>
           </a:solidFill>
           <a:ln>
             <a:noFill/>
@@ -1476,7 +1480,7 @@
             <a:avLst/>
           </a:prstGeom>
           <a:solidFill>
-            <a:schemeClr val="accent4"/>
+            <a:schemeClr val="accent1"/>
           </a:solidFill>
           <a:ln>
             <a:noFill/>
@@ -1680,7 +1684,7 @@
           <a:p>
             <a:fld id="{4F40F2FB-AF60-4DCA-8F1D-6E4E169D5979}" type="datetimeFigureOut">
               <a:rPr lang="en-US" smtClean="0"/>
-              <a:t>8/26/2024</a:t>
+              <a:t>8/27/2024</a:t>
             </a:fld>
             <a:endParaRPr lang="en-US"/>
           </a:p>
@@ -1769,7 +1773,7 @@
     </p:spTree>
     <p:extLst>
       <p:ext uri="{BB962C8B-B14F-4D97-AF65-F5344CB8AC3E}">
-        <p14:creationId xmlns:p14="http://schemas.microsoft.com/office/powerpoint/2010/main" val="524211861"/>
+        <p14:creationId xmlns:p14="http://schemas.microsoft.com/office/powerpoint/2010/main" val="2896763479"/>
       </p:ext>
     </p:extLst>
   </p:cSld>
@@ -1955,7 +1959,7 @@
           <a:p>
             <a:fld id="{4F40F2FB-AF60-4DCA-8F1D-6E4E169D5979}" type="datetimeFigureOut">
               <a:rPr lang="en-US" smtClean="0"/>
-              <a:t>8/26/2024</a:t>
+              <a:t>8/27/2024</a:t>
             </a:fld>
             <a:endParaRPr lang="en-US"/>
           </a:p>
@@ -2006,7 +2010,7 @@
     </p:spTree>
     <p:extLst>
       <p:ext uri="{BB962C8B-B14F-4D97-AF65-F5344CB8AC3E}">
-        <p14:creationId xmlns:p14="http://schemas.microsoft.com/office/powerpoint/2010/main" val="4090873070"/>
+        <p14:creationId xmlns:p14="http://schemas.microsoft.com/office/powerpoint/2010/main" val="3567332185"/>
       </p:ext>
     </p:extLst>
   </p:cSld>
@@ -2334,7 +2338,7 @@
           <a:p>
             <a:fld id="{4F40F2FB-AF60-4DCA-8F1D-6E4E169D5979}" type="datetimeFigureOut">
               <a:rPr lang="en-US" smtClean="0"/>
-              <a:t>8/26/2024</a:t>
+              <a:t>8/27/2024</a:t>
             </a:fld>
             <a:endParaRPr lang="en-US"/>
           </a:p>
@@ -2385,7 +2389,7 @@
     </p:spTree>
     <p:extLst>
       <p:ext uri="{BB962C8B-B14F-4D97-AF65-F5344CB8AC3E}">
-        <p14:creationId xmlns:p14="http://schemas.microsoft.com/office/powerpoint/2010/main" val="2002293892"/>
+        <p14:creationId xmlns:p14="http://schemas.microsoft.com/office/powerpoint/2010/main" val="2536281240"/>
       </p:ext>
     </p:extLst>
   </p:cSld>
@@ -2452,7 +2456,7 @@
           <a:p>
             <a:fld id="{4F40F2FB-AF60-4DCA-8F1D-6E4E169D5979}" type="datetimeFigureOut">
               <a:rPr lang="en-US" smtClean="0"/>
-              <a:t>8/26/2024</a:t>
+              <a:t>8/27/2024</a:t>
             </a:fld>
             <a:endParaRPr lang="en-US"/>
           </a:p>
@@ -2503,7 +2507,7 @@
     </p:spTree>
     <p:extLst>
       <p:ext uri="{BB962C8B-B14F-4D97-AF65-F5344CB8AC3E}">
-        <p14:creationId xmlns:p14="http://schemas.microsoft.com/office/powerpoint/2010/main" val="48185970"/>
+        <p14:creationId xmlns:p14="http://schemas.microsoft.com/office/powerpoint/2010/main" val="3613849294"/>
       </p:ext>
     </p:extLst>
   </p:cSld>
@@ -2545,9 +2549,7 @@
             <a:avLst/>
           </a:prstGeom>
           <a:solidFill>
-            <a:schemeClr val="accent4">
-              <a:lumMod val="75000"/>
-            </a:schemeClr>
+            <a:schemeClr val="accent2"/>
           </a:solidFill>
           <a:ln>
             <a:noFill/>
@@ -2585,7 +2587,7 @@
             <a:avLst/>
           </a:prstGeom>
           <a:solidFill>
-            <a:schemeClr val="accent4"/>
+            <a:schemeClr val="accent1"/>
           </a:solidFill>
           <a:ln>
             <a:noFill/>
@@ -2625,7 +2627,7 @@
           <a:p>
             <a:fld id="{4F40F2FB-AF60-4DCA-8F1D-6E4E169D5979}" type="datetimeFigureOut">
               <a:rPr lang="en-US" smtClean="0"/>
-              <a:t>8/26/2024</a:t>
+              <a:t>8/27/2024</a:t>
             </a:fld>
             <a:endParaRPr lang="en-US"/>
           </a:p>
@@ -2684,7 +2686,7 @@
     </p:spTree>
     <p:extLst>
       <p:ext uri="{BB962C8B-B14F-4D97-AF65-F5344CB8AC3E}">
-        <p14:creationId xmlns:p14="http://schemas.microsoft.com/office/powerpoint/2010/main" val="2711064131"/>
+        <p14:creationId xmlns:p14="http://schemas.microsoft.com/office/powerpoint/2010/main" val="4247976715"/>
       </p:ext>
     </p:extLst>
   </p:cSld>
@@ -2726,9 +2728,7 @@
             <a:avLst/>
           </a:prstGeom>
           <a:solidFill>
-            <a:schemeClr val="accent4">
-              <a:lumMod val="75000"/>
-            </a:schemeClr>
+            <a:schemeClr val="accent2"/>
           </a:solidFill>
           <a:ln>
             <a:noFill/>
@@ -2766,7 +2766,7 @@
             <a:avLst/>
           </a:prstGeom>
           <a:solidFill>
-            <a:schemeClr val="accent4"/>
+            <a:schemeClr val="accent1"/>
           </a:solidFill>
           <a:ln>
             <a:noFill/>
@@ -2981,7 +2981,7 @@
           <a:p>
             <a:fld id="{4F40F2FB-AF60-4DCA-8F1D-6E4E169D5979}" type="datetimeFigureOut">
               <a:rPr lang="en-US" smtClean="0"/>
-              <a:t>8/26/2024</a:t>
+              <a:t>8/27/2024</a:t>
             </a:fld>
             <a:endParaRPr lang="en-US"/>
           </a:p>
@@ -3053,7 +3053,7 @@
     </p:spTree>
     <p:extLst>
       <p:ext uri="{BB962C8B-B14F-4D97-AF65-F5344CB8AC3E}">
-        <p14:creationId xmlns:p14="http://schemas.microsoft.com/office/powerpoint/2010/main" val="1714382963"/>
+        <p14:creationId xmlns:p14="http://schemas.microsoft.com/office/powerpoint/2010/main" val="3620559523"/>
       </p:ext>
     </p:extLst>
   </p:cSld>
@@ -3095,9 +3095,7 @@
             <a:avLst/>
           </a:prstGeom>
           <a:solidFill>
-            <a:schemeClr val="accent4">
-              <a:lumMod val="75000"/>
-            </a:schemeClr>
+            <a:schemeClr val="accent2"/>
           </a:solidFill>
           <a:ln>
             <a:noFill/>
@@ -3135,7 +3133,7 @@
             <a:avLst/>
           </a:prstGeom>
           <a:solidFill>
-            <a:schemeClr val="accent4"/>
+            <a:schemeClr val="accent1"/>
           </a:solidFill>
           <a:ln>
             <a:noFill/>
@@ -3360,7 +3358,7 @@
           <a:p>
             <a:fld id="{4F40F2FB-AF60-4DCA-8F1D-6E4E169D5979}" type="datetimeFigureOut">
               <a:rPr lang="en-US" smtClean="0"/>
-              <a:t>8/26/2024</a:t>
+              <a:t>8/27/2024</a:t>
             </a:fld>
             <a:endParaRPr lang="en-US"/>
           </a:p>
@@ -3411,7 +3409,7 @@
     </p:spTree>
     <p:extLst>
       <p:ext uri="{BB962C8B-B14F-4D97-AF65-F5344CB8AC3E}">
-        <p14:creationId xmlns:p14="http://schemas.microsoft.com/office/powerpoint/2010/main" val="563332783"/>
+        <p14:creationId xmlns:p14="http://schemas.microsoft.com/office/powerpoint/2010/main" val="2663498327"/>
       </p:ext>
     </p:extLst>
   </p:cSld>
@@ -3426,7 +3424,7 @@
   <p:cSld>
     <p:bg>
       <p:bgRef idx="1001">
-        <a:schemeClr val="bg2"/>
+        <a:schemeClr val="bg1"/>
       </p:bgRef>
     </p:bg>
     <p:spTree>
@@ -3458,9 +3456,7 @@
             <a:avLst/>
           </a:prstGeom>
           <a:solidFill>
-            <a:schemeClr val="accent4">
-              <a:lumMod val="75000"/>
-            </a:schemeClr>
+            <a:schemeClr val="accent2"/>
           </a:solidFill>
           <a:ln>
             <a:noFill/>
@@ -3498,7 +3494,7 @@
             <a:avLst/>
           </a:prstGeom>
           <a:solidFill>
-            <a:schemeClr val="accent4"/>
+            <a:schemeClr val="accent1"/>
           </a:solidFill>
           <a:ln>
             <a:noFill/>
@@ -3649,7 +3645,7 @@
           <a:p>
             <a:fld id="{4F40F2FB-AF60-4DCA-8F1D-6E4E169D5979}" type="datetimeFigureOut">
               <a:rPr lang="en-US" smtClean="0"/>
-              <a:t>8/26/2024</a:t>
+              <a:t>8/27/2024</a:t>
             </a:fld>
             <a:endParaRPr lang="en-US"/>
           </a:p>
@@ -3770,23 +3766,23 @@
     </p:spTree>
     <p:extLst>
       <p:ext uri="{BB962C8B-B14F-4D97-AF65-F5344CB8AC3E}">
-        <p14:creationId xmlns:p14="http://schemas.microsoft.com/office/powerpoint/2010/main" val="3724188364"/>
+        <p14:creationId xmlns:p14="http://schemas.microsoft.com/office/powerpoint/2010/main" val="2594018776"/>
       </p:ext>
     </p:extLst>
   </p:cSld>
   <p:clrMap bg1="lt1" tx1="dk1" bg2="lt2" tx2="dk2" accent1="accent1" accent2="accent2" accent3="accent3" accent4="accent4" accent5="accent5" accent6="accent6" hlink="hlink" folHlink="folHlink"/>
   <p:sldLayoutIdLst>
-    <p:sldLayoutId id="2147484153" r:id="rId1"/>
-    <p:sldLayoutId id="2147484154" r:id="rId2"/>
-    <p:sldLayoutId id="2147484155" r:id="rId3"/>
-    <p:sldLayoutId id="2147484156" r:id="rId4"/>
-    <p:sldLayoutId id="2147484157" r:id="rId5"/>
-    <p:sldLayoutId id="2147484158" r:id="rId6"/>
-    <p:sldLayoutId id="2147484159" r:id="rId7"/>
-    <p:sldLayoutId id="2147484160" r:id="rId8"/>
-    <p:sldLayoutId id="2147484161" r:id="rId9"/>
-    <p:sldLayoutId id="2147484162" r:id="rId10"/>
-    <p:sldLayoutId id="2147484163" r:id="rId11"/>
+    <p:sldLayoutId id="2147484225" r:id="rId1"/>
+    <p:sldLayoutId id="2147484226" r:id="rId2"/>
+    <p:sldLayoutId id="2147484227" r:id="rId3"/>
+    <p:sldLayoutId id="2147484228" r:id="rId4"/>
+    <p:sldLayoutId id="2147484229" r:id="rId5"/>
+    <p:sldLayoutId id="2147484230" r:id="rId6"/>
+    <p:sldLayoutId id="2147484231" r:id="rId7"/>
+    <p:sldLayoutId id="2147484232" r:id="rId8"/>
+    <p:sldLayoutId id="2147484233" r:id="rId9"/>
+    <p:sldLayoutId id="2147484234" r:id="rId10"/>
+    <p:sldLayoutId id="2147484235" r:id="rId11"/>
   </p:sldLayoutIdLst>
   <p:txStyles>
     <p:titleStyle>
@@ -4264,7 +4260,7 @@
           <p:cNvPr id="2" name="Title 1">
             <a:extLst>
               <a:ext uri="{FF2B5EF4-FFF2-40B4-BE49-F238E27FC236}">
-                <a16:creationId xmlns:a16="http://schemas.microsoft.com/office/drawing/2014/main" id="{4BD0C1FC-564D-4B9F-B736-975B8D161A8A}"/>
+                <a16:creationId xmlns:a16="http://schemas.microsoft.com/office/drawing/2014/main" id="{B380F0D8-17FE-41AA-A2D0-8D23201214C2}"/>
               </a:ext>
             </a:extLst>
           </p:cNvPr>
@@ -4282,7 +4278,7 @@
           <a:p>
             <a:r>
               <a:rPr lang="en-US" dirty="0"/>
-              <a:t>Data </a:t>
+              <a:t>Preprocessing</a:t>
             </a:r>
           </a:p>
         </p:txBody>
@@ -4292,7 +4288,7 @@
           <p:cNvPr id="3" name="Content Placeholder 2">
             <a:extLst>
               <a:ext uri="{FF2B5EF4-FFF2-40B4-BE49-F238E27FC236}">
-                <a16:creationId xmlns:a16="http://schemas.microsoft.com/office/drawing/2014/main" id="{7112D902-67A8-4FF5-A9CF-D6157C5C49CD}"/>
+                <a16:creationId xmlns:a16="http://schemas.microsoft.com/office/drawing/2014/main" id="{775896F0-C400-4821-A02B-DD28C104E3D1}"/>
               </a:ext>
             </a:extLst>
           </p:cNvPr>
@@ -4305,17 +4301,303 @@
         </p:nvSpPr>
         <p:spPr/>
         <p:txBody>
-          <a:bodyPr/>
+          <a:bodyPr>
+            <a:normAutofit fontScale="92500" lnSpcReduction="10000"/>
+          </a:bodyPr>
           <a:lstStyle/>
           <a:p>
+            <a:r>
+              <a:rPr lang="en-US" dirty="0"/>
+              <a:t>Tokenize using regular expressions</a:t>
+            </a:r>
+          </a:p>
+          <a:p>
+            <a:r>
+              <a:rPr lang="en-US" dirty="0"/>
+              <a:t>Atoms requiring explicit definition, such as:</a:t>
+            </a:r>
+          </a:p>
+          <a:p>
+            <a:r>
+              <a:rPr lang="en-US" dirty="0"/>
+              <a:t>- Atoms with explicit isotopes,</a:t>
+            </a:r>
+          </a:p>
+          <a:p>
+            <a:r>
+              <a:rPr lang="en-US" dirty="0"/>
+              <a:t>- Aromatic Rings,</a:t>
+            </a:r>
+          </a:p>
+          <a:p>
+            <a:r>
+              <a:rPr lang="en-US" dirty="0"/>
+              <a:t>- Organic Elements, etc.</a:t>
+            </a:r>
+          </a:p>
+          <a:p>
+            <a:r>
+              <a:rPr lang="en-US" dirty="0"/>
+              <a:t>For example:</a:t>
+            </a:r>
+          </a:p>
+          <a:p>
+            <a:r>
+              <a:rPr lang="en-US" dirty="0"/>
+              <a:t> - Carbon-13 is [13C].  Explicit representation of carbon-13 isotope. </a:t>
+            </a:r>
+          </a:p>
+          <a:p>
+            <a:r>
+              <a:rPr lang="en-US" dirty="0"/>
+              <a:t>- Cannot be written as 13C, as this is invalid SMILES string, as it does not convey relationships to other molecules.</a:t>
+            </a:r>
+          </a:p>
+          <a:p>
+            <a:r>
+              <a:rPr lang="en-US" dirty="0"/>
+              <a:t>- Therefore backets are retained for semantic reasons </a:t>
+            </a:r>
+          </a:p>
+          <a:p>
+            <a:endParaRPr lang="en-US" dirty="0"/>
+          </a:p>
+          <a:p>
+            <a:endParaRPr lang="en-US" dirty="0"/>
+          </a:p>
+          <a:p>
+            <a:endParaRPr lang="en-US" dirty="0"/>
+          </a:p>
+          <a:p>
+            <a:endParaRPr lang="en-US" dirty="0"/>
+          </a:p>
+        </p:txBody>
+      </p:sp>
+      <p:sp>
+        <p:nvSpPr>
+          <p:cNvPr id="4" name="TextBox 3">
+            <a:extLst>
+              <a:ext uri="{FF2B5EF4-FFF2-40B4-BE49-F238E27FC236}">
+                <a16:creationId xmlns:a16="http://schemas.microsoft.com/office/drawing/2014/main" id="{1102F462-CE39-48EB-B3CA-4ED98DF21CFB}"/>
+              </a:ext>
+            </a:extLst>
+          </p:cNvPr>
+          <p:cNvSpPr txBox="1"/>
+          <p:nvPr/>
+        </p:nvSpPr>
+        <p:spPr>
+          <a:xfrm>
+            <a:off x="4931344" y="2453605"/>
+            <a:ext cx="6224336" cy="1323439"/>
+          </a:xfrm>
+          <a:prstGeom prst="rect">
+            <a:avLst/>
+          </a:prstGeom>
+          <a:noFill/>
+        </p:spPr>
+        <p:txBody>
+          <a:bodyPr wrap="square" rtlCol="0">
+            <a:spAutoFit/>
+          </a:bodyPr>
+          <a:lstStyle/>
+          <a:p>
+            <a:pPr algn="ctr"/>
+            <a:r>
+              <a:rPr lang="en-US" sz="1600" dirty="0"/>
+              <a:t>'C[C@@H]1CC(Nc2cncc(-c3nncn3C)c2)C[C@@H](C)C1’          </a:t>
+            </a:r>
+          </a:p>
+          <a:p>
+            <a:pPr algn="ctr"/>
+            <a:endParaRPr lang="en-US" sz="1600" dirty="0"/>
+          </a:p>
+          <a:p>
+            <a:pPr algn="ctr"/>
+            <a:endParaRPr lang="en-US" sz="1600" dirty="0"/>
+          </a:p>
+          <a:p>
+            <a:pPr algn="ctr"/>
+            <a:endParaRPr lang="en-US" sz="1600" dirty="0"/>
+          </a:p>
+          <a:p>
+            <a:pPr algn="ctr"/>
+            <a:r>
+              <a:rPr lang="en-US" sz="1600" dirty="0"/>
+              <a:t>'C', '[C@@H]', '1CC(Nc2cncc(-c3nncn3C)c2)C', '[C@@H]', '(C)C1'</a:t>
+            </a:r>
+          </a:p>
+        </p:txBody>
+      </p:sp>
+      <p:sp>
+        <p:nvSpPr>
+          <p:cNvPr id="8" name="Arrow: Right 7">
+            <a:extLst>
+              <a:ext uri="{FF2B5EF4-FFF2-40B4-BE49-F238E27FC236}">
+                <a16:creationId xmlns:a16="http://schemas.microsoft.com/office/drawing/2014/main" id="{223B0DE0-55BB-4FAA-8FA8-9D1EBFBD0B79}"/>
+              </a:ext>
+            </a:extLst>
+          </p:cNvPr>
+          <p:cNvSpPr/>
+          <p:nvPr/>
+        </p:nvSpPr>
+        <p:spPr>
+          <a:xfrm rot="5400000">
+            <a:off x="7723811" y="2852635"/>
+            <a:ext cx="373902" cy="525378"/>
+          </a:xfrm>
+          <a:prstGeom prst="rightArrow">
+            <a:avLst/>
+          </a:prstGeom>
+        </p:spPr>
+        <p:style>
+          <a:lnRef idx="2">
+            <a:schemeClr val="accent1">
+              <a:shade val="50000"/>
+            </a:schemeClr>
+          </a:lnRef>
+          <a:fillRef idx="1">
+            <a:schemeClr val="accent1"/>
+          </a:fillRef>
+          <a:effectRef idx="0">
+            <a:schemeClr val="accent1"/>
+          </a:effectRef>
+          <a:fontRef idx="minor">
+            <a:schemeClr val="lt1"/>
+          </a:fontRef>
+        </p:style>
+        <p:txBody>
+          <a:bodyPr rtlCol="0" anchor="ctr"/>
+          <a:lstStyle/>
+          <a:p>
+            <a:pPr algn="ctr"/>
             <a:endParaRPr lang="en-US"/>
+          </a:p>
+        </p:txBody>
+      </p:sp>
+      <p:cxnSp>
+        <p:nvCxnSpPr>
+          <p:cNvPr id="10" name="Straight Arrow Connector 9">
+            <a:extLst>
+              <a:ext uri="{FF2B5EF4-FFF2-40B4-BE49-F238E27FC236}">
+                <a16:creationId xmlns:a16="http://schemas.microsoft.com/office/drawing/2014/main" id="{11458970-F1BD-45CC-A726-BD1151953AB9}"/>
+              </a:ext>
+            </a:extLst>
+          </p:cNvPr>
+          <p:cNvCxnSpPr>
+            <a:cxnSpLocks/>
+            <a:stCxn id="18" idx="1"/>
+          </p:cNvCxnSpPr>
+          <p:nvPr/>
+        </p:nvCxnSpPr>
+        <p:spPr>
+          <a:xfrm flipH="1">
+            <a:off x="6354277" y="2022647"/>
+            <a:ext cx="770422" cy="479084"/>
+          </a:xfrm>
+          <a:prstGeom prst="straightConnector1">
+            <a:avLst/>
+          </a:prstGeom>
+          <a:ln>
+            <a:tailEnd type="triangle"/>
+          </a:ln>
+        </p:spPr>
+        <p:style>
+          <a:lnRef idx="1">
+            <a:schemeClr val="accent1"/>
+          </a:lnRef>
+          <a:fillRef idx="0">
+            <a:schemeClr val="accent1"/>
+          </a:fillRef>
+          <a:effectRef idx="0">
+            <a:schemeClr val="accent1"/>
+          </a:effectRef>
+          <a:fontRef idx="minor">
+            <a:schemeClr val="tx1"/>
+          </a:fontRef>
+        </p:style>
+      </p:cxnSp>
+      <p:cxnSp>
+        <p:nvCxnSpPr>
+          <p:cNvPr id="11" name="Straight Arrow Connector 10">
+            <a:extLst>
+              <a:ext uri="{FF2B5EF4-FFF2-40B4-BE49-F238E27FC236}">
+                <a16:creationId xmlns:a16="http://schemas.microsoft.com/office/drawing/2014/main" id="{29A33E52-42CC-4F8E-9E6F-9AAEF8DD7951}"/>
+              </a:ext>
+            </a:extLst>
+          </p:cNvPr>
+          <p:cNvCxnSpPr>
+            <a:cxnSpLocks/>
+            <a:stCxn id="18" idx="3"/>
+          </p:cNvCxnSpPr>
+          <p:nvPr/>
+        </p:nvCxnSpPr>
+        <p:spPr>
+          <a:xfrm>
+            <a:off x="8696824" y="2022647"/>
+            <a:ext cx="663744" cy="495964"/>
+          </a:xfrm>
+          <a:prstGeom prst="straightConnector1">
+            <a:avLst/>
+          </a:prstGeom>
+          <a:ln>
+            <a:tailEnd type="triangle"/>
+          </a:ln>
+        </p:spPr>
+        <p:style>
+          <a:lnRef idx="1">
+            <a:schemeClr val="accent1"/>
+          </a:lnRef>
+          <a:fillRef idx="0">
+            <a:schemeClr val="accent1"/>
+          </a:fillRef>
+          <a:effectRef idx="0">
+            <a:schemeClr val="accent1"/>
+          </a:effectRef>
+          <a:fontRef idx="minor">
+            <a:schemeClr val="tx1"/>
+          </a:fontRef>
+        </p:style>
+      </p:cxnSp>
+      <p:sp>
+        <p:nvSpPr>
+          <p:cNvPr id="18" name="TextBox 17">
+            <a:extLst>
+              <a:ext uri="{FF2B5EF4-FFF2-40B4-BE49-F238E27FC236}">
+                <a16:creationId xmlns:a16="http://schemas.microsoft.com/office/drawing/2014/main" id="{59AAA891-3485-40E2-80D6-87B949D2E439}"/>
+              </a:ext>
+            </a:extLst>
+          </p:cNvPr>
+          <p:cNvSpPr txBox="1"/>
+          <p:nvPr/>
+        </p:nvSpPr>
+        <p:spPr>
+          <a:xfrm>
+            <a:off x="7124699" y="1853370"/>
+            <a:ext cx="1572125" cy="338554"/>
+          </a:xfrm>
+          <a:prstGeom prst="rect">
+            <a:avLst/>
+          </a:prstGeom>
+          <a:noFill/>
+        </p:spPr>
+        <p:txBody>
+          <a:bodyPr wrap="square" rtlCol="0">
+            <a:spAutoFit/>
+          </a:bodyPr>
+          <a:lstStyle/>
+          <a:p>
+            <a:pPr algn="ctr"/>
+            <a:r>
+              <a:rPr lang="en-US" sz="1600" dirty="0"/>
+              <a:t>Chiral Centers</a:t>
+            </a:r>
           </a:p>
         </p:txBody>
       </p:sp>
     </p:spTree>
     <p:extLst>
       <p:ext uri="{BB962C8B-B14F-4D97-AF65-F5344CB8AC3E}">
-        <p14:creationId xmlns:p14="http://schemas.microsoft.com/office/powerpoint/2010/main" val="1000119936"/>
+        <p14:creationId xmlns:p14="http://schemas.microsoft.com/office/powerpoint/2010/main" val="398207521"/>
       </p:ext>
     </p:extLst>
   </p:cSld>
@@ -4347,7 +4629,7 @@
           <p:cNvPr id="2" name="Title 1">
             <a:extLst>
               <a:ext uri="{FF2B5EF4-FFF2-40B4-BE49-F238E27FC236}">
-                <a16:creationId xmlns:a16="http://schemas.microsoft.com/office/drawing/2014/main" id="{B380F0D8-17FE-41AA-A2D0-8D23201214C2}"/>
+                <a16:creationId xmlns:a16="http://schemas.microsoft.com/office/drawing/2014/main" id="{E8D4DCEB-D47E-4980-9B4C-71B4AB118229}"/>
               </a:ext>
             </a:extLst>
           </p:cNvPr>
@@ -4365,40 +4647,147 @@
           <a:p>
             <a:r>
               <a:rPr lang="en-US" dirty="0"/>
-              <a:t>Preprocessing</a:t>
-            </a:r>
-          </a:p>
-        </p:txBody>
-      </p:sp>
-      <p:sp>
-        <p:nvSpPr>
-          <p:cNvPr id="3" name="Content Placeholder 2">
+              <a:t>SMGAN Architecture</a:t>
+            </a:r>
+          </a:p>
+        </p:txBody>
+      </p:sp>
+      <p:pic>
+        <p:nvPicPr>
+          <p:cNvPr id="4" name="Picture 3" descr="A diagram of a generator&#10;&#10;Description automatically generated with medium confidence">
             <a:extLst>
               <a:ext uri="{FF2B5EF4-FFF2-40B4-BE49-F238E27FC236}">
-                <a16:creationId xmlns:a16="http://schemas.microsoft.com/office/drawing/2014/main" id="{775896F0-C400-4821-A02B-DD28C104E3D1}"/>
+                <a16:creationId xmlns:a16="http://schemas.microsoft.com/office/drawing/2014/main" id="{D34A128A-D653-4C9E-8CA3-613736111282}"/>
               </a:ext>
             </a:extLst>
           </p:cNvPr>
-          <p:cNvSpPr>
-            <a:spLocks noGrp="1"/>
-          </p:cNvSpPr>
-          <p:nvPr>
-            <p:ph idx="1"/>
-          </p:nvPr>
-        </p:nvSpPr>
-        <p:spPr/>
-        <p:txBody>
-          <a:bodyPr/>
+          <p:cNvPicPr/>
+          <p:nvPr/>
+        </p:nvPicPr>
+        <p:blipFill>
+          <a:blip r:embed="rId2" cstate="print">
+            <a:extLst>
+              <a:ext uri="{28A0092B-C50C-407E-A947-70E740481C1C}">
+                <a14:useLocalDpi xmlns:a14="http://schemas.microsoft.com/office/drawing/2010/main" val="0"/>
+              </a:ext>
+            </a:extLst>
+          </a:blip>
+          <a:stretch>
+            <a:fillRect/>
+          </a:stretch>
+        </p:blipFill>
+        <p:spPr>
+          <a:xfrm>
+            <a:off x="1668370" y="2650790"/>
+            <a:ext cx="4235420" cy="2610475"/>
+          </a:xfrm>
+          <a:prstGeom prst="rect">
+            <a:avLst/>
+          </a:prstGeom>
+        </p:spPr>
+      </p:pic>
+      <p:pic>
+        <p:nvPicPr>
+          <p:cNvPr id="5" name="Picture 4" descr="A diagram of a graph&#10;&#10;Description automatically generated">
+            <a:extLst>
+              <a:ext uri="{FF2B5EF4-FFF2-40B4-BE49-F238E27FC236}">
+                <a16:creationId xmlns:a16="http://schemas.microsoft.com/office/drawing/2014/main" id="{99E94756-4952-4670-A2D3-DAF9C1DE6A30}"/>
+              </a:ext>
+            </a:extLst>
+          </p:cNvPr>
+          <p:cNvPicPr/>
+          <p:nvPr/>
+        </p:nvPicPr>
+        <p:blipFill>
+          <a:blip r:embed="rId3"/>
+          <a:stretch>
+            <a:fillRect/>
+          </a:stretch>
+        </p:blipFill>
+        <p:spPr>
+          <a:xfrm>
+            <a:off x="6678327" y="2574758"/>
+            <a:ext cx="4206241" cy="2762541"/>
+          </a:xfrm>
+          <a:prstGeom prst="rect">
+            <a:avLst/>
+          </a:prstGeom>
+        </p:spPr>
+      </p:pic>
+      <p:sp>
+        <p:nvSpPr>
+          <p:cNvPr id="6" name="TextBox 5">
+            <a:extLst>
+              <a:ext uri="{FF2B5EF4-FFF2-40B4-BE49-F238E27FC236}">
+                <a16:creationId xmlns:a16="http://schemas.microsoft.com/office/drawing/2014/main" id="{116DAC38-BDC2-40EE-A20C-77AEA3561BA8}"/>
+              </a:ext>
+            </a:extLst>
+          </p:cNvPr>
+          <p:cNvSpPr txBox="1"/>
+          <p:nvPr/>
+        </p:nvSpPr>
+        <p:spPr>
+          <a:xfrm>
+            <a:off x="2326105" y="2172495"/>
+            <a:ext cx="3416968" cy="369332"/>
+          </a:xfrm>
+          <a:prstGeom prst="rect">
+            <a:avLst/>
+          </a:prstGeom>
+          <a:noFill/>
+        </p:spPr>
+        <p:txBody>
+          <a:bodyPr wrap="square" rtlCol="0">
+            <a:spAutoFit/>
+          </a:bodyPr>
           <a:lstStyle/>
           <a:p>
-            <a:endParaRPr lang="en-US"/>
+            <a:r>
+              <a:rPr lang="en-US" dirty="0"/>
+              <a:t>Traditional GAN (Alqahtani, 2019)</a:t>
+            </a:r>
+          </a:p>
+        </p:txBody>
+      </p:sp>
+      <p:sp>
+        <p:nvSpPr>
+          <p:cNvPr id="7" name="TextBox 6">
+            <a:extLst>
+              <a:ext uri="{FF2B5EF4-FFF2-40B4-BE49-F238E27FC236}">
+                <a16:creationId xmlns:a16="http://schemas.microsoft.com/office/drawing/2014/main" id="{34C82F5B-140A-4637-AE01-D4895191BF88}"/>
+              </a:ext>
+            </a:extLst>
+          </p:cNvPr>
+          <p:cNvSpPr txBox="1"/>
+          <p:nvPr/>
+        </p:nvSpPr>
+        <p:spPr>
+          <a:xfrm>
+            <a:off x="7315200" y="2172495"/>
+            <a:ext cx="3094522" cy="369332"/>
+          </a:xfrm>
+          <a:prstGeom prst="rect">
+            <a:avLst/>
+          </a:prstGeom>
+          <a:noFill/>
+        </p:spPr>
+        <p:txBody>
+          <a:bodyPr wrap="square" rtlCol="0">
+            <a:spAutoFit/>
+          </a:bodyPr>
+          <a:lstStyle/>
+          <a:p>
+            <a:r>
+              <a:rPr lang="en-US" dirty="0"/>
+              <a:t>MolGAN (Nicola De Cao, 2018)</a:t>
+            </a:r>
           </a:p>
         </p:txBody>
       </p:sp>
     </p:spTree>
     <p:extLst>
       <p:ext uri="{BB962C8B-B14F-4D97-AF65-F5344CB8AC3E}">
-        <p14:creationId xmlns:p14="http://schemas.microsoft.com/office/powerpoint/2010/main" val="398207521"/>
+        <p14:creationId xmlns:p14="http://schemas.microsoft.com/office/powerpoint/2010/main" val="4111016300"/>
       </p:ext>
     </p:extLst>
   </p:cSld>
@@ -4430,7 +4819,7 @@
           <p:cNvPr id="2" name="Title 1">
             <a:extLst>
               <a:ext uri="{FF2B5EF4-FFF2-40B4-BE49-F238E27FC236}">
-                <a16:creationId xmlns:a16="http://schemas.microsoft.com/office/drawing/2014/main" id="{E8D4DCEB-D47E-4980-9B4C-71B4AB118229}"/>
+                <a16:creationId xmlns:a16="http://schemas.microsoft.com/office/drawing/2014/main" id="{9B42C6A5-1B7E-409B-819F-D59609ED2BEE}"/>
               </a:ext>
             </a:extLst>
           </p:cNvPr>
@@ -4448,7 +4837,7 @@
           <a:p>
             <a:r>
               <a:rPr lang="en-US" dirty="0"/>
-              <a:t>Architecture</a:t>
+              <a:t>Training (Pseudo Code)</a:t>
             </a:r>
           </a:p>
         </p:txBody>
@@ -4458,7 +4847,7 @@
           <p:cNvPr id="3" name="Content Placeholder 2">
             <a:extLst>
               <a:ext uri="{FF2B5EF4-FFF2-40B4-BE49-F238E27FC236}">
-                <a16:creationId xmlns:a16="http://schemas.microsoft.com/office/drawing/2014/main" id="{B4F84470-E4F8-4AFE-8E74-3AFC1684AAED}"/>
+                <a16:creationId xmlns:a16="http://schemas.microsoft.com/office/drawing/2014/main" id="{BA3B3647-060C-4BE6-8682-FF7174D29E7D}"/>
               </a:ext>
             </a:extLst>
           </p:cNvPr>
@@ -4469,11 +4858,707 @@
             <p:ph idx="1"/>
           </p:nvPr>
         </p:nvSpPr>
-        <p:spPr/>
-        <p:txBody>
-          <a:bodyPr/>
+        <p:spPr>
+          <a:xfrm>
+            <a:off x="1097280" y="1845734"/>
+            <a:ext cx="5111015" cy="4023360"/>
+          </a:xfrm>
+        </p:spPr>
+        <p:txBody>
+          <a:bodyPr>
+            <a:normAutofit fontScale="92500" lnSpcReduction="20000"/>
+          </a:bodyPr>
           <a:lstStyle/>
           <a:p>
+            <a:pPr marL="457200" indent="-457200">
+              <a:buFont typeface="+mj-lt"/>
+              <a:buAutoNum type="arabicPeriod"/>
+            </a:pPr>
+            <a:r>
+              <a:rPr lang="en-US" dirty="0"/>
+              <a:t> Initialize discriminator network</a:t>
+            </a:r>
+          </a:p>
+          <a:p>
+            <a:pPr marL="749808" lvl="1" indent="-457200">
+              <a:buFont typeface="+mj-lt"/>
+              <a:buAutoNum type="arabicPeriod"/>
+            </a:pPr>
+            <a:r>
+              <a:rPr lang="en-US" dirty="0"/>
+              <a:t>Iterate over epochs</a:t>
+            </a:r>
+          </a:p>
+          <a:p>
+            <a:pPr marL="932688" lvl="2" indent="-457200">
+              <a:buFont typeface="+mj-lt"/>
+              <a:buAutoNum type="arabicPeriod"/>
+            </a:pPr>
+            <a:r>
+              <a:rPr lang="en-US" dirty="0"/>
+              <a:t>Iterate over batches of data</a:t>
+            </a:r>
+          </a:p>
+          <a:p>
+            <a:pPr marL="1115568" lvl="3" indent="-457200">
+              <a:buFont typeface="+mj-lt"/>
+              <a:buAutoNum type="arabicPeriod"/>
+            </a:pPr>
+            <a:r>
+              <a:rPr lang="en-US" dirty="0"/>
+              <a:t>For each Discriminator update, do</a:t>
+            </a:r>
+          </a:p>
+          <a:p>
+            <a:pPr marL="1298448" lvl="4" indent="-457200">
+              <a:buFont typeface="+mj-lt"/>
+              <a:buAutoNum type="arabicPeriod"/>
+            </a:pPr>
+            <a:r>
+              <a:rPr lang="en-US" dirty="0"/>
+              <a:t>Zero grad</a:t>
+            </a:r>
+          </a:p>
+          <a:p>
+            <a:pPr marL="1298448" lvl="4" indent="-457200">
+              <a:buFont typeface="+mj-lt"/>
+              <a:buAutoNum type="arabicPeriod"/>
+            </a:pPr>
+            <a:r>
+              <a:rPr lang="en-US" dirty="0"/>
+              <a:t>Get real sample</a:t>
+            </a:r>
+          </a:p>
+          <a:p>
+            <a:pPr marL="1298448" lvl="4" indent="-457200">
+              <a:buFont typeface="+mj-lt"/>
+              <a:buAutoNum type="arabicPeriod"/>
+            </a:pPr>
+            <a:r>
+              <a:rPr lang="en-US" dirty="0"/>
+              <a:t>Generate noise sample</a:t>
+            </a:r>
+          </a:p>
+          <a:p>
+            <a:pPr marL="1298448" lvl="4" indent="-457200">
+              <a:buFont typeface="+mj-lt"/>
+              <a:buAutoNum type="arabicPeriod"/>
+            </a:pPr>
+            <a:r>
+              <a:rPr lang="en-US" dirty="0"/>
+              <a:t>Generate fake sample (generator)</a:t>
+            </a:r>
+          </a:p>
+          <a:p>
+            <a:pPr marL="1298448" lvl="4" indent="-457200">
+              <a:buFont typeface="+mj-lt"/>
+              <a:buAutoNum type="arabicPeriod"/>
+            </a:pPr>
+            <a:r>
+              <a:rPr lang="en-US" dirty="0"/>
+              <a:t>Forward pass fake samples to discriminator</a:t>
+            </a:r>
+          </a:p>
+          <a:p>
+            <a:pPr marL="1298448" lvl="4" indent="-457200">
+              <a:buFont typeface="+mj-lt"/>
+              <a:buAutoNum type="arabicPeriod"/>
+            </a:pPr>
+            <a:r>
+              <a:rPr lang="en-US" dirty="0"/>
+              <a:t>Compute discriminator fake sample loss using BCEL</a:t>
+            </a:r>
+          </a:p>
+          <a:p>
+            <a:pPr marL="1298448" lvl="4" indent="-457200">
+              <a:buFont typeface="+mj-lt"/>
+              <a:buAutoNum type="arabicPeriod"/>
+            </a:pPr>
+            <a:r>
+              <a:rPr lang="en-US" dirty="0"/>
+              <a:t>Forward pass real samples to discriminator</a:t>
+            </a:r>
+          </a:p>
+          <a:p>
+            <a:pPr marL="1298448" lvl="4" indent="-457200">
+              <a:buFont typeface="+mj-lt"/>
+              <a:buAutoNum type="arabicPeriod"/>
+            </a:pPr>
+            <a:r>
+              <a:rPr lang="en-US" dirty="0"/>
+              <a:t>Compute discriminator real sample loss</a:t>
+            </a:r>
+          </a:p>
+          <a:p>
+            <a:pPr marL="1298448" lvl="4" indent="-457200">
+              <a:buFont typeface="+mj-lt"/>
+              <a:buAutoNum type="arabicPeriod"/>
+            </a:pPr>
+            <a:r>
+              <a:rPr lang="en-US" dirty="0"/>
+              <a:t>Sum losses for discriminator loss</a:t>
+            </a:r>
+          </a:p>
+          <a:p>
+            <a:pPr marL="1298448" lvl="4" indent="-457200">
+              <a:buFont typeface="+mj-lt"/>
+              <a:buAutoNum type="arabicPeriod"/>
+            </a:pPr>
+            <a:r>
+              <a:rPr lang="en-US" dirty="0"/>
+              <a:t>Backward pass</a:t>
+            </a:r>
+          </a:p>
+          <a:p>
+            <a:pPr marL="1298448" lvl="4" indent="-457200">
+              <a:buFont typeface="+mj-lt"/>
+              <a:buAutoNum type="arabicPeriod"/>
+            </a:pPr>
+            <a:r>
+              <a:rPr lang="en-US" dirty="0"/>
+              <a:t>Discriminator optimizer step</a:t>
+            </a:r>
+          </a:p>
+          <a:p>
+            <a:pPr marL="1298448" lvl="4" indent="-457200">
+              <a:buFont typeface="+mj-lt"/>
+              <a:buAutoNum type="arabicPeriod"/>
+            </a:pPr>
+            <a:r>
+              <a:rPr lang="en-US" dirty="0"/>
+              <a:t>Clip weights </a:t>
+            </a:r>
+          </a:p>
+          <a:p>
+            <a:pPr marL="1298448" lvl="4" indent="-457200">
+              <a:buFont typeface="+mj-lt"/>
+              <a:buAutoNum type="arabicPeriod"/>
+            </a:pPr>
+            <a:r>
+              <a:rPr lang="en-US" dirty="0"/>
+              <a:t>Discriminator scheduler step</a:t>
+            </a:r>
+          </a:p>
+          <a:p>
+            <a:pPr marL="749808" lvl="1" indent="-457200">
+              <a:buFont typeface="+mj-lt"/>
+              <a:buAutoNum type="arabicPeriod"/>
+            </a:pPr>
+            <a:endParaRPr lang="en-US" dirty="0"/>
+          </a:p>
+          <a:p>
+            <a:endParaRPr lang="en-US" dirty="0"/>
+          </a:p>
+        </p:txBody>
+      </p:sp>
+      <p:sp>
+        <p:nvSpPr>
+          <p:cNvPr id="4" name="Content Placeholder 2">
+            <a:extLst>
+              <a:ext uri="{FF2B5EF4-FFF2-40B4-BE49-F238E27FC236}">
+                <a16:creationId xmlns:a16="http://schemas.microsoft.com/office/drawing/2014/main" id="{B4C7A605-8DDA-4056-8035-CDACFC2238AF}"/>
+              </a:ext>
+            </a:extLst>
+          </p:cNvPr>
+          <p:cNvSpPr txBox="1">
+            <a:spLocks/>
+          </p:cNvSpPr>
+          <p:nvPr/>
+        </p:nvSpPr>
+        <p:spPr>
+          <a:xfrm>
+            <a:off x="6270859" y="1877818"/>
+            <a:ext cx="5111015" cy="4023360"/>
+          </a:xfrm>
+          <a:prstGeom prst="rect">
+            <a:avLst/>
+          </a:prstGeom>
+        </p:spPr>
+        <p:txBody>
+          <a:bodyPr vert="horz" lIns="0" tIns="45720" rIns="0" bIns="45720" rtlCol="0">
+            <a:normAutofit fontScale="92500" lnSpcReduction="10000"/>
+          </a:bodyPr>
+          <a:lstStyle>
+            <a:lvl1pPr marL="91440" indent="-91440" algn="l" defTabSz="914400" rtl="0" eaLnBrk="1" latinLnBrk="0" hangingPunct="1">
+              <a:lnSpc>
+                <a:spcPct val="90000"/>
+              </a:lnSpc>
+              <a:spcBef>
+                <a:spcPts val="1200"/>
+              </a:spcBef>
+              <a:spcAft>
+                <a:spcPts val="200"/>
+              </a:spcAft>
+              <a:buClr>
+                <a:schemeClr val="accent1"/>
+              </a:buClr>
+              <a:buSzPct val="100000"/>
+              <a:buFont typeface="Calibri" panose="020F0502020204030204" pitchFamily="34" charset="0"/>
+              <a:buChar char=" "/>
+              <a:defRPr sz="2000" kern="1200">
+                <a:solidFill>
+                  <a:schemeClr val="tx1">
+                    <a:lumMod val="75000"/>
+                    <a:lumOff val="25000"/>
+                  </a:schemeClr>
+                </a:solidFill>
+                <a:latin typeface="+mn-lt"/>
+                <a:ea typeface="+mn-ea"/>
+                <a:cs typeface="+mn-cs"/>
+              </a:defRPr>
+            </a:lvl1pPr>
+            <a:lvl2pPr marL="384048" indent="-182880" algn="l" defTabSz="914400" rtl="0" eaLnBrk="1" latinLnBrk="0" hangingPunct="1">
+              <a:lnSpc>
+                <a:spcPct val="90000"/>
+              </a:lnSpc>
+              <a:spcBef>
+                <a:spcPts val="200"/>
+              </a:spcBef>
+              <a:spcAft>
+                <a:spcPts val="400"/>
+              </a:spcAft>
+              <a:buClr>
+                <a:schemeClr val="accent1"/>
+              </a:buClr>
+              <a:buFont typeface="Calibri" pitchFamily="34" charset="0"/>
+              <a:buChar char="◦"/>
+              <a:defRPr sz="1800" kern="1200">
+                <a:solidFill>
+                  <a:schemeClr val="tx1">
+                    <a:lumMod val="75000"/>
+                    <a:lumOff val="25000"/>
+                  </a:schemeClr>
+                </a:solidFill>
+                <a:latin typeface="+mn-lt"/>
+                <a:ea typeface="+mn-ea"/>
+                <a:cs typeface="+mn-cs"/>
+              </a:defRPr>
+            </a:lvl2pPr>
+            <a:lvl3pPr marL="566928" indent="-182880" algn="l" defTabSz="914400" rtl="0" eaLnBrk="1" latinLnBrk="0" hangingPunct="1">
+              <a:lnSpc>
+                <a:spcPct val="90000"/>
+              </a:lnSpc>
+              <a:spcBef>
+                <a:spcPts val="200"/>
+              </a:spcBef>
+              <a:spcAft>
+                <a:spcPts val="400"/>
+              </a:spcAft>
+              <a:buClr>
+                <a:schemeClr val="accent1"/>
+              </a:buClr>
+              <a:buFont typeface="Calibri" pitchFamily="34" charset="0"/>
+              <a:buChar char="◦"/>
+              <a:defRPr sz="1400" kern="1200">
+                <a:solidFill>
+                  <a:schemeClr val="tx1">
+                    <a:lumMod val="75000"/>
+                    <a:lumOff val="25000"/>
+                  </a:schemeClr>
+                </a:solidFill>
+                <a:latin typeface="+mn-lt"/>
+                <a:ea typeface="+mn-ea"/>
+                <a:cs typeface="+mn-cs"/>
+              </a:defRPr>
+            </a:lvl3pPr>
+            <a:lvl4pPr marL="749808" indent="-182880" algn="l" defTabSz="914400" rtl="0" eaLnBrk="1" latinLnBrk="0" hangingPunct="1">
+              <a:lnSpc>
+                <a:spcPct val="90000"/>
+              </a:lnSpc>
+              <a:spcBef>
+                <a:spcPts val="200"/>
+              </a:spcBef>
+              <a:spcAft>
+                <a:spcPts val="400"/>
+              </a:spcAft>
+              <a:buClr>
+                <a:schemeClr val="accent1"/>
+              </a:buClr>
+              <a:buFont typeface="Calibri" pitchFamily="34" charset="0"/>
+              <a:buChar char="◦"/>
+              <a:defRPr sz="1400" kern="1200">
+                <a:solidFill>
+                  <a:schemeClr val="tx1">
+                    <a:lumMod val="75000"/>
+                    <a:lumOff val="25000"/>
+                  </a:schemeClr>
+                </a:solidFill>
+                <a:latin typeface="+mn-lt"/>
+                <a:ea typeface="+mn-ea"/>
+                <a:cs typeface="+mn-cs"/>
+              </a:defRPr>
+            </a:lvl4pPr>
+            <a:lvl5pPr marL="932688" indent="-182880" algn="l" defTabSz="914400" rtl="0" eaLnBrk="1" latinLnBrk="0" hangingPunct="1">
+              <a:lnSpc>
+                <a:spcPct val="90000"/>
+              </a:lnSpc>
+              <a:spcBef>
+                <a:spcPts val="200"/>
+              </a:spcBef>
+              <a:spcAft>
+                <a:spcPts val="400"/>
+              </a:spcAft>
+              <a:buClr>
+                <a:schemeClr val="accent1"/>
+              </a:buClr>
+              <a:buFont typeface="Calibri" pitchFamily="34" charset="0"/>
+              <a:buChar char="◦"/>
+              <a:defRPr sz="1400" kern="1200">
+                <a:solidFill>
+                  <a:schemeClr val="tx1">
+                    <a:lumMod val="75000"/>
+                    <a:lumOff val="25000"/>
+                  </a:schemeClr>
+                </a:solidFill>
+                <a:latin typeface="+mn-lt"/>
+                <a:ea typeface="+mn-ea"/>
+                <a:cs typeface="+mn-cs"/>
+              </a:defRPr>
+            </a:lvl5pPr>
+            <a:lvl6pPr marL="1100000" indent="-228600" algn="l" defTabSz="914400" rtl="0" eaLnBrk="1" latinLnBrk="0" hangingPunct="1">
+              <a:lnSpc>
+                <a:spcPct val="90000"/>
+              </a:lnSpc>
+              <a:spcBef>
+                <a:spcPts val="200"/>
+              </a:spcBef>
+              <a:spcAft>
+                <a:spcPts val="400"/>
+              </a:spcAft>
+              <a:buClr>
+                <a:schemeClr val="accent1"/>
+              </a:buClr>
+              <a:buFont typeface="Calibri" pitchFamily="34" charset="0"/>
+              <a:buChar char="◦"/>
+              <a:defRPr sz="1400" kern="1200">
+                <a:solidFill>
+                  <a:schemeClr val="tx1">
+                    <a:lumMod val="75000"/>
+                    <a:lumOff val="25000"/>
+                  </a:schemeClr>
+                </a:solidFill>
+                <a:latin typeface="+mn-lt"/>
+                <a:ea typeface="+mn-ea"/>
+                <a:cs typeface="+mn-cs"/>
+              </a:defRPr>
+            </a:lvl6pPr>
+            <a:lvl7pPr marL="1300000" indent="-228600" algn="l" defTabSz="914400" rtl="0" eaLnBrk="1" latinLnBrk="0" hangingPunct="1">
+              <a:lnSpc>
+                <a:spcPct val="90000"/>
+              </a:lnSpc>
+              <a:spcBef>
+                <a:spcPts val="200"/>
+              </a:spcBef>
+              <a:spcAft>
+                <a:spcPts val="400"/>
+              </a:spcAft>
+              <a:buClr>
+                <a:schemeClr val="accent1"/>
+              </a:buClr>
+              <a:buFont typeface="Calibri" pitchFamily="34" charset="0"/>
+              <a:buChar char="◦"/>
+              <a:defRPr sz="1400" kern="1200">
+                <a:solidFill>
+                  <a:schemeClr val="tx1">
+                    <a:lumMod val="75000"/>
+                    <a:lumOff val="25000"/>
+                  </a:schemeClr>
+                </a:solidFill>
+                <a:latin typeface="+mn-lt"/>
+                <a:ea typeface="+mn-ea"/>
+                <a:cs typeface="+mn-cs"/>
+              </a:defRPr>
+            </a:lvl7pPr>
+            <a:lvl8pPr marL="1500000" indent="-228600" algn="l" defTabSz="914400" rtl="0" eaLnBrk="1" latinLnBrk="0" hangingPunct="1">
+              <a:lnSpc>
+                <a:spcPct val="90000"/>
+              </a:lnSpc>
+              <a:spcBef>
+                <a:spcPts val="200"/>
+              </a:spcBef>
+              <a:spcAft>
+                <a:spcPts val="400"/>
+              </a:spcAft>
+              <a:buClr>
+                <a:schemeClr val="accent1"/>
+              </a:buClr>
+              <a:buFont typeface="Calibri" pitchFamily="34" charset="0"/>
+              <a:buChar char="◦"/>
+              <a:defRPr sz="1400" kern="1200">
+                <a:solidFill>
+                  <a:schemeClr val="tx1">
+                    <a:lumMod val="75000"/>
+                    <a:lumOff val="25000"/>
+                  </a:schemeClr>
+                </a:solidFill>
+                <a:latin typeface="+mn-lt"/>
+                <a:ea typeface="+mn-ea"/>
+                <a:cs typeface="+mn-cs"/>
+              </a:defRPr>
+            </a:lvl8pPr>
+            <a:lvl9pPr marL="1700000" indent="-228600" algn="l" defTabSz="914400" rtl="0" eaLnBrk="1" latinLnBrk="0" hangingPunct="1">
+              <a:lnSpc>
+                <a:spcPct val="90000"/>
+              </a:lnSpc>
+              <a:spcBef>
+                <a:spcPts val="200"/>
+              </a:spcBef>
+              <a:spcAft>
+                <a:spcPts val="400"/>
+              </a:spcAft>
+              <a:buClr>
+                <a:schemeClr val="accent1"/>
+              </a:buClr>
+              <a:buFont typeface="Calibri" pitchFamily="34" charset="0"/>
+              <a:buChar char="◦"/>
+              <a:defRPr sz="1400" kern="1200">
+                <a:solidFill>
+                  <a:schemeClr val="tx1">
+                    <a:lumMod val="75000"/>
+                    <a:lumOff val="25000"/>
+                  </a:schemeClr>
+                </a:solidFill>
+                <a:latin typeface="+mn-lt"/>
+                <a:ea typeface="+mn-ea"/>
+                <a:cs typeface="+mn-cs"/>
+              </a:defRPr>
+            </a:lvl9pPr>
+          </a:lstStyle>
+          <a:p>
+            <a:pPr marL="457200" indent="-457200">
+              <a:buFont typeface="+mj-lt"/>
+              <a:buAutoNum type="arabicPeriod"/>
+            </a:pPr>
+            <a:r>
+              <a:rPr lang="en-US" dirty="0"/>
+              <a:t> Initialize generator network</a:t>
+            </a:r>
+          </a:p>
+          <a:p>
+            <a:pPr marL="749808" lvl="1" indent="-457200">
+              <a:buFont typeface="+mj-lt"/>
+              <a:buAutoNum type="arabicPeriod"/>
+            </a:pPr>
+            <a:r>
+              <a:rPr lang="en-US" dirty="0"/>
+              <a:t>Iterate over epochs</a:t>
+            </a:r>
+          </a:p>
+          <a:p>
+            <a:pPr marL="932688" lvl="2" indent="-457200">
+              <a:buFont typeface="+mj-lt"/>
+              <a:buAutoNum type="arabicPeriod"/>
+            </a:pPr>
+            <a:r>
+              <a:rPr lang="en-US" dirty="0"/>
+              <a:t>Iterate over batches of data</a:t>
+            </a:r>
+          </a:p>
+          <a:p>
+            <a:pPr marL="1115568" lvl="3" indent="-457200">
+              <a:buFont typeface="+mj-lt"/>
+              <a:buAutoNum type="arabicPeriod"/>
+            </a:pPr>
+            <a:r>
+              <a:rPr lang="en-US" dirty="0"/>
+              <a:t>Zero grad</a:t>
+            </a:r>
+          </a:p>
+          <a:p>
+            <a:pPr marL="1115568" lvl="3" indent="-457200">
+              <a:buFont typeface="+mj-lt"/>
+              <a:buAutoNum type="arabicPeriod"/>
+            </a:pPr>
+            <a:r>
+              <a:rPr lang="en-US" dirty="0"/>
+              <a:t>Generate noise sample</a:t>
+            </a:r>
+          </a:p>
+          <a:p>
+            <a:pPr marL="1115568" lvl="3" indent="-457200">
+              <a:buFont typeface="+mj-lt"/>
+              <a:buAutoNum type="arabicPeriod"/>
+            </a:pPr>
+            <a:r>
+              <a:rPr lang="en-US" dirty="0"/>
+              <a:t>Generate fake sample (generator)</a:t>
+            </a:r>
+          </a:p>
+          <a:p>
+            <a:pPr marL="1115568" lvl="3" indent="-457200">
+              <a:buFont typeface="+mj-lt"/>
+              <a:buAutoNum type="arabicPeriod"/>
+            </a:pPr>
+            <a:r>
+              <a:rPr lang="en-US" dirty="0"/>
+              <a:t>Forward pass fake samples to discriminator</a:t>
+            </a:r>
+          </a:p>
+          <a:p>
+            <a:pPr marL="1115568" lvl="3" indent="-457200">
+              <a:buFont typeface="+mj-lt"/>
+              <a:buAutoNum type="arabicPeriod"/>
+            </a:pPr>
+            <a:r>
+              <a:rPr lang="en-US" dirty="0"/>
+              <a:t>Compute loss between fake samples and real samples</a:t>
+            </a:r>
+          </a:p>
+          <a:p>
+            <a:pPr marL="1115568" lvl="3" indent="-457200">
+              <a:buFont typeface="+mj-lt"/>
+              <a:buAutoNum type="arabicPeriod"/>
+            </a:pPr>
+            <a:r>
+              <a:rPr lang="en-US" dirty="0"/>
+              <a:t>Backward pass</a:t>
+            </a:r>
+          </a:p>
+          <a:p>
+            <a:pPr marL="1115568" lvl="3" indent="-457200">
+              <a:buFont typeface="+mj-lt"/>
+              <a:buAutoNum type="arabicPeriod"/>
+            </a:pPr>
+            <a:r>
+              <a:rPr lang="en-US" dirty="0"/>
+              <a:t>Generator optimizer step</a:t>
+            </a:r>
+          </a:p>
+          <a:p>
+            <a:pPr marL="1115568" lvl="3" indent="-457200">
+              <a:buFont typeface="+mj-lt"/>
+              <a:buAutoNum type="arabicPeriod"/>
+            </a:pPr>
+            <a:r>
+              <a:rPr lang="en-US" dirty="0"/>
+              <a:t>Generator scheduler step</a:t>
+            </a:r>
+          </a:p>
+          <a:p>
+            <a:pPr marL="1115568" lvl="3" indent="-457200">
+              <a:buFont typeface="+mj-lt"/>
+              <a:buAutoNum type="arabicPeriod"/>
+            </a:pPr>
+            <a:r>
+              <a:rPr lang="en-US" dirty="0">
+                <a:solidFill>
+                  <a:schemeClr val="bg1"/>
+                </a:solidFill>
+              </a:rPr>
+              <a:t> </a:t>
+            </a:r>
+          </a:p>
+          <a:p>
+            <a:pPr marL="1115568" lvl="3" indent="-457200">
+              <a:buFont typeface="+mj-lt"/>
+              <a:buAutoNum type="arabicPeriod"/>
+            </a:pPr>
+            <a:r>
+              <a:rPr lang="en-US" dirty="0">
+                <a:solidFill>
+                  <a:schemeClr val="bg1"/>
+                </a:solidFill>
+              </a:rPr>
+              <a:t> </a:t>
+            </a:r>
+          </a:p>
+          <a:p>
+            <a:pPr marL="1115568" lvl="3" indent="-457200">
+              <a:buFont typeface="+mj-lt"/>
+              <a:buAutoNum type="arabicPeriod"/>
+            </a:pPr>
+            <a:r>
+              <a:rPr lang="en-US" dirty="0">
+                <a:solidFill>
+                  <a:schemeClr val="bg1"/>
+                </a:solidFill>
+              </a:rPr>
+              <a:t> </a:t>
+            </a:r>
+          </a:p>
+          <a:p>
+            <a:pPr marL="1115568" lvl="3" indent="-457200">
+              <a:buFont typeface="+mj-lt"/>
+              <a:buAutoNum type="arabicPeriod"/>
+            </a:pPr>
+            <a:r>
+              <a:rPr lang="en-US" dirty="0">
+                <a:solidFill>
+                  <a:schemeClr val="bg1"/>
+                </a:solidFill>
+              </a:rPr>
+              <a:t> </a:t>
+            </a:r>
+          </a:p>
+          <a:p>
+            <a:pPr marL="1115568" lvl="3" indent="-457200">
+              <a:buFont typeface="+mj-lt"/>
+              <a:buAutoNum type="arabicPeriod"/>
+            </a:pPr>
+            <a:r>
+              <a:rPr lang="en-US" dirty="0">
+                <a:solidFill>
+                  <a:schemeClr val="bg1"/>
+                </a:solidFill>
+              </a:rPr>
+              <a:t> </a:t>
+            </a:r>
+          </a:p>
+          <a:p>
+            <a:endParaRPr lang="en-US" dirty="0"/>
+          </a:p>
+        </p:txBody>
+      </p:sp>
+      <p:sp>
+        <p:nvSpPr>
+          <p:cNvPr id="5" name="Rectangle 4">
+            <a:extLst>
+              <a:ext uri="{FF2B5EF4-FFF2-40B4-BE49-F238E27FC236}">
+                <a16:creationId xmlns:a16="http://schemas.microsoft.com/office/drawing/2014/main" id="{DB37E2F6-0320-4DEB-B1C1-EBAFB407DA97}"/>
+              </a:ext>
+            </a:extLst>
+          </p:cNvPr>
+          <p:cNvSpPr/>
+          <p:nvPr/>
+        </p:nvSpPr>
+        <p:spPr>
+          <a:xfrm>
+            <a:off x="6753726" y="4588042"/>
+            <a:ext cx="3633537" cy="1171074"/>
+          </a:xfrm>
+          <a:prstGeom prst="rect">
+            <a:avLst/>
+          </a:prstGeom>
+          <a:solidFill>
+            <a:schemeClr val="bg1"/>
+          </a:solidFill>
+          <a:ln>
+            <a:solidFill>
+              <a:schemeClr val="bg1"/>
+            </a:solidFill>
+          </a:ln>
+        </p:spPr>
+        <p:style>
+          <a:lnRef idx="2">
+            <a:schemeClr val="accent1">
+              <a:shade val="50000"/>
+            </a:schemeClr>
+          </a:lnRef>
+          <a:fillRef idx="1">
+            <a:schemeClr val="accent1"/>
+          </a:fillRef>
+          <a:effectRef idx="0">
+            <a:schemeClr val="accent1"/>
+          </a:effectRef>
+          <a:fontRef idx="minor">
+            <a:schemeClr val="lt1"/>
+          </a:fontRef>
+        </p:style>
+        <p:txBody>
+          <a:bodyPr rtlCol="0" anchor="ctr"/>
+          <a:lstStyle/>
+          <a:p>
+            <a:pPr algn="ctr"/>
             <a:endParaRPr lang="en-US"/>
           </a:p>
         </p:txBody>
@@ -4481,7 +5566,7 @@
     </p:spTree>
     <p:extLst>
       <p:ext uri="{BB962C8B-B14F-4D97-AF65-F5344CB8AC3E}">
-        <p14:creationId xmlns:p14="http://schemas.microsoft.com/office/powerpoint/2010/main" val="4111016300"/>
+        <p14:creationId xmlns:p14="http://schemas.microsoft.com/office/powerpoint/2010/main" val="1747305778"/>
       </p:ext>
     </p:extLst>
   </p:cSld>
@@ -4513,7 +5598,7 @@
           <p:cNvPr id="2" name="Title 1">
             <a:extLst>
               <a:ext uri="{FF2B5EF4-FFF2-40B4-BE49-F238E27FC236}">
-                <a16:creationId xmlns:a16="http://schemas.microsoft.com/office/drawing/2014/main" id="{9B42C6A5-1B7E-409B-819F-D59609ED2BEE}"/>
+                <a16:creationId xmlns:a16="http://schemas.microsoft.com/office/drawing/2014/main" id="{B0C7DAE3-D207-4D3F-A39F-356293B89118}"/>
               </a:ext>
             </a:extLst>
           </p:cNvPr>
@@ -4531,7 +5616,7 @@
           <a:p>
             <a:r>
               <a:rPr lang="en-US" dirty="0"/>
-              <a:t>Training</a:t>
+              <a:t>Hyperparameter Tuning</a:t>
             </a:r>
           </a:p>
         </p:txBody>
@@ -4541,7 +5626,7 @@
           <p:cNvPr id="3" name="Content Placeholder 2">
             <a:extLst>
               <a:ext uri="{FF2B5EF4-FFF2-40B4-BE49-F238E27FC236}">
-                <a16:creationId xmlns:a16="http://schemas.microsoft.com/office/drawing/2014/main" id="{BA3B3647-060C-4BE6-8682-FF7174D29E7D}"/>
+                <a16:creationId xmlns:a16="http://schemas.microsoft.com/office/drawing/2014/main" id="{4E9D644F-45C9-43FE-B8D2-D7B923E317C0}"/>
               </a:ext>
             </a:extLst>
           </p:cNvPr>
@@ -4557,14 +5642,24 @@
           <a:bodyPr/>
           <a:lstStyle/>
           <a:p>
-            <a:endParaRPr lang="en-US"/>
+            <a:r>
+              <a:rPr lang="en-US" dirty="0"/>
+              <a:t>Baseline: </a:t>
+            </a:r>
+          </a:p>
+          <a:p>
+            <a:pPr lvl="1"/>
+            <a:r>
+              <a:rPr lang="en-US" dirty="0"/>
+              <a:t>Validity: </a:t>
+            </a:r>
           </a:p>
         </p:txBody>
       </p:sp>
     </p:spTree>
     <p:extLst>
       <p:ext uri="{BB962C8B-B14F-4D97-AF65-F5344CB8AC3E}">
-        <p14:creationId xmlns:p14="http://schemas.microsoft.com/office/powerpoint/2010/main" val="1747305778"/>
+        <p14:creationId xmlns:p14="http://schemas.microsoft.com/office/powerpoint/2010/main" val="1293057582"/>
       </p:ext>
     </p:extLst>
   </p:cSld>
@@ -4596,7 +5691,7 @@
           <p:cNvPr id="2" name="Title 1">
             <a:extLst>
               <a:ext uri="{FF2B5EF4-FFF2-40B4-BE49-F238E27FC236}">
-                <a16:creationId xmlns:a16="http://schemas.microsoft.com/office/drawing/2014/main" id="{5928A73C-8259-4039-92CF-F8393AD15EA8}"/>
+                <a16:creationId xmlns:a16="http://schemas.microsoft.com/office/drawing/2014/main" id="{8F1A978A-7ACD-4442-95FF-23DFED927E99}"/>
               </a:ext>
             </a:extLst>
           </p:cNvPr>
@@ -4614,7 +5709,7 @@
           <a:p>
             <a:r>
               <a:rPr lang="en-US" dirty="0"/>
-              <a:t>Hyperparameter Tuning</a:t>
+              <a:t>Tuned Training</a:t>
             </a:r>
           </a:p>
         </p:txBody>
@@ -4624,7 +5719,7 @@
           <p:cNvPr id="3" name="Content Placeholder 2">
             <a:extLst>
               <a:ext uri="{FF2B5EF4-FFF2-40B4-BE49-F238E27FC236}">
-                <a16:creationId xmlns:a16="http://schemas.microsoft.com/office/drawing/2014/main" id="{345A6203-1AFE-44AE-AD81-9ABE8C52EB8D}"/>
+                <a16:creationId xmlns:a16="http://schemas.microsoft.com/office/drawing/2014/main" id="{11DED7FB-4B72-44B1-8F48-E8E144E6251B}"/>
               </a:ext>
             </a:extLst>
           </p:cNvPr>
@@ -4647,7 +5742,7 @@
     </p:spTree>
     <p:extLst>
       <p:ext uri="{BB962C8B-B14F-4D97-AF65-F5344CB8AC3E}">
-        <p14:creationId xmlns:p14="http://schemas.microsoft.com/office/powerpoint/2010/main" val="3140673411"/>
+        <p14:creationId xmlns:p14="http://schemas.microsoft.com/office/powerpoint/2010/main" val="1638878460"/>
       </p:ext>
     </p:extLst>
   </p:cSld>
@@ -4679,7 +5774,7 @@
           <p:cNvPr id="2" name="Title 1">
             <a:extLst>
               <a:ext uri="{FF2B5EF4-FFF2-40B4-BE49-F238E27FC236}">
-                <a16:creationId xmlns:a16="http://schemas.microsoft.com/office/drawing/2014/main" id="{73FF4798-84EB-416E-8D39-9704F0ABD274}"/>
+                <a16:creationId xmlns:a16="http://schemas.microsoft.com/office/drawing/2014/main" id="{5928A73C-8259-4039-92CF-F8393AD15EA8}"/>
               </a:ext>
             </a:extLst>
           </p:cNvPr>
@@ -4697,7 +5792,7 @@
           <a:p>
             <a:r>
               <a:rPr lang="en-US" dirty="0"/>
-              <a:t>Results</a:t>
+              <a:t>Inference Tuning</a:t>
             </a:r>
           </a:p>
         </p:txBody>
@@ -4707,7 +5802,7 @@
           <p:cNvPr id="3" name="Content Placeholder 2">
             <a:extLst>
               <a:ext uri="{FF2B5EF4-FFF2-40B4-BE49-F238E27FC236}">
-                <a16:creationId xmlns:a16="http://schemas.microsoft.com/office/drawing/2014/main" id="{6B169074-D98A-4A0D-9E2D-AA1882EC5FA2}"/>
+                <a16:creationId xmlns:a16="http://schemas.microsoft.com/office/drawing/2014/main" id="{345A6203-1AFE-44AE-AD81-9ABE8C52EB8D}"/>
               </a:ext>
             </a:extLst>
           </p:cNvPr>
@@ -4730,7 +5825,7 @@
     </p:spTree>
     <p:extLst>
       <p:ext uri="{BB962C8B-B14F-4D97-AF65-F5344CB8AC3E}">
-        <p14:creationId xmlns:p14="http://schemas.microsoft.com/office/powerpoint/2010/main" val="344370418"/>
+        <p14:creationId xmlns:p14="http://schemas.microsoft.com/office/powerpoint/2010/main" val="3140673411"/>
       </p:ext>
     </p:extLst>
   </p:cSld>
@@ -4762,6 +5857,89 @@
           <p:cNvPr id="2" name="Title 1">
             <a:extLst>
               <a:ext uri="{FF2B5EF4-FFF2-40B4-BE49-F238E27FC236}">
+                <a16:creationId xmlns:a16="http://schemas.microsoft.com/office/drawing/2014/main" id="{73FF4798-84EB-416E-8D39-9704F0ABD274}"/>
+              </a:ext>
+            </a:extLst>
+          </p:cNvPr>
+          <p:cNvSpPr>
+            <a:spLocks noGrp="1"/>
+          </p:cNvSpPr>
+          <p:nvPr>
+            <p:ph type="title"/>
+          </p:nvPr>
+        </p:nvSpPr>
+        <p:spPr/>
+        <p:txBody>
+          <a:bodyPr/>
+          <a:lstStyle/>
+          <a:p>
+            <a:r>
+              <a:rPr lang="en-US" dirty="0"/>
+              <a:t>Results</a:t>
+            </a:r>
+          </a:p>
+        </p:txBody>
+      </p:sp>
+      <p:sp>
+        <p:nvSpPr>
+          <p:cNvPr id="3" name="Content Placeholder 2">
+            <a:extLst>
+              <a:ext uri="{FF2B5EF4-FFF2-40B4-BE49-F238E27FC236}">
+                <a16:creationId xmlns:a16="http://schemas.microsoft.com/office/drawing/2014/main" id="{6B169074-D98A-4A0D-9E2D-AA1882EC5FA2}"/>
+              </a:ext>
+            </a:extLst>
+          </p:cNvPr>
+          <p:cNvSpPr>
+            <a:spLocks noGrp="1"/>
+          </p:cNvSpPr>
+          <p:nvPr>
+            <p:ph idx="1"/>
+          </p:nvPr>
+        </p:nvSpPr>
+        <p:spPr/>
+        <p:txBody>
+          <a:bodyPr/>
+          <a:lstStyle/>
+          <a:p>
+            <a:endParaRPr lang="en-US"/>
+          </a:p>
+        </p:txBody>
+      </p:sp>
+    </p:spTree>
+    <p:extLst>
+      <p:ext uri="{BB962C8B-B14F-4D97-AF65-F5344CB8AC3E}">
+        <p14:creationId xmlns:p14="http://schemas.microsoft.com/office/powerpoint/2010/main" val="344370418"/>
+      </p:ext>
+    </p:extLst>
+  </p:cSld>
+  <p:clrMapOvr>
+    <a:masterClrMapping/>
+  </p:clrMapOvr>
+</p:sld>
+</file>
+
+<file path=ppt/slides/slide17.xml><?xml version="1.0" encoding="utf-8"?>
+<p:sld xmlns:a="http://schemas.openxmlformats.org/drawingml/2006/main" xmlns:r="http://schemas.openxmlformats.org/officeDocument/2006/relationships" xmlns:p="http://schemas.openxmlformats.org/presentationml/2006/main">
+  <p:cSld>
+    <p:spTree>
+      <p:nvGrpSpPr>
+        <p:cNvPr id="1" name=""/>
+        <p:cNvGrpSpPr/>
+        <p:nvPr/>
+      </p:nvGrpSpPr>
+      <p:grpSpPr>
+        <a:xfrm>
+          <a:off x="0" y="0"/>
+          <a:ext cx="0" cy="0"/>
+          <a:chOff x="0" y="0"/>
+          <a:chExt cx="0" cy="0"/>
+        </a:xfrm>
+      </p:grpSpPr>
+      <p:sp>
+        <p:nvSpPr>
+          <p:cNvPr id="2" name="Title 1">
+            <a:extLst>
+              <a:ext uri="{FF2B5EF4-FFF2-40B4-BE49-F238E27FC236}">
                 <a16:creationId xmlns:a16="http://schemas.microsoft.com/office/drawing/2014/main" id="{71DE96C2-3A10-40D3-8D05-5D67D9E840C5}"/>
               </a:ext>
             </a:extLst>
@@ -4814,6 +5992,366 @@
     <p:extLst>
       <p:ext uri="{BB962C8B-B14F-4D97-AF65-F5344CB8AC3E}">
         <p14:creationId xmlns:p14="http://schemas.microsoft.com/office/powerpoint/2010/main" val="900241141"/>
+      </p:ext>
+    </p:extLst>
+  </p:cSld>
+  <p:clrMapOvr>
+    <a:masterClrMapping/>
+  </p:clrMapOvr>
+</p:sld>
+</file>
+
+<file path=ppt/slides/slide18.xml><?xml version="1.0" encoding="utf-8"?>
+<p:sld xmlns:a="http://schemas.openxmlformats.org/drawingml/2006/main" xmlns:r="http://schemas.openxmlformats.org/officeDocument/2006/relationships" xmlns:p="http://schemas.openxmlformats.org/presentationml/2006/main">
+  <p:cSld>
+    <p:spTree>
+      <p:nvGrpSpPr>
+        <p:cNvPr id="1" name=""/>
+        <p:cNvGrpSpPr/>
+        <p:nvPr/>
+      </p:nvGrpSpPr>
+      <p:grpSpPr>
+        <a:xfrm>
+          <a:off x="0" y="0"/>
+          <a:ext cx="0" cy="0"/>
+          <a:chOff x="0" y="0"/>
+          <a:chExt cx="0" cy="0"/>
+        </a:xfrm>
+      </p:grpSpPr>
+      <p:sp>
+        <p:nvSpPr>
+          <p:cNvPr id="2" name="Title 1">
+            <a:extLst>
+              <a:ext uri="{FF2B5EF4-FFF2-40B4-BE49-F238E27FC236}">
+                <a16:creationId xmlns:a16="http://schemas.microsoft.com/office/drawing/2014/main" id="{F1C20DE3-FA25-40C0-B1AD-10D4C014441B}"/>
+              </a:ext>
+            </a:extLst>
+          </p:cNvPr>
+          <p:cNvSpPr>
+            <a:spLocks noGrp="1"/>
+          </p:cNvSpPr>
+          <p:nvPr>
+            <p:ph type="title"/>
+          </p:nvPr>
+        </p:nvSpPr>
+        <p:spPr/>
+        <p:txBody>
+          <a:bodyPr/>
+          <a:lstStyle/>
+          <a:p>
+            <a:r>
+              <a:rPr lang="en-US" dirty="0"/>
+              <a:t>References</a:t>
+            </a:r>
+          </a:p>
+        </p:txBody>
+      </p:sp>
+      <p:sp>
+        <p:nvSpPr>
+          <p:cNvPr id="3" name="Content Placeholder 2">
+            <a:extLst>
+              <a:ext uri="{FF2B5EF4-FFF2-40B4-BE49-F238E27FC236}">
+                <a16:creationId xmlns:a16="http://schemas.microsoft.com/office/drawing/2014/main" id="{A6043FFD-EDB8-4B43-8A79-752324CA3720}"/>
+              </a:ext>
+            </a:extLst>
+          </p:cNvPr>
+          <p:cNvSpPr>
+            <a:spLocks noGrp="1"/>
+          </p:cNvSpPr>
+          <p:nvPr>
+            <p:ph idx="1"/>
+          </p:nvPr>
+        </p:nvSpPr>
+        <p:spPr/>
+        <p:txBody>
+          <a:bodyPr>
+            <a:normAutofit fontScale="92500" lnSpcReduction="20000"/>
+          </a:bodyPr>
+          <a:lstStyle/>
+          <a:p>
+            <a:r>
+              <a:rPr lang="es-ES" sz="1800" dirty="0">
+                <a:effectLst/>
+                <a:latin typeface="Times New Roman" panose="02020603050405020304" pitchFamily="18" charset="0"/>
+                <a:ea typeface="SimSun" panose="02010600030101010101" pitchFamily="2" charset="-122"/>
+              </a:rPr>
+              <a:t>Alqahtani, H. E. (19 </a:t>
+            </a:r>
+            <a:r>
+              <a:rPr lang="es-ES" sz="1800" dirty="0" err="1">
+                <a:effectLst/>
+                <a:latin typeface="Times New Roman" panose="02020603050405020304" pitchFamily="18" charset="0"/>
+                <a:ea typeface="SimSun" panose="02010600030101010101" pitchFamily="2" charset="-122"/>
+              </a:rPr>
+              <a:t>Dec</a:t>
+            </a:r>
+            <a:r>
+              <a:rPr lang="es-ES" sz="1800" dirty="0">
+                <a:latin typeface="Times New Roman" panose="02020603050405020304" pitchFamily="18" charset="0"/>
+                <a:ea typeface="SimSun" panose="02010600030101010101" pitchFamily="2" charset="-122"/>
+              </a:rPr>
+              <a:t>.</a:t>
+            </a:r>
+            <a:r>
+              <a:rPr lang="es-ES" sz="1800" dirty="0">
+                <a:effectLst/>
+                <a:latin typeface="Times New Roman" panose="02020603050405020304" pitchFamily="18" charset="0"/>
+                <a:ea typeface="SimSun" panose="02010600030101010101" pitchFamily="2" charset="-122"/>
+              </a:rPr>
+              <a:t> 2019). </a:t>
+            </a:r>
+            <a:r>
+              <a:rPr lang="en-US" sz="1800" dirty="0">
+                <a:effectLst/>
+                <a:latin typeface="Times New Roman" panose="02020603050405020304" pitchFamily="18" charset="0"/>
+                <a:ea typeface="SimSun" panose="02010600030101010101" pitchFamily="2" charset="-122"/>
+              </a:rPr>
+              <a:t>Applications of Generative Adversarial Networks (GANS): An Updated Review.</a:t>
+            </a:r>
+            <a:endParaRPr lang="de-DE" sz="1800" dirty="0">
+              <a:effectLst/>
+              <a:latin typeface="Times New Roman" panose="02020603050405020304" pitchFamily="18" charset="0"/>
+              <a:ea typeface="SimSun" panose="02010600030101010101" pitchFamily="2" charset="-122"/>
+            </a:endParaRPr>
+          </a:p>
+          <a:p>
+            <a:r>
+              <a:rPr lang="de-DE" sz="1800" dirty="0">
+                <a:effectLst/>
+                <a:latin typeface="Times New Roman" panose="02020603050405020304" pitchFamily="18" charset="0"/>
+                <a:ea typeface="SimSun" panose="02010600030101010101" pitchFamily="2" charset="-122"/>
+              </a:rPr>
+              <a:t>Bickerton, G. R. (2012). </a:t>
+            </a:r>
+            <a:r>
+              <a:rPr lang="en-US" sz="1800" dirty="0">
+                <a:effectLst/>
+                <a:latin typeface="Times New Roman" panose="02020603050405020304" pitchFamily="18" charset="0"/>
+                <a:ea typeface="SimSun" panose="02010600030101010101" pitchFamily="2" charset="-122"/>
+              </a:rPr>
+              <a:t>Quantifying the chemical beauty of drugs.</a:t>
+            </a:r>
+          </a:p>
+          <a:p>
+            <a:r>
+              <a:rPr lang="en-US" sz="1800" dirty="0">
+                <a:effectLst/>
+                <a:latin typeface="Times New Roman" panose="02020603050405020304" pitchFamily="18" charset="0"/>
+                <a:ea typeface="SimSun" panose="02010600030101010101" pitchFamily="2" charset="-122"/>
+              </a:rPr>
+              <a:t>Bidisha, S. (2019). NeVAE: A Deep Generative Model for Molecular Graphs.</a:t>
+            </a:r>
+          </a:p>
+          <a:p>
+            <a:r>
+              <a:rPr lang="en-US" sz="1800" dirty="0">
+                <a:effectLst/>
+                <a:latin typeface="Times New Roman" panose="02020603050405020304" pitchFamily="18" charset="0"/>
+                <a:ea typeface="SimSun" panose="02010600030101010101" pitchFamily="2" charset="-122"/>
+              </a:rPr>
+              <a:t>Comer, J. a. (2001). Lipophiicity profiles: theory and measurement. Zurich, Switzerland.</a:t>
+            </a:r>
+          </a:p>
+          <a:p>
+            <a:r>
+              <a:rPr lang="en-US" sz="1800" dirty="0">
+                <a:effectLst/>
+                <a:latin typeface="Times New Roman" panose="02020603050405020304" pitchFamily="18" charset="0"/>
+                <a:ea typeface="SimSun" panose="02010600030101010101" pitchFamily="2" charset="-122"/>
+              </a:rPr>
+              <a:t>Ertl, P. a. (2009). Estimation of synthetic accessibility score of drug-like molecules based on molecular complexity and fragment contributions. </a:t>
+            </a:r>
+            <a:r>
+              <a:rPr lang="en-US" sz="1800" i="1" dirty="0">
+                <a:effectLst/>
+                <a:latin typeface="Times New Roman" panose="02020603050405020304" pitchFamily="18" charset="0"/>
+                <a:ea typeface="SimSun" panose="02010600030101010101" pitchFamily="2" charset="-122"/>
+              </a:rPr>
+              <a:t>Journal of Cheminformatics</a:t>
+            </a:r>
+            <a:r>
+              <a:rPr lang="en-US" sz="1800" dirty="0">
+                <a:effectLst/>
+                <a:latin typeface="Times New Roman" panose="02020603050405020304" pitchFamily="18" charset="0"/>
+                <a:ea typeface="SimSun" panose="02010600030101010101" pitchFamily="2" charset="-122"/>
+              </a:rPr>
+              <a:t>, 1-8.</a:t>
+            </a:r>
+          </a:p>
+          <a:p>
+            <a:r>
+              <a:rPr lang="en-US" sz="1800" dirty="0">
+                <a:effectLst/>
+                <a:latin typeface="Times New Roman" panose="02020603050405020304" pitchFamily="18" charset="0"/>
+                <a:ea typeface="SimSun" panose="02010600030101010101" pitchFamily="2" charset="-122"/>
+              </a:rPr>
+              <a:t>Phrma. (22 de July de 2024). </a:t>
+            </a:r>
+            <a:r>
+              <a:rPr lang="en-US" sz="1800" i="1" dirty="0">
+                <a:effectLst/>
+                <a:latin typeface="Times New Roman" panose="02020603050405020304" pitchFamily="18" charset="0"/>
+                <a:ea typeface="SimSun" panose="02010600030101010101" pitchFamily="2" charset="-122"/>
+              </a:rPr>
+              <a:t>Research &amp; Development Policy Framework</a:t>
+            </a:r>
+            <a:r>
+              <a:rPr lang="en-US" sz="1800" dirty="0">
+                <a:effectLst/>
+                <a:latin typeface="Times New Roman" panose="02020603050405020304" pitchFamily="18" charset="0"/>
+                <a:ea typeface="SimSun" panose="02010600030101010101" pitchFamily="2" charset="-122"/>
+              </a:rPr>
+              <a:t>. </a:t>
+            </a:r>
+            <a:r>
+              <a:rPr lang="es-ES" sz="1800" dirty="0">
+                <a:effectLst/>
+                <a:latin typeface="Times New Roman" panose="02020603050405020304" pitchFamily="18" charset="0"/>
+                <a:ea typeface="SimSun" panose="02010600030101010101" pitchFamily="2" charset="-122"/>
+              </a:rPr>
+              <a:t>Obtenido de phrma.org: </a:t>
+            </a:r>
+            <a:r>
+              <a:rPr lang="es-ES" sz="1800" dirty="0">
+                <a:effectLst/>
+                <a:latin typeface="Times New Roman" panose="02020603050405020304" pitchFamily="18" charset="0"/>
+                <a:ea typeface="SimSun" panose="02010600030101010101" pitchFamily="2" charset="-122"/>
+                <a:hlinkClick r:id="rId2"/>
+              </a:rPr>
+              <a:t>https://phrma.org/policy-issues/Research-and-Development-Policy-Framework</a:t>
+            </a:r>
+            <a:endParaRPr lang="es-ES" sz="1800" dirty="0">
+              <a:effectLst/>
+              <a:latin typeface="Times New Roman" panose="02020603050405020304" pitchFamily="18" charset="0"/>
+              <a:ea typeface="SimSun" panose="02010600030101010101" pitchFamily="2" charset="-122"/>
+            </a:endParaRPr>
+          </a:p>
+          <a:p>
+            <a:r>
+              <a:rPr lang="es-ES" sz="1800" dirty="0">
+                <a:effectLst/>
+                <a:latin typeface="Times New Roman" panose="02020603050405020304" pitchFamily="18" charset="0"/>
+                <a:ea typeface="SimSun" panose="02010600030101010101" pitchFamily="2" charset="-122"/>
+              </a:rPr>
+              <a:t>RDKit. (2023). </a:t>
+            </a:r>
+            <a:r>
+              <a:rPr lang="es-ES" sz="1800" i="1" dirty="0">
+                <a:effectLst/>
+                <a:latin typeface="Times New Roman" panose="02020603050405020304" pitchFamily="18" charset="0"/>
+                <a:ea typeface="SimSun" panose="02010600030101010101" pitchFamily="2" charset="-122"/>
+              </a:rPr>
+              <a:t>rdkit.Chem.rdMolTransforms module</a:t>
+            </a:r>
+            <a:r>
+              <a:rPr lang="es-ES" sz="1800" dirty="0">
+                <a:effectLst/>
+                <a:latin typeface="Times New Roman" panose="02020603050405020304" pitchFamily="18" charset="0"/>
+                <a:ea typeface="SimSun" panose="02010600030101010101" pitchFamily="2" charset="-122"/>
+              </a:rPr>
+              <a:t>. Obtenido de rdkit.org: https://www.rdkit.org/docs/source/rdkit.Chem.rdMolTransforms.html</a:t>
+            </a:r>
+            <a:endParaRPr lang="en-US" sz="1800" dirty="0">
+              <a:effectLst/>
+              <a:latin typeface="Times New Roman" panose="02020603050405020304" pitchFamily="18" charset="0"/>
+              <a:ea typeface="SimSun" panose="02010600030101010101" pitchFamily="2" charset="-122"/>
+            </a:endParaRPr>
+          </a:p>
+          <a:p>
+            <a:r>
+              <a:rPr lang="en-US" sz="1800" dirty="0">
+                <a:effectLst/>
+                <a:latin typeface="Times New Roman" panose="02020603050405020304" pitchFamily="18" charset="0"/>
+                <a:ea typeface="SimSun" panose="02010600030101010101" pitchFamily="2" charset="-122"/>
+              </a:rPr>
+              <a:t>RDKit. (20 de August de 2024). </a:t>
+            </a:r>
+            <a:r>
+              <a:rPr lang="en-US" sz="1800" i="1" dirty="0">
+                <a:effectLst/>
+                <a:latin typeface="Times New Roman" panose="02020603050405020304" pitchFamily="18" charset="0"/>
+                <a:ea typeface="SimSun" panose="02010600030101010101" pitchFamily="2" charset="-122"/>
+              </a:rPr>
+              <a:t>RDKit: Open-Source Cheminformatics Software</a:t>
+            </a:r>
+            <a:r>
+              <a:rPr lang="en-US" sz="1800" dirty="0">
+                <a:effectLst/>
+                <a:latin typeface="Times New Roman" panose="02020603050405020304" pitchFamily="18" charset="0"/>
+                <a:ea typeface="SimSun" panose="02010600030101010101" pitchFamily="2" charset="-122"/>
+              </a:rPr>
+              <a:t>. </a:t>
+            </a:r>
+            <a:r>
+              <a:rPr lang="es-ES" sz="1800" dirty="0">
+                <a:effectLst/>
+                <a:latin typeface="Times New Roman" panose="02020603050405020304" pitchFamily="18" charset="0"/>
+                <a:ea typeface="SimSun" panose="02010600030101010101" pitchFamily="2" charset="-122"/>
+              </a:rPr>
+              <a:t>Obtenido de rdkit.org: 2024.</a:t>
+            </a:r>
+          </a:p>
+          <a:p>
+            <a:r>
+              <a:rPr lang="es-ES" sz="1800" dirty="0">
+                <a:effectLst/>
+                <a:latin typeface="Times New Roman" panose="02020603050405020304" pitchFamily="18" charset="0"/>
+                <a:ea typeface="SimSun" panose="02010600030101010101" pitchFamily="2" charset="-122"/>
+              </a:rPr>
+              <a:t>Nicola De Cao, T. K. (2018). </a:t>
+            </a:r>
+            <a:r>
+              <a:rPr lang="en-US" sz="1800" dirty="0">
+                <a:effectLst/>
+                <a:latin typeface="Times New Roman" panose="02020603050405020304" pitchFamily="18" charset="0"/>
+                <a:ea typeface="SimSun" panose="02010600030101010101" pitchFamily="2" charset="-122"/>
+              </a:rPr>
+              <a:t>MolGAN: An Implicit Generative Model for Small Molecular Graphs. Stockholm, Sweden.</a:t>
+            </a:r>
+          </a:p>
+          <a:p>
+            <a:endParaRPr lang="en-US" sz="1800" dirty="0">
+              <a:effectLst/>
+              <a:latin typeface="Times New Roman" panose="02020603050405020304" pitchFamily="18" charset="0"/>
+              <a:ea typeface="SimSun" panose="02010600030101010101" pitchFamily="2" charset="-122"/>
+            </a:endParaRPr>
+          </a:p>
+          <a:p>
+            <a:endParaRPr lang="es-ES" sz="1800" dirty="0">
+              <a:latin typeface="Times New Roman" panose="02020603050405020304" pitchFamily="18" charset="0"/>
+              <a:ea typeface="SimSun" panose="02010600030101010101" pitchFamily="2" charset="-122"/>
+            </a:endParaRPr>
+          </a:p>
+          <a:p>
+            <a:endParaRPr lang="en-US" sz="1800" dirty="0">
+              <a:effectLst/>
+              <a:latin typeface="Times New Roman" panose="02020603050405020304" pitchFamily="18" charset="0"/>
+              <a:ea typeface="SimSun" panose="02010600030101010101" pitchFamily="2" charset="-122"/>
+            </a:endParaRPr>
+          </a:p>
+          <a:p>
+            <a:endParaRPr lang="en-US" sz="1800" dirty="0">
+              <a:effectLst/>
+              <a:latin typeface="Times New Roman" panose="02020603050405020304" pitchFamily="18" charset="0"/>
+              <a:ea typeface="SimSun" panose="02010600030101010101" pitchFamily="2" charset="-122"/>
+            </a:endParaRPr>
+          </a:p>
+          <a:p>
+            <a:endParaRPr lang="en-US" sz="1800" dirty="0">
+              <a:effectLst/>
+              <a:latin typeface="Times New Roman" panose="02020603050405020304" pitchFamily="18" charset="0"/>
+              <a:ea typeface="SimSun" panose="02010600030101010101" pitchFamily="2" charset="-122"/>
+            </a:endParaRPr>
+          </a:p>
+          <a:p>
+            <a:endParaRPr lang="en-US" dirty="0"/>
+          </a:p>
+        </p:txBody>
+      </p:sp>
+    </p:spTree>
+    <p:extLst>
+      <p:ext uri="{BB962C8B-B14F-4D97-AF65-F5344CB8AC3E}">
+        <p14:creationId xmlns:p14="http://schemas.microsoft.com/office/powerpoint/2010/main" val="847440139"/>
       </p:ext>
     </p:extLst>
   </p:cSld>
@@ -5649,8 +7187,8 @@
           </a:p>
         </p:txBody>
       </p:sp>
-      <mc:AlternateContent xmlns:mc="http://schemas.openxmlformats.org/markup-compatibility/2006">
-        <mc:Choice xmlns:a14="http://schemas.microsoft.com/office/drawing/2010/main" Requires="a14">
+      <mc:AlternateContent xmlns:mc="http://schemas.openxmlformats.org/markup-compatibility/2006" xmlns:a14="http://schemas.microsoft.com/office/drawing/2010/main">
+        <mc:Choice Requires="a14">
           <p:sp>
             <p:nvSpPr>
               <p:cNvPr id="3" name="Content Placeholder 2">
@@ -5743,7 +7281,7 @@
             </p:txBody>
           </p:sp>
         </mc:Choice>
-        <mc:Fallback>
+        <mc:Fallback xmlns="">
           <p:sp>
             <p:nvSpPr>
               <p:cNvPr id="3" name="Content Placeholder 2">
@@ -5818,7 +7356,7 @@
           <p:cNvPr id="2" name="Title 1">
             <a:extLst>
               <a:ext uri="{FF2B5EF4-FFF2-40B4-BE49-F238E27FC236}">
-                <a16:creationId xmlns:a16="http://schemas.microsoft.com/office/drawing/2014/main" id="{F1C20DE3-FA25-40C0-B1AD-10D4C014441B}"/>
+                <a16:creationId xmlns:a16="http://schemas.microsoft.com/office/drawing/2014/main" id="{18E5C567-0A59-405B-AF79-73DD210B4E72}"/>
               </a:ext>
             </a:extLst>
           </p:cNvPr>
@@ -5836,7 +7374,7 @@
           <a:p>
             <a:r>
               <a:rPr lang="en-US" dirty="0"/>
-              <a:t>References</a:t>
+              <a:t>Background</a:t>
             </a:r>
           </a:p>
         </p:txBody>
@@ -5846,7 +7384,7 @@
           <p:cNvPr id="3" name="Content Placeholder 2">
             <a:extLst>
               <a:ext uri="{FF2B5EF4-FFF2-40B4-BE49-F238E27FC236}">
-                <a16:creationId xmlns:a16="http://schemas.microsoft.com/office/drawing/2014/main" id="{A6043FFD-EDB8-4B43-8A79-752324CA3720}"/>
+                <a16:creationId xmlns:a16="http://schemas.microsoft.com/office/drawing/2014/main" id="{608BE0E7-1BC3-415D-9816-91A5B8D5ECB6}"/>
               </a:ext>
             </a:extLst>
           </p:cNvPr>
@@ -5859,248 +7397,56 @@
         </p:nvSpPr>
         <p:spPr/>
         <p:txBody>
-          <a:bodyPr>
-            <a:normAutofit fontScale="92500" lnSpcReduction="10000"/>
-          </a:bodyPr>
+          <a:bodyPr/>
           <a:lstStyle/>
           <a:p>
             <a:r>
-              <a:rPr lang="de-DE" sz="1800" dirty="0">
-                <a:effectLst/>
-                <a:latin typeface="Times New Roman" panose="02020603050405020304" pitchFamily="18" charset="0"/>
-                <a:ea typeface="SimSun" panose="02010600030101010101" pitchFamily="2" charset="-122"/>
-              </a:rPr>
-              <a:t>Bickerton, G. R. (2012). </a:t>
-            </a:r>
-            <a:r>
-              <a:rPr lang="en-US" sz="1800" dirty="0">
-                <a:effectLst/>
-                <a:latin typeface="Times New Roman" panose="02020603050405020304" pitchFamily="18" charset="0"/>
-                <a:ea typeface="SimSun" panose="02010600030101010101" pitchFamily="2" charset="-122"/>
-              </a:rPr>
-              <a:t>Quantifying the chemical beauty of drugs.</a:t>
-            </a:r>
-          </a:p>
-          <a:p>
-            <a:r>
-              <a:rPr lang="en-US" sz="1800" dirty="0">
-                <a:effectLst/>
-                <a:latin typeface="Times New Roman" panose="02020603050405020304" pitchFamily="18" charset="0"/>
-                <a:ea typeface="SimSun" panose="02010600030101010101" pitchFamily="2" charset="-122"/>
-              </a:rPr>
-              <a:t>Bidisha, S. (2019). NeVAE: A Deep Generative Model for Molecular Graphs.</a:t>
-            </a:r>
-          </a:p>
-          <a:p>
-            <a:r>
-              <a:rPr lang="en-US" sz="1800" dirty="0">
-                <a:effectLst/>
-                <a:latin typeface="Times New Roman" panose="02020603050405020304" pitchFamily="18" charset="0"/>
-                <a:ea typeface="SimSun" panose="02010600030101010101" pitchFamily="2" charset="-122"/>
-              </a:rPr>
-              <a:t>Comer, J. a. (2001). Lipophiicity profiles: theory and measurement. Zurich, Switzerland.</a:t>
-            </a:r>
-          </a:p>
-          <a:p>
-            <a:r>
-              <a:rPr lang="en-US" sz="1800" dirty="0">
-                <a:effectLst/>
-                <a:latin typeface="Times New Roman" panose="02020603050405020304" pitchFamily="18" charset="0"/>
-                <a:ea typeface="SimSun" panose="02010600030101010101" pitchFamily="2" charset="-122"/>
-              </a:rPr>
-              <a:t>Ertl, P. a. (2009). Estimation of synthetic accessibility score of drug-like molecules based on molecular complexity and fragment contributions. </a:t>
-            </a:r>
-            <a:r>
-              <a:rPr lang="en-US" sz="1800" i="1" dirty="0">
-                <a:effectLst/>
-                <a:latin typeface="Times New Roman" panose="02020603050405020304" pitchFamily="18" charset="0"/>
-                <a:ea typeface="SimSun" panose="02010600030101010101" pitchFamily="2" charset="-122"/>
-              </a:rPr>
-              <a:t>Journal of Cheminformatics</a:t>
-            </a:r>
-            <a:r>
-              <a:rPr lang="en-US" sz="1800" dirty="0">
-                <a:effectLst/>
-                <a:latin typeface="Times New Roman" panose="02020603050405020304" pitchFamily="18" charset="0"/>
-                <a:ea typeface="SimSun" panose="02010600030101010101" pitchFamily="2" charset="-122"/>
-              </a:rPr>
-              <a:t>, 1-8.</a:t>
-            </a:r>
-          </a:p>
-          <a:p>
-            <a:r>
-              <a:rPr lang="en-US" sz="1800" dirty="0">
-                <a:effectLst/>
-                <a:latin typeface="Times New Roman" panose="02020603050405020304" pitchFamily="18" charset="0"/>
-                <a:ea typeface="SimSun" panose="02010600030101010101" pitchFamily="2" charset="-122"/>
-              </a:rPr>
-              <a:t>Phrma. (22 de July de 2024). </a:t>
-            </a:r>
-            <a:r>
-              <a:rPr lang="en-US" sz="1800" i="1" dirty="0">
-                <a:effectLst/>
-                <a:latin typeface="Times New Roman" panose="02020603050405020304" pitchFamily="18" charset="0"/>
-                <a:ea typeface="SimSun" panose="02010600030101010101" pitchFamily="2" charset="-122"/>
-              </a:rPr>
-              <a:t>Research &amp; Development Policy Framework</a:t>
-            </a:r>
-            <a:r>
-              <a:rPr lang="en-US" sz="1800" dirty="0">
-                <a:effectLst/>
-                <a:latin typeface="Times New Roman" panose="02020603050405020304" pitchFamily="18" charset="0"/>
-                <a:ea typeface="SimSun" panose="02010600030101010101" pitchFamily="2" charset="-122"/>
-              </a:rPr>
-              <a:t>. </a:t>
-            </a:r>
-            <a:r>
-              <a:rPr lang="es-ES" sz="1800" dirty="0">
-                <a:effectLst/>
-                <a:latin typeface="Times New Roman" panose="02020603050405020304" pitchFamily="18" charset="0"/>
-                <a:ea typeface="SimSun" panose="02010600030101010101" pitchFamily="2" charset="-122"/>
-              </a:rPr>
-              <a:t>Obtenido de phrma.org: </a:t>
-            </a:r>
-            <a:r>
-              <a:rPr lang="es-ES" sz="1800" dirty="0">
-                <a:effectLst/>
-                <a:latin typeface="Times New Roman" panose="02020603050405020304" pitchFamily="18" charset="0"/>
-                <a:ea typeface="SimSun" panose="02010600030101010101" pitchFamily="2" charset="-122"/>
-                <a:hlinkClick r:id="rId2"/>
-              </a:rPr>
-              <a:t>https://phrma.org/policy-issues/Research-and-Development-Policy-Framework</a:t>
-            </a:r>
-            <a:endParaRPr lang="es-ES" sz="1800" dirty="0">
-              <a:effectLst/>
-              <a:latin typeface="Times New Roman" panose="02020603050405020304" pitchFamily="18" charset="0"/>
-              <a:ea typeface="SimSun" panose="02010600030101010101" pitchFamily="2" charset="-122"/>
-            </a:endParaRPr>
-          </a:p>
-          <a:p>
-            <a:r>
-              <a:rPr lang="es-ES" sz="1800" dirty="0">
-                <a:effectLst/>
-                <a:latin typeface="Times New Roman" panose="02020603050405020304" pitchFamily="18" charset="0"/>
-                <a:ea typeface="SimSun" panose="02010600030101010101" pitchFamily="2" charset="-122"/>
-              </a:rPr>
-              <a:t>RDKit. (2023). </a:t>
-            </a:r>
-            <a:r>
-              <a:rPr lang="es-ES" sz="1800" i="1" dirty="0">
-                <a:effectLst/>
-                <a:latin typeface="Times New Roman" panose="02020603050405020304" pitchFamily="18" charset="0"/>
-                <a:ea typeface="SimSun" panose="02010600030101010101" pitchFamily="2" charset="-122"/>
-              </a:rPr>
-              <a:t>rdkit.Chem.rdMolTransforms module</a:t>
-            </a:r>
-            <a:r>
-              <a:rPr lang="es-ES" sz="1800" dirty="0">
-                <a:effectLst/>
-                <a:latin typeface="Times New Roman" panose="02020603050405020304" pitchFamily="18" charset="0"/>
-                <a:ea typeface="SimSun" panose="02010600030101010101" pitchFamily="2" charset="-122"/>
-              </a:rPr>
-              <a:t>. Obtenido de rdkit.org: https://www.rdkit.org/docs/source/rdkit.Chem.rdMolTransforms.html</a:t>
-            </a:r>
-            <a:endParaRPr lang="en-US" sz="1800" dirty="0">
-              <a:effectLst/>
-              <a:latin typeface="Times New Roman" panose="02020603050405020304" pitchFamily="18" charset="0"/>
-              <a:ea typeface="SimSun" panose="02010600030101010101" pitchFamily="2" charset="-122"/>
-            </a:endParaRPr>
-          </a:p>
-          <a:p>
-            <a:r>
-              <a:rPr lang="en-US" sz="1800" dirty="0">
-                <a:effectLst/>
-                <a:latin typeface="Times New Roman" panose="02020603050405020304" pitchFamily="18" charset="0"/>
-                <a:ea typeface="SimSun" panose="02010600030101010101" pitchFamily="2" charset="-122"/>
-              </a:rPr>
-              <a:t>RDKit. (20 de August de 2024). </a:t>
-            </a:r>
-            <a:r>
-              <a:rPr lang="en-US" sz="1800" i="1" dirty="0">
-                <a:effectLst/>
-                <a:latin typeface="Times New Roman" panose="02020603050405020304" pitchFamily="18" charset="0"/>
-                <a:ea typeface="SimSun" panose="02010600030101010101" pitchFamily="2" charset="-122"/>
-              </a:rPr>
-              <a:t>RDKit: Open-Source Cheminformatics Software</a:t>
-            </a:r>
-            <a:r>
-              <a:rPr lang="en-US" sz="1800" dirty="0">
-                <a:effectLst/>
-                <a:latin typeface="Times New Roman" panose="02020603050405020304" pitchFamily="18" charset="0"/>
-                <a:ea typeface="SimSun" panose="02010600030101010101" pitchFamily="2" charset="-122"/>
-              </a:rPr>
-              <a:t>. </a:t>
-            </a:r>
-            <a:r>
-              <a:rPr lang="es-ES" sz="1800" dirty="0">
-                <a:effectLst/>
-                <a:latin typeface="Times New Roman" panose="02020603050405020304" pitchFamily="18" charset="0"/>
-                <a:ea typeface="SimSun" panose="02010600030101010101" pitchFamily="2" charset="-122"/>
-              </a:rPr>
-              <a:t>Obtenido de rdkit.org: 2024.</a:t>
-            </a:r>
-          </a:p>
-          <a:p>
-            <a:r>
-              <a:rPr lang="es-ES" sz="1800" dirty="0">
-                <a:effectLst/>
-                <a:latin typeface="Times New Roman" panose="02020603050405020304" pitchFamily="18" charset="0"/>
-                <a:ea typeface="SimSun" panose="02010600030101010101" pitchFamily="2" charset="-122"/>
-              </a:rPr>
-              <a:t>Nicola De Cao, T. K. (2018). </a:t>
-            </a:r>
-            <a:r>
-              <a:rPr lang="en-US" sz="1800" dirty="0">
-                <a:effectLst/>
-                <a:latin typeface="Times New Roman" panose="02020603050405020304" pitchFamily="18" charset="0"/>
-                <a:ea typeface="SimSun" panose="02010600030101010101" pitchFamily="2" charset="-122"/>
-              </a:rPr>
-              <a:t>MolGAN: An Implicit Generative Model for Small Molecular Graphs. Stockholm, Sweden.</a:t>
-            </a:r>
-          </a:p>
-          <a:p>
-            <a:endParaRPr lang="en-US" sz="1800" dirty="0">
-              <a:effectLst/>
-              <a:latin typeface="Times New Roman" panose="02020603050405020304" pitchFamily="18" charset="0"/>
-              <a:ea typeface="SimSun" panose="02010600030101010101" pitchFamily="2" charset="-122"/>
-            </a:endParaRPr>
-          </a:p>
-          <a:p>
-            <a:endParaRPr lang="es-ES" sz="1800" dirty="0">
-              <a:latin typeface="Times New Roman" panose="02020603050405020304" pitchFamily="18" charset="0"/>
-              <a:ea typeface="SimSun" panose="02010600030101010101" pitchFamily="2" charset="-122"/>
-            </a:endParaRPr>
-          </a:p>
-          <a:p>
-            <a:endParaRPr lang="en-US" sz="1800" dirty="0">
-              <a:effectLst/>
-              <a:latin typeface="Times New Roman" panose="02020603050405020304" pitchFamily="18" charset="0"/>
-              <a:ea typeface="SimSun" panose="02010600030101010101" pitchFamily="2" charset="-122"/>
-            </a:endParaRPr>
-          </a:p>
-          <a:p>
-            <a:endParaRPr lang="en-US" sz="1800" dirty="0">
-              <a:effectLst/>
-              <a:latin typeface="Times New Roman" panose="02020603050405020304" pitchFamily="18" charset="0"/>
-              <a:ea typeface="SimSun" panose="02010600030101010101" pitchFamily="2" charset="-122"/>
-            </a:endParaRPr>
-          </a:p>
-          <a:p>
-            <a:endParaRPr lang="en-US" sz="1800" dirty="0">
-              <a:effectLst/>
-              <a:latin typeface="Times New Roman" panose="02020603050405020304" pitchFamily="18" charset="0"/>
-              <a:ea typeface="SimSun" panose="02010600030101010101" pitchFamily="2" charset="-122"/>
-            </a:endParaRPr>
-          </a:p>
-          <a:p>
-            <a:endParaRPr lang="en-US" dirty="0"/>
+              <a:rPr lang="en-US" dirty="0"/>
+              <a:t>Designing new drugs is laborious, costly, and yields few new drugs (Badisha, 2019).</a:t>
+            </a:r>
+          </a:p>
+          <a:p>
+            <a:r>
+              <a:rPr lang="en-US" dirty="0"/>
+              <a:t>It can take 10-15 years to develop a single new medicine (Phrma, 2024). </a:t>
+            </a:r>
+          </a:p>
+          <a:p>
+            <a:r>
+              <a:rPr lang="en-US" dirty="0"/>
+              <a:t>It costs an estimated $2.6 billion to create a single new medicine (Phrma, 2024).</a:t>
+            </a:r>
+          </a:p>
+          <a:p>
+            <a:r>
+              <a:rPr lang="en-US" dirty="0"/>
+              <a:t>For the above reasons, synthesizing molecules is a hot topic.</a:t>
+            </a:r>
+          </a:p>
+          <a:p>
+            <a:r>
+              <a:rPr lang="en-US" dirty="0"/>
+              <a:t>What makes it challenging machine learning?</a:t>
+            </a:r>
+          </a:p>
+          <a:p>
+            <a:r>
+              <a:rPr lang="en-US" dirty="0"/>
+              <a:t>- Ordering: Molecular graph syntax </a:t>
+            </a:r>
+          </a:p>
+          <a:p>
+            <a:r>
+              <a:rPr lang="en-US" dirty="0"/>
+              <a:t>- Meaning: Molecular graph semantics </a:t>
+            </a:r>
           </a:p>
         </p:txBody>
       </p:sp>
     </p:spTree>
     <p:extLst>
       <p:ext uri="{BB962C8B-B14F-4D97-AF65-F5344CB8AC3E}">
-        <p14:creationId xmlns:p14="http://schemas.microsoft.com/office/powerpoint/2010/main" val="847440139"/>
+        <p14:creationId xmlns:p14="http://schemas.microsoft.com/office/powerpoint/2010/main" val="2535858136"/>
       </p:ext>
     </p:extLst>
   </p:cSld>
@@ -6132,7 +7478,7 @@
           <p:cNvPr id="2" name="Title 1">
             <a:extLst>
               <a:ext uri="{FF2B5EF4-FFF2-40B4-BE49-F238E27FC236}">
-                <a16:creationId xmlns:a16="http://schemas.microsoft.com/office/drawing/2014/main" id="{18E5C567-0A59-405B-AF79-73DD210B4E72}"/>
+                <a16:creationId xmlns:a16="http://schemas.microsoft.com/office/drawing/2014/main" id="{4A26C9B2-C7EC-4314-B6BB-C8F6EE83E583}"/>
               </a:ext>
             </a:extLst>
           </p:cNvPr>
@@ -6150,7 +7496,7 @@
           <a:p>
             <a:r>
               <a:rPr lang="en-US" dirty="0"/>
-              <a:t>Background</a:t>
+              <a:t>SMILES and a Few Examples</a:t>
             </a:r>
           </a:p>
         </p:txBody>
@@ -6160,7 +7506,7 @@
           <p:cNvPr id="3" name="Content Placeholder 2">
             <a:extLst>
               <a:ext uri="{FF2B5EF4-FFF2-40B4-BE49-F238E27FC236}">
-                <a16:creationId xmlns:a16="http://schemas.microsoft.com/office/drawing/2014/main" id="{608BE0E7-1BC3-415D-9816-91A5B8D5ECB6}"/>
+                <a16:creationId xmlns:a16="http://schemas.microsoft.com/office/drawing/2014/main" id="{6A8B8DE0-1F83-418B-B944-845D9029D120}"/>
               </a:ext>
             </a:extLst>
           </p:cNvPr>
@@ -6173,56 +7519,238 @@
         </p:nvSpPr>
         <p:spPr/>
         <p:txBody>
-          <a:bodyPr/>
+          <a:bodyPr>
+            <a:normAutofit fontScale="77500" lnSpcReduction="20000"/>
+          </a:bodyPr>
           <a:lstStyle/>
           <a:p>
             <a:r>
               <a:rPr lang="en-US" dirty="0"/>
-              <a:t>Designing new drugs is laborious, costly, and yields few new drugs (Badisha, 2019).</a:t>
-            </a:r>
+              <a:t>CC – carbon molecule with single bond </a:t>
+            </a:r>
+          </a:p>
+          <a:p>
+            <a:endParaRPr lang="en-US" dirty="0"/>
           </a:p>
           <a:p>
             <a:r>
               <a:rPr lang="en-US" dirty="0"/>
-              <a:t>It can take 10-15 years to develop a single new medicine (Phrma, 2024). </a:t>
-            </a:r>
+              <a:t>C=C - molecule with a double bond </a:t>
+            </a:r>
+          </a:p>
+          <a:p>
+            <a:endParaRPr lang="en-US" dirty="0"/>
           </a:p>
           <a:p>
             <a:r>
               <a:rPr lang="en-US" dirty="0"/>
-              <a:t>It costs an estimated $2.6 billion to create a single new medicine (Phrma, 2024).</a:t>
-            </a:r>
+              <a:t>C(C)C – a central carbon is bonded to two other carbons (isopropane)</a:t>
+            </a:r>
+          </a:p>
+          <a:p>
+            <a:endParaRPr lang="en-US" dirty="0"/>
           </a:p>
           <a:p>
             <a:r>
               <a:rPr lang="en-US" dirty="0"/>
-              <a:t>For the above reasons, synthesizing molecules is a hot topic.</a:t>
-            </a:r>
+              <a:t>c1ccccc1 – a ring of six carbons (ring and ring closure denoted by 1), lowercase represents aromatic carbons with a ring closure (Benzene)</a:t>
+            </a:r>
+          </a:p>
+          <a:p>
+            <a:endParaRPr lang="en-US" dirty="0"/>
+          </a:p>
+          <a:p>
+            <a:endParaRPr lang="en-US" dirty="0"/>
           </a:p>
           <a:p>
             <a:r>
               <a:rPr lang="en-US" dirty="0"/>
-              <a:t>What makes it challenging machine learning?</a:t>
-            </a:r>
-          </a:p>
-          <a:p>
+              <a:t>CC(=O)O – A two carbon chain with one carbon double-bonded to a single oxygen atom which is bonded by an OH pair</a:t>
+            </a:r>
+          </a:p>
+          <a:p>
+            <a:pPr marL="0" indent="0">
+              <a:buNone/>
+            </a:pPr>
             <a:r>
               <a:rPr lang="en-US" dirty="0"/>
-              <a:t>- Ordering: Molecular graph syntax </a:t>
-            </a:r>
-          </a:p>
-          <a:p>
-            <a:r>
-              <a:rPr lang="en-US" dirty="0"/>
-              <a:t>- Meaning: Molecular graph semantics </a:t>
-            </a:r>
-          </a:p>
-        </p:txBody>
-      </p:sp>
+              <a:t>  </a:t>
+            </a:r>
+          </a:p>
+          <a:p>
+            <a:pPr marL="0" indent="0">
+              <a:buNone/>
+            </a:pPr>
+            <a:endParaRPr lang="en-US" dirty="0"/>
+          </a:p>
+          <a:p>
+            <a:pPr marL="0" indent="0">
+              <a:buNone/>
+            </a:pPr>
+            <a:endParaRPr lang="en-US" dirty="0"/>
+          </a:p>
+          <a:p>
+            <a:endParaRPr lang="en-US" dirty="0"/>
+          </a:p>
+          <a:p>
+            <a:endParaRPr lang="en-US" dirty="0"/>
+          </a:p>
+        </p:txBody>
+      </p:sp>
+      <p:pic>
+        <p:nvPicPr>
+          <p:cNvPr id="5" name="Picture 4">
+            <a:extLst>
+              <a:ext uri="{FF2B5EF4-FFF2-40B4-BE49-F238E27FC236}">
+                <a16:creationId xmlns:a16="http://schemas.microsoft.com/office/drawing/2014/main" id="{3616219A-954D-42A7-AC22-F2DD6EF65680}"/>
+              </a:ext>
+            </a:extLst>
+          </p:cNvPr>
+          <p:cNvPicPr>
+            <a:picLocks noChangeAspect="1"/>
+          </p:cNvPicPr>
+          <p:nvPr/>
+        </p:nvPicPr>
+        <p:blipFill>
+          <a:blip r:embed="rId2"/>
+          <a:stretch>
+            <a:fillRect/>
+          </a:stretch>
+        </p:blipFill>
+        <p:spPr>
+          <a:xfrm>
+            <a:off x="4288380" y="1845734"/>
+            <a:ext cx="1964907" cy="302183"/>
+          </a:xfrm>
+          <a:prstGeom prst="rect">
+            <a:avLst/>
+          </a:prstGeom>
+        </p:spPr>
+      </p:pic>
+      <p:pic>
+        <p:nvPicPr>
+          <p:cNvPr id="7" name="Picture 6">
+            <a:extLst>
+              <a:ext uri="{FF2B5EF4-FFF2-40B4-BE49-F238E27FC236}">
+                <a16:creationId xmlns:a16="http://schemas.microsoft.com/office/drawing/2014/main" id="{C0DA17A5-3522-416D-88C7-11C3141DC960}"/>
+              </a:ext>
+            </a:extLst>
+          </p:cNvPr>
+          <p:cNvPicPr>
+            <a:picLocks noChangeAspect="1"/>
+          </p:cNvPicPr>
+          <p:nvPr/>
+        </p:nvPicPr>
+        <p:blipFill>
+          <a:blip r:embed="rId3"/>
+          <a:stretch>
+            <a:fillRect/>
+          </a:stretch>
+        </p:blipFill>
+        <p:spPr>
+          <a:xfrm>
+            <a:off x="7087728" y="2390274"/>
+            <a:ext cx="1964907" cy="447153"/>
+          </a:xfrm>
+          <a:prstGeom prst="rect">
+            <a:avLst/>
+          </a:prstGeom>
+        </p:spPr>
+      </p:pic>
+      <p:pic>
+        <p:nvPicPr>
+          <p:cNvPr id="9" name="Picture 8">
+            <a:extLst>
+              <a:ext uri="{FF2B5EF4-FFF2-40B4-BE49-F238E27FC236}">
+                <a16:creationId xmlns:a16="http://schemas.microsoft.com/office/drawing/2014/main" id="{B5DB2C83-C671-40B5-BDEA-82EEFF6930A0}"/>
+              </a:ext>
+            </a:extLst>
+          </p:cNvPr>
+          <p:cNvPicPr>
+            <a:picLocks noChangeAspect="1"/>
+          </p:cNvPicPr>
+          <p:nvPr/>
+        </p:nvPicPr>
+        <p:blipFill>
+          <a:blip r:embed="rId4"/>
+          <a:stretch>
+            <a:fillRect/>
+          </a:stretch>
+        </p:blipFill>
+        <p:spPr>
+          <a:xfrm>
+            <a:off x="7087728" y="2970943"/>
+            <a:ext cx="1964907" cy="691708"/>
+          </a:xfrm>
+          <a:prstGeom prst="rect">
+            <a:avLst/>
+          </a:prstGeom>
+        </p:spPr>
+      </p:pic>
+      <p:pic>
+        <p:nvPicPr>
+          <p:cNvPr id="11" name="Picture 10">
+            <a:extLst>
+              <a:ext uri="{FF2B5EF4-FFF2-40B4-BE49-F238E27FC236}">
+                <a16:creationId xmlns:a16="http://schemas.microsoft.com/office/drawing/2014/main" id="{D6805D68-3833-4E66-8D6D-60A49544B1E1}"/>
+              </a:ext>
+            </a:extLst>
+          </p:cNvPr>
+          <p:cNvPicPr>
+            <a:picLocks noChangeAspect="1"/>
+          </p:cNvPicPr>
+          <p:nvPr/>
+        </p:nvPicPr>
+        <p:blipFill>
+          <a:blip r:embed="rId5"/>
+          <a:stretch>
+            <a:fillRect/>
+          </a:stretch>
+        </p:blipFill>
+        <p:spPr>
+          <a:xfrm>
+            <a:off x="2943727" y="4244244"/>
+            <a:ext cx="911139" cy="787210"/>
+          </a:xfrm>
+          <a:prstGeom prst="rect">
+            <a:avLst/>
+          </a:prstGeom>
+        </p:spPr>
+      </p:pic>
+      <p:pic>
+        <p:nvPicPr>
+          <p:cNvPr id="13" name="Picture 12">
+            <a:extLst>
+              <a:ext uri="{FF2B5EF4-FFF2-40B4-BE49-F238E27FC236}">
+                <a16:creationId xmlns:a16="http://schemas.microsoft.com/office/drawing/2014/main" id="{AC06916F-2638-46A1-A94E-EBB5C039DBE9}"/>
+              </a:ext>
+            </a:extLst>
+          </p:cNvPr>
+          <p:cNvPicPr>
+            <a:picLocks noChangeAspect="1"/>
+          </p:cNvPicPr>
+          <p:nvPr/>
+        </p:nvPicPr>
+        <p:blipFill>
+          <a:blip r:embed="rId6"/>
+          <a:stretch>
+            <a:fillRect/>
+          </a:stretch>
+        </p:blipFill>
+        <p:spPr>
+          <a:xfrm>
+            <a:off x="11094720" y="4796749"/>
+            <a:ext cx="943603" cy="817656"/>
+          </a:xfrm>
+          <a:prstGeom prst="rect">
+            <a:avLst/>
+          </a:prstGeom>
+        </p:spPr>
+      </p:pic>
     </p:spTree>
     <p:extLst>
       <p:ext uri="{BB962C8B-B14F-4D97-AF65-F5344CB8AC3E}">
-        <p14:creationId xmlns:p14="http://schemas.microsoft.com/office/powerpoint/2010/main" val="2535858136"/>
+        <p14:creationId xmlns:p14="http://schemas.microsoft.com/office/powerpoint/2010/main" val="1061856342"/>
       </p:ext>
     </p:extLst>
   </p:cSld>
@@ -6254,7 +7782,7 @@
           <p:cNvPr id="2" name="Title 1">
             <a:extLst>
               <a:ext uri="{FF2B5EF4-FFF2-40B4-BE49-F238E27FC236}">
-                <a16:creationId xmlns:a16="http://schemas.microsoft.com/office/drawing/2014/main" id="{4A26C9B2-C7EC-4314-B6BB-C8F6EE83E583}"/>
+                <a16:creationId xmlns:a16="http://schemas.microsoft.com/office/drawing/2014/main" id="{5F7DE382-FB61-4187-9749-210F690C9CE8}"/>
               </a:ext>
             </a:extLst>
           </p:cNvPr>
@@ -6272,7 +7800,7 @@
           <a:p>
             <a:r>
               <a:rPr lang="en-US" dirty="0"/>
-              <a:t>SMILES and a Few Examples</a:t>
+              <a:t>Related Work</a:t>
             </a:r>
           </a:p>
         </p:txBody>
@@ -6282,7 +7810,7 @@
           <p:cNvPr id="3" name="Content Placeholder 2">
             <a:extLst>
               <a:ext uri="{FF2B5EF4-FFF2-40B4-BE49-F238E27FC236}">
-                <a16:creationId xmlns:a16="http://schemas.microsoft.com/office/drawing/2014/main" id="{6A8B8DE0-1F83-418B-B944-845D9029D120}"/>
+                <a16:creationId xmlns:a16="http://schemas.microsoft.com/office/drawing/2014/main" id="{36866AD6-80F6-44E3-8798-1C18D6A4A139}"/>
               </a:ext>
             </a:extLst>
           </p:cNvPr>
@@ -6296,66 +7824,33 @@
         <p:spPr/>
         <p:txBody>
           <a:bodyPr>
-            <a:normAutofit lnSpcReduction="10000"/>
+            <a:normAutofit fontScale="85000" lnSpcReduction="10000"/>
           </a:bodyPr>
           <a:lstStyle/>
           <a:p>
             <a:r>
               <a:rPr lang="en-US" dirty="0"/>
-              <a:t>C – Single carbon atom</a:t>
+              <a:t>NeVAE – this work combines GCNs to capture local molecular graph structures. It uses the latent space representation to create a Gaussian distribution from which samples are drawn. This representation captures the underlying structure of a molecule. In addition, hierarchical decoding is used for scaffold generation (backbone) followed by fine decoding (domain expertise) to ensure a finer more detailed and valid molecule generation. The training uses reconstruction loss paired with KL divergence to regularize for latent space distribution (Badisha, 2019).</a:t>
             </a:r>
           </a:p>
           <a:p>
             <a:r>
               <a:rPr lang="en-US" dirty="0"/>
-              <a:t>CC - molecule with a single bond (also be written C-C – not usually)</a:t>
+              <a:t>MolGAN – is a generative adversarial approach that does not explicitly define a probability distribution of molecular graphs but instead directly generates a graphs using the a neural network (Nicola De Cao, 2018). The generator takes a noise vector, and outputs a molecular graph as an adjacency matrix along with a feature matrix. The network is trained adversarial, with a generator generating molecules, and a discriminator classifying molecules. An additional deep reinforcement mechanism is used to explicitly reinforce positive properties, such as, solubility, druglikeness, and synthesizability (Nicola De Cao, 2018). </a:t>
             </a:r>
           </a:p>
           <a:p>
             <a:r>
               <a:rPr lang="en-US" dirty="0"/>
-              <a:t>C(C)C – a central carbon is bonded to two other carbons (isopropane)</a:t>
-            </a:r>
-          </a:p>
-          <a:p>
-            <a:r>
-              <a:rPr lang="en-US" dirty="0"/>
-              <a:t>c1ccccc1 – a ring of six carbons (ring and ring closure denoted by 1), lowercase represents aromatic carbons with a ring closure (Benzene)</a:t>
-            </a:r>
-          </a:p>
-          <a:p>
-            <a:r>
-              <a:rPr lang="en-US" dirty="0"/>
-              <a:t>CC(=O)O – A two carbon chain with one carbon double-bonded to a single oxygen atom which is bonded by an OH pair</a:t>
-            </a:r>
-          </a:p>
-          <a:p>
-            <a:endParaRPr lang="en-US" dirty="0"/>
-          </a:p>
-          <a:p>
-            <a:r>
-              <a:rPr lang="en-US" dirty="0"/>
-              <a:t>TBD Some example pictures</a:t>
-            </a:r>
-          </a:p>
-          <a:p>
-            <a:r>
-              <a:rPr lang="en-US" dirty="0"/>
-              <a:t>  </a:t>
-            </a:r>
-          </a:p>
-          <a:p>
-            <a:endParaRPr lang="en-US" dirty="0"/>
-          </a:p>
-          <a:p>
-            <a:endParaRPr lang="en-US" dirty="0"/>
+              <a:t>Summary: Overall, these networks performed well, but there are many problems that still need attention. One problem for both methods are how to effectively synthesize larger more complex molecules. For MolGAN, mode collapse is a challenge, where the network can only generate a small set of molecules that are not diverse. Furthermore, reinforcement learning optimization adds another layer of complexity, since reinforcement algorithms can also be unstable. </a:t>
+            </a:r>
           </a:p>
         </p:txBody>
       </p:sp>
     </p:spTree>
     <p:extLst>
       <p:ext uri="{BB962C8B-B14F-4D97-AF65-F5344CB8AC3E}">
-        <p14:creationId xmlns:p14="http://schemas.microsoft.com/office/powerpoint/2010/main" val="1061856342"/>
+        <p14:creationId xmlns:p14="http://schemas.microsoft.com/office/powerpoint/2010/main" val="935595663"/>
       </p:ext>
     </p:extLst>
   </p:cSld>
@@ -6387,7 +7882,7 @@
           <p:cNvPr id="2" name="Title 1">
             <a:extLst>
               <a:ext uri="{FF2B5EF4-FFF2-40B4-BE49-F238E27FC236}">
-                <a16:creationId xmlns:a16="http://schemas.microsoft.com/office/drawing/2014/main" id="{5F7DE382-FB61-4187-9749-210F690C9CE8}"/>
+                <a16:creationId xmlns:a16="http://schemas.microsoft.com/office/drawing/2014/main" id="{4BD0C1FC-564D-4B9F-B736-975B8D161A8A}"/>
               </a:ext>
             </a:extLst>
           </p:cNvPr>
@@ -6405,7 +7900,7 @@
           <a:p>
             <a:r>
               <a:rPr lang="en-US" dirty="0"/>
-              <a:t>Related Work</a:t>
+              <a:t>Data </a:t>
             </a:r>
           </a:p>
         </p:txBody>
@@ -6415,7 +7910,7 @@
           <p:cNvPr id="3" name="Content Placeholder 2">
             <a:extLst>
               <a:ext uri="{FF2B5EF4-FFF2-40B4-BE49-F238E27FC236}">
-                <a16:creationId xmlns:a16="http://schemas.microsoft.com/office/drawing/2014/main" id="{36866AD6-80F6-44E3-8798-1C18D6A4A139}"/>
+                <a16:creationId xmlns:a16="http://schemas.microsoft.com/office/drawing/2014/main" id="{7112D902-67A8-4FF5-A9CF-D6157C5C49CD}"/>
               </a:ext>
             </a:extLst>
           </p:cNvPr>
@@ -6433,13 +7928,1464 @@
           <a:p>
             <a:r>
               <a:rPr lang="en-US" dirty="0"/>
-              <a:t>NeVAE – this work combines GCNs to capture local molecular graph structures. It uses the latent space representation to create a Gaussian distribution from which samples are drawn. This representation captures the underlying structure of a molecule. In addition, hierarchical decoding is used for scaffold generation (backbone) followed by fine decoding (domain expertise) to ensure a finer more detailed and valid molecule generation. The training uses reconstruction loss paired with KL divergence to regularize for latent space distribution (Badisha, 2019) .</a:t>
+              <a:t>Full Dataset: 250K SMILES strings from RDKit API/Database</a:t>
             </a:r>
           </a:p>
           <a:p>
             <a:r>
               <a:rPr lang="en-US" dirty="0"/>
-              <a:t>MolGAN  - </a:t>
+              <a:t>Train Dataset: 25K randomly sampled from Full Dataset</a:t>
+            </a:r>
+          </a:p>
+          <a:p>
+            <a:r>
+              <a:rPr lang="en-US" dirty="0"/>
+              <a:t>Each sample is represented as a string. </a:t>
+            </a:r>
+          </a:p>
+        </p:txBody>
+      </p:sp>
+      <p:pic>
+        <p:nvPicPr>
+          <p:cNvPr id="4" name="Picture 3">
+            <a:extLst>
+              <a:ext uri="{FF2B5EF4-FFF2-40B4-BE49-F238E27FC236}">
+                <a16:creationId xmlns:a16="http://schemas.microsoft.com/office/drawing/2014/main" id="{22DC1E91-14BC-4365-B2F6-6B7457D92E5F}"/>
+              </a:ext>
+            </a:extLst>
+          </p:cNvPr>
+          <p:cNvPicPr/>
+          <p:nvPr/>
+        </p:nvPicPr>
+        <p:blipFill>
+          <a:blip r:embed="rId2"/>
+          <a:stretch>
+            <a:fillRect/>
+          </a:stretch>
+        </p:blipFill>
+        <p:spPr>
+          <a:xfrm>
+            <a:off x="489916" y="3790315"/>
+            <a:ext cx="3203960" cy="1628398"/>
+          </a:xfrm>
+          <a:prstGeom prst="rect">
+            <a:avLst/>
+          </a:prstGeom>
+        </p:spPr>
+      </p:pic>
+      <p:pic>
+        <p:nvPicPr>
+          <p:cNvPr id="6" name="Picture 5">
+            <a:extLst>
+              <a:ext uri="{FF2B5EF4-FFF2-40B4-BE49-F238E27FC236}">
+                <a16:creationId xmlns:a16="http://schemas.microsoft.com/office/drawing/2014/main" id="{AFA5D7AB-5E30-4DCE-82D3-C06758519D4A}"/>
+              </a:ext>
+            </a:extLst>
+          </p:cNvPr>
+          <p:cNvPicPr>
+            <a:picLocks noChangeAspect="1"/>
+          </p:cNvPicPr>
+          <p:nvPr/>
+        </p:nvPicPr>
+        <p:blipFill>
+          <a:blip r:embed="rId3"/>
+          <a:stretch>
+            <a:fillRect/>
+          </a:stretch>
+        </p:blipFill>
+        <p:spPr>
+          <a:xfrm>
+            <a:off x="4096215" y="3790742"/>
+            <a:ext cx="1725865" cy="1651851"/>
+          </a:xfrm>
+          <a:prstGeom prst="rect">
+            <a:avLst/>
+          </a:prstGeom>
+        </p:spPr>
+      </p:pic>
+      <p:pic>
+        <p:nvPicPr>
+          <p:cNvPr id="8" name="Picture 7">
+            <a:extLst>
+              <a:ext uri="{FF2B5EF4-FFF2-40B4-BE49-F238E27FC236}">
+                <a16:creationId xmlns:a16="http://schemas.microsoft.com/office/drawing/2014/main" id="{41162148-2120-4C6C-BB43-7803EEA1AA87}"/>
+              </a:ext>
+            </a:extLst>
+          </p:cNvPr>
+          <p:cNvPicPr>
+            <a:picLocks noChangeAspect="1"/>
+          </p:cNvPicPr>
+          <p:nvPr/>
+        </p:nvPicPr>
+        <p:blipFill>
+          <a:blip r:embed="rId4"/>
+          <a:stretch>
+            <a:fillRect/>
+          </a:stretch>
+        </p:blipFill>
+        <p:spPr>
+          <a:xfrm>
+            <a:off x="6224419" y="3778587"/>
+            <a:ext cx="2579117" cy="1651851"/>
+          </a:xfrm>
+          <a:prstGeom prst="rect">
+            <a:avLst/>
+          </a:prstGeom>
+        </p:spPr>
+      </p:pic>
+      <p:pic>
+        <p:nvPicPr>
+          <p:cNvPr id="10" name="Picture 9">
+            <a:extLst>
+              <a:ext uri="{FF2B5EF4-FFF2-40B4-BE49-F238E27FC236}">
+                <a16:creationId xmlns:a16="http://schemas.microsoft.com/office/drawing/2014/main" id="{F378D7EA-AE18-422C-B763-C79DB0B4EC44}"/>
+              </a:ext>
+            </a:extLst>
+          </p:cNvPr>
+          <p:cNvPicPr>
+            <a:picLocks noChangeAspect="1"/>
+          </p:cNvPicPr>
+          <p:nvPr/>
+        </p:nvPicPr>
+        <p:blipFill>
+          <a:blip r:embed="rId5"/>
+          <a:stretch>
+            <a:fillRect/>
+          </a:stretch>
+        </p:blipFill>
+        <p:spPr>
+          <a:xfrm>
+            <a:off x="9205875" y="3790314"/>
+            <a:ext cx="2585421" cy="1628399"/>
+          </a:xfrm>
+          <a:prstGeom prst="rect">
+            <a:avLst/>
+          </a:prstGeom>
+        </p:spPr>
+      </p:pic>
+      <p:sp>
+        <p:nvSpPr>
+          <p:cNvPr id="11" name="TextBox 10">
+            <a:extLst>
+              <a:ext uri="{FF2B5EF4-FFF2-40B4-BE49-F238E27FC236}">
+                <a16:creationId xmlns:a16="http://schemas.microsoft.com/office/drawing/2014/main" id="{9C24322A-7402-49E8-B629-FFF0F41B31B6}"/>
+              </a:ext>
+            </a:extLst>
+          </p:cNvPr>
+          <p:cNvSpPr txBox="1"/>
+          <p:nvPr/>
+        </p:nvSpPr>
+        <p:spPr>
+          <a:xfrm>
+            <a:off x="646328" y="3393563"/>
+            <a:ext cx="2891136" cy="338554"/>
+          </a:xfrm>
+          <a:prstGeom prst="rect">
+            <a:avLst/>
+          </a:prstGeom>
+          <a:noFill/>
+        </p:spPr>
+        <p:txBody>
+          <a:bodyPr wrap="square" rtlCol="0">
+            <a:spAutoFit/>
+          </a:bodyPr>
+          <a:lstStyle/>
+          <a:p>
+            <a:r>
+              <a:rPr lang="en-US" sz="1600" dirty="0"/>
+              <a:t>Example of Strings From Dataset</a:t>
+            </a:r>
+          </a:p>
+        </p:txBody>
+      </p:sp>
+      <p:sp>
+        <p:nvSpPr>
+          <p:cNvPr id="12" name="TextBox 11">
+            <a:extLst>
+              <a:ext uri="{FF2B5EF4-FFF2-40B4-BE49-F238E27FC236}">
+                <a16:creationId xmlns:a16="http://schemas.microsoft.com/office/drawing/2014/main" id="{5093514C-0BE7-4412-B71E-3F418709567F}"/>
+              </a:ext>
+            </a:extLst>
+          </p:cNvPr>
+          <p:cNvSpPr txBox="1"/>
+          <p:nvPr/>
+        </p:nvSpPr>
+        <p:spPr>
+          <a:xfrm>
+            <a:off x="3900063" y="3380567"/>
+            <a:ext cx="2118167" cy="338554"/>
+          </a:xfrm>
+          <a:prstGeom prst="rect">
+            <a:avLst/>
+          </a:prstGeom>
+          <a:noFill/>
+        </p:spPr>
+        <p:txBody>
+          <a:bodyPr wrap="square" rtlCol="0">
+            <a:spAutoFit/>
+          </a:bodyPr>
+          <a:lstStyle/>
+          <a:p>
+            <a:r>
+              <a:rPr lang="en-US" sz="1600" dirty="0"/>
+              <a:t>Least Complex Example</a:t>
+            </a:r>
+          </a:p>
+        </p:txBody>
+      </p:sp>
+      <p:sp>
+        <p:nvSpPr>
+          <p:cNvPr id="13" name="TextBox 12">
+            <a:extLst>
+              <a:ext uri="{FF2B5EF4-FFF2-40B4-BE49-F238E27FC236}">
+                <a16:creationId xmlns:a16="http://schemas.microsoft.com/office/drawing/2014/main" id="{82BD01D7-6ADF-4664-A7DE-399662A43D0E}"/>
+              </a:ext>
+            </a:extLst>
+          </p:cNvPr>
+          <p:cNvSpPr txBox="1"/>
+          <p:nvPr/>
+        </p:nvSpPr>
+        <p:spPr>
+          <a:xfrm>
+            <a:off x="6224419" y="3393563"/>
+            <a:ext cx="2721712" cy="338554"/>
+          </a:xfrm>
+          <a:prstGeom prst="rect">
+            <a:avLst/>
+          </a:prstGeom>
+          <a:noFill/>
+        </p:spPr>
+        <p:txBody>
+          <a:bodyPr wrap="square" rtlCol="0">
+            <a:spAutoFit/>
+          </a:bodyPr>
+          <a:lstStyle/>
+          <a:p>
+            <a:r>
+              <a:rPr lang="en-US" sz="1600" dirty="0"/>
+              <a:t>Moderately Complex Example</a:t>
+            </a:r>
+          </a:p>
+        </p:txBody>
+      </p:sp>
+      <p:sp>
+        <p:nvSpPr>
+          <p:cNvPr id="14" name="TextBox 13">
+            <a:extLst>
+              <a:ext uri="{FF2B5EF4-FFF2-40B4-BE49-F238E27FC236}">
+                <a16:creationId xmlns:a16="http://schemas.microsoft.com/office/drawing/2014/main" id="{D959522C-DE78-4AAE-BC9F-9384CB48699D}"/>
+              </a:ext>
+            </a:extLst>
+          </p:cNvPr>
+          <p:cNvSpPr txBox="1"/>
+          <p:nvPr/>
+        </p:nvSpPr>
+        <p:spPr>
+          <a:xfrm>
+            <a:off x="9419806" y="3393563"/>
+            <a:ext cx="2331887" cy="338554"/>
+          </a:xfrm>
+          <a:prstGeom prst="rect">
+            <a:avLst/>
+          </a:prstGeom>
+          <a:noFill/>
+        </p:spPr>
+        <p:txBody>
+          <a:bodyPr wrap="square" rtlCol="0">
+            <a:spAutoFit/>
+          </a:bodyPr>
+          <a:lstStyle/>
+          <a:p>
+            <a:r>
+              <a:rPr lang="en-US" sz="1600" dirty="0"/>
+              <a:t>Most Complex Example</a:t>
+            </a:r>
+          </a:p>
+        </p:txBody>
+      </p:sp>
+      <p:graphicFrame>
+        <p:nvGraphicFramePr>
+          <p:cNvPr id="15" name="Table 14">
+            <a:extLst>
+              <a:ext uri="{FF2B5EF4-FFF2-40B4-BE49-F238E27FC236}">
+                <a16:creationId xmlns:a16="http://schemas.microsoft.com/office/drawing/2014/main" id="{FFDB2EB2-3354-4F4E-BE4C-1E71C8EAB2BA}"/>
+              </a:ext>
+            </a:extLst>
+          </p:cNvPr>
+          <p:cNvGraphicFramePr>
+            <a:graphicFrameLocks noGrp="1"/>
+          </p:cNvGraphicFramePr>
+          <p:nvPr>
+            <p:extLst>
+              <p:ext uri="{D42A27DB-BD31-4B8C-83A1-F6EECF244321}">
+                <p14:modId xmlns:p14="http://schemas.microsoft.com/office/powerpoint/2010/main" val="1909433879"/>
+              </p:ext>
+            </p:extLst>
+          </p:nvPr>
+        </p:nvGraphicFramePr>
+        <p:xfrm>
+          <a:off x="8177845" y="1959989"/>
+          <a:ext cx="1434465" cy="1102360"/>
+        </p:xfrm>
+        <a:graphic>
+          <a:graphicData uri="http://schemas.openxmlformats.org/drawingml/2006/table">
+            <a:tbl>
+              <a:tblPr firstRow="1" firstCol="1" bandRow="1"/>
+              <a:tblGrid>
+                <a:gridCol w="732790">
+                  <a:extLst>
+                    <a:ext uri="{9D8B030D-6E8A-4147-A177-3AD203B41FA5}">
+                      <a16:colId xmlns:a16="http://schemas.microsoft.com/office/drawing/2014/main" val="258853199"/>
+                    </a:ext>
+                  </a:extLst>
+                </a:gridCol>
+                <a:gridCol w="701675">
+                  <a:extLst>
+                    <a:ext uri="{9D8B030D-6E8A-4147-A177-3AD203B41FA5}">
+                      <a16:colId xmlns:a16="http://schemas.microsoft.com/office/drawing/2014/main" val="1625542555"/>
+                    </a:ext>
+                  </a:extLst>
+                </a:gridCol>
+              </a:tblGrid>
+              <a:tr h="157480">
+                <a:tc>
+                  <a:txBody>
+                    <a:bodyPr/>
+                    <a:lstStyle/>
+                    <a:p>
+                      <a:pPr marL="0" marR="0" algn="ctr">
+                        <a:lnSpc>
+                          <a:spcPct val="107000"/>
+                        </a:lnSpc>
+                        <a:spcBef>
+                          <a:spcPts val="0"/>
+                        </a:spcBef>
+                        <a:spcAft>
+                          <a:spcPts val="0"/>
+                        </a:spcAft>
+                      </a:pPr>
+                      <a:r>
+                        <a:rPr lang="en-US" sz="800" kern="100">
+                          <a:solidFill>
+                            <a:srgbClr val="000000"/>
+                          </a:solidFill>
+                          <a:effectLst/>
+                          <a:latin typeface="Calibri" panose="020F0502020204030204" pitchFamily="34" charset="0"/>
+                          <a:ea typeface="Times New Roman" panose="02020603050405020304" pitchFamily="18" charset="0"/>
+                        </a:rPr>
+                        <a:t>Single Bond</a:t>
+                      </a:r>
+                      <a:endParaRPr lang="en-US" sz="1000" kern="100">
+                        <a:effectLst/>
+                        <a:latin typeface="Times New Roman" panose="02020603050405020304" pitchFamily="18" charset="0"/>
+                        <a:ea typeface="SimSun" panose="02010600030101010101" pitchFamily="2" charset="-122"/>
+                      </a:endParaRPr>
+                    </a:p>
+                  </a:txBody>
+                  <a:tcPr marL="68580" marR="68580" marT="0" marB="0" anchor="b">
+                    <a:lnL w="12700" cap="flat" cmpd="sng" algn="ctr">
+                      <a:solidFill>
+                        <a:srgbClr val="000000"/>
+                      </a:solidFill>
+                      <a:prstDash val="solid"/>
+                      <a:round/>
+                      <a:headEnd type="none" w="med" len="med"/>
+                      <a:tailEnd type="none" w="med" len="med"/>
+                    </a:lnL>
+                    <a:lnR w="12700" cap="flat" cmpd="sng" algn="ctr">
+                      <a:solidFill>
+                        <a:srgbClr val="000000"/>
+                      </a:solidFill>
+                      <a:prstDash val="solid"/>
+                      <a:round/>
+                      <a:headEnd type="none" w="med" len="med"/>
+                      <a:tailEnd type="none" w="med" len="med"/>
+                    </a:lnR>
+                    <a:lnT w="12700" cap="flat" cmpd="sng" algn="ctr">
+                      <a:solidFill>
+                        <a:srgbClr val="000000"/>
+                      </a:solidFill>
+                      <a:prstDash val="solid"/>
+                      <a:round/>
+                      <a:headEnd type="none" w="med" len="med"/>
+                      <a:tailEnd type="none" w="med" len="med"/>
+                    </a:lnT>
+                    <a:lnB w="12700" cap="flat" cmpd="sng" algn="ctr">
+                      <a:solidFill>
+                        <a:srgbClr val="000000"/>
+                      </a:solidFill>
+                      <a:prstDash val="solid"/>
+                      <a:round/>
+                      <a:headEnd type="none" w="med" len="med"/>
+                      <a:tailEnd type="none" w="med" len="med"/>
+                    </a:lnB>
+                  </a:tcPr>
+                </a:tc>
+                <a:tc>
+                  <a:txBody>
+                    <a:bodyPr/>
+                    <a:lstStyle/>
+                    <a:p>
+                      <a:pPr marL="0" marR="0" algn="ctr">
+                        <a:lnSpc>
+                          <a:spcPct val="107000"/>
+                        </a:lnSpc>
+                        <a:spcBef>
+                          <a:spcPts val="0"/>
+                        </a:spcBef>
+                        <a:spcAft>
+                          <a:spcPts val="0"/>
+                        </a:spcAft>
+                      </a:pPr>
+                      <a:r>
+                        <a:rPr lang="en-US" sz="800" kern="100">
+                          <a:solidFill>
+                            <a:srgbClr val="000000"/>
+                          </a:solidFill>
+                          <a:effectLst/>
+                          <a:latin typeface="Calibri" panose="020F0502020204030204" pitchFamily="34" charset="0"/>
+                          <a:ea typeface="Times New Roman" panose="02020603050405020304" pitchFamily="18" charset="0"/>
+                        </a:rPr>
+                        <a:t>-</a:t>
+                      </a:r>
+                      <a:endParaRPr lang="en-US" sz="1000" kern="100">
+                        <a:effectLst/>
+                        <a:latin typeface="Times New Roman" panose="02020603050405020304" pitchFamily="18" charset="0"/>
+                        <a:ea typeface="SimSun" panose="02010600030101010101" pitchFamily="2" charset="-122"/>
+                      </a:endParaRPr>
+                    </a:p>
+                  </a:txBody>
+                  <a:tcPr marL="68580" marR="68580" marT="0" marB="0" anchor="b">
+                    <a:lnL w="12700" cap="flat" cmpd="sng" algn="ctr">
+                      <a:solidFill>
+                        <a:srgbClr val="000000"/>
+                      </a:solidFill>
+                      <a:prstDash val="solid"/>
+                      <a:round/>
+                      <a:headEnd type="none" w="med" len="med"/>
+                      <a:tailEnd type="none" w="med" len="med"/>
+                    </a:lnL>
+                    <a:lnR w="12700" cap="flat" cmpd="sng" algn="ctr">
+                      <a:solidFill>
+                        <a:srgbClr val="000000"/>
+                      </a:solidFill>
+                      <a:prstDash val="solid"/>
+                      <a:round/>
+                      <a:headEnd type="none" w="med" len="med"/>
+                      <a:tailEnd type="none" w="med" len="med"/>
+                    </a:lnR>
+                    <a:lnT w="12700" cap="flat" cmpd="sng" algn="ctr">
+                      <a:solidFill>
+                        <a:srgbClr val="000000"/>
+                      </a:solidFill>
+                      <a:prstDash val="solid"/>
+                      <a:round/>
+                      <a:headEnd type="none" w="med" len="med"/>
+                      <a:tailEnd type="none" w="med" len="med"/>
+                    </a:lnT>
+                    <a:lnB w="12700" cap="flat" cmpd="sng" algn="ctr">
+                      <a:solidFill>
+                        <a:srgbClr val="000000"/>
+                      </a:solidFill>
+                      <a:prstDash val="solid"/>
+                      <a:round/>
+                      <a:headEnd type="none" w="med" len="med"/>
+                      <a:tailEnd type="none" w="med" len="med"/>
+                    </a:lnB>
+                  </a:tcPr>
+                </a:tc>
+                <a:extLst>
+                  <a:ext uri="{0D108BD9-81ED-4DB2-BD59-A6C34878D82A}">
+                    <a16:rowId xmlns:a16="http://schemas.microsoft.com/office/drawing/2014/main" val="862783004"/>
+                  </a:ext>
+                </a:extLst>
+              </a:tr>
+              <a:tr h="157480">
+                <a:tc>
+                  <a:txBody>
+                    <a:bodyPr/>
+                    <a:lstStyle/>
+                    <a:p>
+                      <a:pPr marL="0" marR="0" algn="ctr">
+                        <a:lnSpc>
+                          <a:spcPct val="107000"/>
+                        </a:lnSpc>
+                        <a:spcBef>
+                          <a:spcPts val="0"/>
+                        </a:spcBef>
+                        <a:spcAft>
+                          <a:spcPts val="0"/>
+                        </a:spcAft>
+                      </a:pPr>
+                      <a:r>
+                        <a:rPr lang="en-US" sz="800" kern="100">
+                          <a:solidFill>
+                            <a:srgbClr val="000000"/>
+                          </a:solidFill>
+                          <a:effectLst/>
+                          <a:latin typeface="Calibri" panose="020F0502020204030204" pitchFamily="34" charset="0"/>
+                          <a:ea typeface="Times New Roman" panose="02020603050405020304" pitchFamily="18" charset="0"/>
+                        </a:rPr>
+                        <a:t>Double Bond</a:t>
+                      </a:r>
+                      <a:endParaRPr lang="en-US" sz="1000" kern="100">
+                        <a:effectLst/>
+                        <a:latin typeface="Times New Roman" panose="02020603050405020304" pitchFamily="18" charset="0"/>
+                        <a:ea typeface="SimSun" panose="02010600030101010101" pitchFamily="2" charset="-122"/>
+                      </a:endParaRPr>
+                    </a:p>
+                  </a:txBody>
+                  <a:tcPr marL="68580" marR="68580" marT="0" marB="0" anchor="b">
+                    <a:lnL w="12700" cap="flat" cmpd="sng" algn="ctr">
+                      <a:solidFill>
+                        <a:srgbClr val="000000"/>
+                      </a:solidFill>
+                      <a:prstDash val="solid"/>
+                      <a:round/>
+                      <a:headEnd type="none" w="med" len="med"/>
+                      <a:tailEnd type="none" w="med" len="med"/>
+                    </a:lnL>
+                    <a:lnR w="12700" cap="flat" cmpd="sng" algn="ctr">
+                      <a:solidFill>
+                        <a:srgbClr val="000000"/>
+                      </a:solidFill>
+                      <a:prstDash val="solid"/>
+                      <a:round/>
+                      <a:headEnd type="none" w="med" len="med"/>
+                      <a:tailEnd type="none" w="med" len="med"/>
+                    </a:lnR>
+                    <a:lnT w="12700" cap="flat" cmpd="sng" algn="ctr">
+                      <a:solidFill>
+                        <a:srgbClr val="000000"/>
+                      </a:solidFill>
+                      <a:prstDash val="solid"/>
+                      <a:round/>
+                      <a:headEnd type="none" w="med" len="med"/>
+                      <a:tailEnd type="none" w="med" len="med"/>
+                    </a:lnT>
+                    <a:lnB w="12700" cap="flat" cmpd="sng" algn="ctr">
+                      <a:solidFill>
+                        <a:srgbClr val="000000"/>
+                      </a:solidFill>
+                      <a:prstDash val="solid"/>
+                      <a:round/>
+                      <a:headEnd type="none" w="med" len="med"/>
+                      <a:tailEnd type="none" w="med" len="med"/>
+                    </a:lnB>
+                    <a:solidFill>
+                      <a:srgbClr val="F2F2F2"/>
+                    </a:solidFill>
+                  </a:tcPr>
+                </a:tc>
+                <a:tc>
+                  <a:txBody>
+                    <a:bodyPr/>
+                    <a:lstStyle/>
+                    <a:p>
+                      <a:pPr marL="0" marR="0" algn="ctr">
+                        <a:lnSpc>
+                          <a:spcPct val="107000"/>
+                        </a:lnSpc>
+                        <a:spcBef>
+                          <a:spcPts val="0"/>
+                        </a:spcBef>
+                        <a:spcAft>
+                          <a:spcPts val="0"/>
+                        </a:spcAft>
+                      </a:pPr>
+                      <a:r>
+                        <a:rPr lang="en-US" sz="800" kern="100">
+                          <a:solidFill>
+                            <a:srgbClr val="000000"/>
+                          </a:solidFill>
+                          <a:effectLst/>
+                          <a:latin typeface="Calibri" panose="020F0502020204030204" pitchFamily="34" charset="0"/>
+                          <a:ea typeface="Times New Roman" panose="02020603050405020304" pitchFamily="18" charset="0"/>
+                        </a:rPr>
+                        <a:t>=</a:t>
+                      </a:r>
+                      <a:endParaRPr lang="en-US" sz="1000" kern="100">
+                        <a:effectLst/>
+                        <a:latin typeface="Times New Roman" panose="02020603050405020304" pitchFamily="18" charset="0"/>
+                        <a:ea typeface="SimSun" panose="02010600030101010101" pitchFamily="2" charset="-122"/>
+                      </a:endParaRPr>
+                    </a:p>
+                  </a:txBody>
+                  <a:tcPr marL="68580" marR="68580" marT="0" marB="0" anchor="b">
+                    <a:lnL w="12700" cap="flat" cmpd="sng" algn="ctr">
+                      <a:solidFill>
+                        <a:srgbClr val="000000"/>
+                      </a:solidFill>
+                      <a:prstDash val="solid"/>
+                      <a:round/>
+                      <a:headEnd type="none" w="med" len="med"/>
+                      <a:tailEnd type="none" w="med" len="med"/>
+                    </a:lnL>
+                    <a:lnR w="12700" cap="flat" cmpd="sng" algn="ctr">
+                      <a:solidFill>
+                        <a:srgbClr val="000000"/>
+                      </a:solidFill>
+                      <a:prstDash val="solid"/>
+                      <a:round/>
+                      <a:headEnd type="none" w="med" len="med"/>
+                      <a:tailEnd type="none" w="med" len="med"/>
+                    </a:lnR>
+                    <a:lnT w="12700" cap="flat" cmpd="sng" algn="ctr">
+                      <a:solidFill>
+                        <a:srgbClr val="000000"/>
+                      </a:solidFill>
+                      <a:prstDash val="solid"/>
+                      <a:round/>
+                      <a:headEnd type="none" w="med" len="med"/>
+                      <a:tailEnd type="none" w="med" len="med"/>
+                    </a:lnT>
+                    <a:lnB w="12700" cap="flat" cmpd="sng" algn="ctr">
+                      <a:solidFill>
+                        <a:srgbClr val="000000"/>
+                      </a:solidFill>
+                      <a:prstDash val="solid"/>
+                      <a:round/>
+                      <a:headEnd type="none" w="med" len="med"/>
+                      <a:tailEnd type="none" w="med" len="med"/>
+                    </a:lnB>
+                    <a:solidFill>
+                      <a:srgbClr val="F2F2F2"/>
+                    </a:solidFill>
+                  </a:tcPr>
+                </a:tc>
+                <a:extLst>
+                  <a:ext uri="{0D108BD9-81ED-4DB2-BD59-A6C34878D82A}">
+                    <a16:rowId xmlns:a16="http://schemas.microsoft.com/office/drawing/2014/main" val="2886872317"/>
+                  </a:ext>
+                </a:extLst>
+              </a:tr>
+              <a:tr h="157480">
+                <a:tc>
+                  <a:txBody>
+                    <a:bodyPr/>
+                    <a:lstStyle/>
+                    <a:p>
+                      <a:pPr marL="0" marR="0" algn="ctr">
+                        <a:lnSpc>
+                          <a:spcPct val="107000"/>
+                        </a:lnSpc>
+                        <a:spcBef>
+                          <a:spcPts val="0"/>
+                        </a:spcBef>
+                        <a:spcAft>
+                          <a:spcPts val="0"/>
+                        </a:spcAft>
+                      </a:pPr>
+                      <a:r>
+                        <a:rPr lang="en-US" sz="800" kern="100">
+                          <a:solidFill>
+                            <a:srgbClr val="000000"/>
+                          </a:solidFill>
+                          <a:effectLst/>
+                          <a:latin typeface="Calibri" panose="020F0502020204030204" pitchFamily="34" charset="0"/>
+                          <a:ea typeface="Times New Roman" panose="02020603050405020304" pitchFamily="18" charset="0"/>
+                        </a:rPr>
+                        <a:t>Triple Bond</a:t>
+                      </a:r>
+                      <a:endParaRPr lang="en-US" sz="1000" kern="100">
+                        <a:effectLst/>
+                        <a:latin typeface="Times New Roman" panose="02020603050405020304" pitchFamily="18" charset="0"/>
+                        <a:ea typeface="SimSun" panose="02010600030101010101" pitchFamily="2" charset="-122"/>
+                      </a:endParaRPr>
+                    </a:p>
+                  </a:txBody>
+                  <a:tcPr marL="68580" marR="68580" marT="0" marB="0" anchor="b">
+                    <a:lnL w="12700" cap="flat" cmpd="sng" algn="ctr">
+                      <a:solidFill>
+                        <a:srgbClr val="000000"/>
+                      </a:solidFill>
+                      <a:prstDash val="solid"/>
+                      <a:round/>
+                      <a:headEnd type="none" w="med" len="med"/>
+                      <a:tailEnd type="none" w="med" len="med"/>
+                    </a:lnL>
+                    <a:lnR w="12700" cap="flat" cmpd="sng" algn="ctr">
+                      <a:solidFill>
+                        <a:srgbClr val="000000"/>
+                      </a:solidFill>
+                      <a:prstDash val="solid"/>
+                      <a:round/>
+                      <a:headEnd type="none" w="med" len="med"/>
+                      <a:tailEnd type="none" w="med" len="med"/>
+                    </a:lnR>
+                    <a:lnT w="12700" cap="flat" cmpd="sng" algn="ctr">
+                      <a:solidFill>
+                        <a:srgbClr val="000000"/>
+                      </a:solidFill>
+                      <a:prstDash val="solid"/>
+                      <a:round/>
+                      <a:headEnd type="none" w="med" len="med"/>
+                      <a:tailEnd type="none" w="med" len="med"/>
+                    </a:lnT>
+                    <a:lnB w="12700" cap="flat" cmpd="sng" algn="ctr">
+                      <a:solidFill>
+                        <a:srgbClr val="000000"/>
+                      </a:solidFill>
+                      <a:prstDash val="solid"/>
+                      <a:round/>
+                      <a:headEnd type="none" w="med" len="med"/>
+                      <a:tailEnd type="none" w="med" len="med"/>
+                    </a:lnB>
+                  </a:tcPr>
+                </a:tc>
+                <a:tc>
+                  <a:txBody>
+                    <a:bodyPr/>
+                    <a:lstStyle/>
+                    <a:p>
+                      <a:pPr marL="0" marR="0" algn="ctr">
+                        <a:lnSpc>
+                          <a:spcPct val="107000"/>
+                        </a:lnSpc>
+                        <a:spcBef>
+                          <a:spcPts val="0"/>
+                        </a:spcBef>
+                        <a:spcAft>
+                          <a:spcPts val="0"/>
+                        </a:spcAft>
+                      </a:pPr>
+                      <a:r>
+                        <a:rPr lang="en-US" sz="800" kern="100">
+                          <a:solidFill>
+                            <a:srgbClr val="000000"/>
+                          </a:solidFill>
+                          <a:effectLst/>
+                          <a:latin typeface="Calibri" panose="020F0502020204030204" pitchFamily="34" charset="0"/>
+                          <a:ea typeface="Times New Roman" panose="02020603050405020304" pitchFamily="18" charset="0"/>
+                        </a:rPr>
+                        <a:t>#</a:t>
+                      </a:r>
+                      <a:endParaRPr lang="en-US" sz="1000" kern="100">
+                        <a:effectLst/>
+                        <a:latin typeface="Times New Roman" panose="02020603050405020304" pitchFamily="18" charset="0"/>
+                        <a:ea typeface="SimSun" panose="02010600030101010101" pitchFamily="2" charset="-122"/>
+                      </a:endParaRPr>
+                    </a:p>
+                  </a:txBody>
+                  <a:tcPr marL="68580" marR="68580" marT="0" marB="0" anchor="b">
+                    <a:lnL w="12700" cap="flat" cmpd="sng" algn="ctr">
+                      <a:solidFill>
+                        <a:srgbClr val="000000"/>
+                      </a:solidFill>
+                      <a:prstDash val="solid"/>
+                      <a:round/>
+                      <a:headEnd type="none" w="med" len="med"/>
+                      <a:tailEnd type="none" w="med" len="med"/>
+                    </a:lnL>
+                    <a:lnR w="12700" cap="flat" cmpd="sng" algn="ctr">
+                      <a:solidFill>
+                        <a:srgbClr val="000000"/>
+                      </a:solidFill>
+                      <a:prstDash val="solid"/>
+                      <a:round/>
+                      <a:headEnd type="none" w="med" len="med"/>
+                      <a:tailEnd type="none" w="med" len="med"/>
+                    </a:lnR>
+                    <a:lnT w="12700" cap="flat" cmpd="sng" algn="ctr">
+                      <a:solidFill>
+                        <a:srgbClr val="000000"/>
+                      </a:solidFill>
+                      <a:prstDash val="solid"/>
+                      <a:round/>
+                      <a:headEnd type="none" w="med" len="med"/>
+                      <a:tailEnd type="none" w="med" len="med"/>
+                    </a:lnT>
+                    <a:lnB w="12700" cap="flat" cmpd="sng" algn="ctr">
+                      <a:solidFill>
+                        <a:srgbClr val="000000"/>
+                      </a:solidFill>
+                      <a:prstDash val="solid"/>
+                      <a:round/>
+                      <a:headEnd type="none" w="med" len="med"/>
+                      <a:tailEnd type="none" w="med" len="med"/>
+                    </a:lnB>
+                  </a:tcPr>
+                </a:tc>
+                <a:extLst>
+                  <a:ext uri="{0D108BD9-81ED-4DB2-BD59-A6C34878D82A}">
+                    <a16:rowId xmlns:a16="http://schemas.microsoft.com/office/drawing/2014/main" val="1021476246"/>
+                  </a:ext>
+                </a:extLst>
+              </a:tr>
+              <a:tr h="157480">
+                <a:tc>
+                  <a:txBody>
+                    <a:bodyPr/>
+                    <a:lstStyle/>
+                    <a:p>
+                      <a:pPr marL="0" marR="0" algn="ctr">
+                        <a:lnSpc>
+                          <a:spcPct val="107000"/>
+                        </a:lnSpc>
+                        <a:spcBef>
+                          <a:spcPts val="0"/>
+                        </a:spcBef>
+                        <a:spcAft>
+                          <a:spcPts val="0"/>
+                        </a:spcAft>
+                      </a:pPr>
+                      <a:r>
+                        <a:rPr lang="en-US" sz="800" kern="100">
+                          <a:solidFill>
+                            <a:srgbClr val="000000"/>
+                          </a:solidFill>
+                          <a:effectLst/>
+                          <a:latin typeface="Calibri" panose="020F0502020204030204" pitchFamily="34" charset="0"/>
+                          <a:ea typeface="Times New Roman" panose="02020603050405020304" pitchFamily="18" charset="0"/>
+                        </a:rPr>
+                        <a:t>Arom. Bond</a:t>
+                      </a:r>
+                      <a:endParaRPr lang="en-US" sz="1000" kern="100">
+                        <a:effectLst/>
+                        <a:latin typeface="Times New Roman" panose="02020603050405020304" pitchFamily="18" charset="0"/>
+                        <a:ea typeface="SimSun" panose="02010600030101010101" pitchFamily="2" charset="-122"/>
+                      </a:endParaRPr>
+                    </a:p>
+                  </a:txBody>
+                  <a:tcPr marL="68580" marR="68580" marT="0" marB="0" anchor="b">
+                    <a:lnL w="12700" cap="flat" cmpd="sng" algn="ctr">
+                      <a:solidFill>
+                        <a:srgbClr val="000000"/>
+                      </a:solidFill>
+                      <a:prstDash val="solid"/>
+                      <a:round/>
+                      <a:headEnd type="none" w="med" len="med"/>
+                      <a:tailEnd type="none" w="med" len="med"/>
+                    </a:lnL>
+                    <a:lnR w="12700" cap="flat" cmpd="sng" algn="ctr">
+                      <a:solidFill>
+                        <a:srgbClr val="000000"/>
+                      </a:solidFill>
+                      <a:prstDash val="solid"/>
+                      <a:round/>
+                      <a:headEnd type="none" w="med" len="med"/>
+                      <a:tailEnd type="none" w="med" len="med"/>
+                    </a:lnR>
+                    <a:lnT w="12700" cap="flat" cmpd="sng" algn="ctr">
+                      <a:solidFill>
+                        <a:srgbClr val="000000"/>
+                      </a:solidFill>
+                      <a:prstDash val="solid"/>
+                      <a:round/>
+                      <a:headEnd type="none" w="med" len="med"/>
+                      <a:tailEnd type="none" w="med" len="med"/>
+                    </a:lnT>
+                    <a:lnB w="12700" cap="flat" cmpd="sng" algn="ctr">
+                      <a:solidFill>
+                        <a:srgbClr val="000000"/>
+                      </a:solidFill>
+                      <a:prstDash val="solid"/>
+                      <a:round/>
+                      <a:headEnd type="none" w="med" len="med"/>
+                      <a:tailEnd type="none" w="med" len="med"/>
+                    </a:lnB>
+                    <a:solidFill>
+                      <a:srgbClr val="F2F2F2"/>
+                    </a:solidFill>
+                  </a:tcPr>
+                </a:tc>
+                <a:tc>
+                  <a:txBody>
+                    <a:bodyPr/>
+                    <a:lstStyle/>
+                    <a:p>
+                      <a:pPr marL="0" marR="0" algn="ctr">
+                        <a:lnSpc>
+                          <a:spcPct val="107000"/>
+                        </a:lnSpc>
+                        <a:spcBef>
+                          <a:spcPts val="0"/>
+                        </a:spcBef>
+                        <a:spcAft>
+                          <a:spcPts val="0"/>
+                        </a:spcAft>
+                      </a:pPr>
+                      <a:r>
+                        <a:rPr lang="en-US" sz="800" kern="100">
+                          <a:solidFill>
+                            <a:srgbClr val="000000"/>
+                          </a:solidFill>
+                          <a:effectLst/>
+                          <a:latin typeface="Calibri" panose="020F0502020204030204" pitchFamily="34" charset="0"/>
+                          <a:ea typeface="Times New Roman" panose="02020603050405020304" pitchFamily="18" charset="0"/>
+                        </a:rPr>
+                        <a:t>:</a:t>
+                      </a:r>
+                      <a:endParaRPr lang="en-US" sz="1000" kern="100">
+                        <a:effectLst/>
+                        <a:latin typeface="Times New Roman" panose="02020603050405020304" pitchFamily="18" charset="0"/>
+                        <a:ea typeface="SimSun" panose="02010600030101010101" pitchFamily="2" charset="-122"/>
+                      </a:endParaRPr>
+                    </a:p>
+                  </a:txBody>
+                  <a:tcPr marL="68580" marR="68580" marT="0" marB="0" anchor="b">
+                    <a:lnL w="12700" cap="flat" cmpd="sng" algn="ctr">
+                      <a:solidFill>
+                        <a:srgbClr val="000000"/>
+                      </a:solidFill>
+                      <a:prstDash val="solid"/>
+                      <a:round/>
+                      <a:headEnd type="none" w="med" len="med"/>
+                      <a:tailEnd type="none" w="med" len="med"/>
+                    </a:lnL>
+                    <a:lnR w="12700" cap="flat" cmpd="sng" algn="ctr">
+                      <a:solidFill>
+                        <a:srgbClr val="000000"/>
+                      </a:solidFill>
+                      <a:prstDash val="solid"/>
+                      <a:round/>
+                      <a:headEnd type="none" w="med" len="med"/>
+                      <a:tailEnd type="none" w="med" len="med"/>
+                    </a:lnR>
+                    <a:lnT w="12700" cap="flat" cmpd="sng" algn="ctr">
+                      <a:solidFill>
+                        <a:srgbClr val="000000"/>
+                      </a:solidFill>
+                      <a:prstDash val="solid"/>
+                      <a:round/>
+                      <a:headEnd type="none" w="med" len="med"/>
+                      <a:tailEnd type="none" w="med" len="med"/>
+                    </a:lnT>
+                    <a:lnB w="12700" cap="flat" cmpd="sng" algn="ctr">
+                      <a:solidFill>
+                        <a:srgbClr val="000000"/>
+                      </a:solidFill>
+                      <a:prstDash val="solid"/>
+                      <a:round/>
+                      <a:headEnd type="none" w="med" len="med"/>
+                      <a:tailEnd type="none" w="med" len="med"/>
+                    </a:lnB>
+                    <a:solidFill>
+                      <a:srgbClr val="F2F2F2"/>
+                    </a:solidFill>
+                  </a:tcPr>
+                </a:tc>
+                <a:extLst>
+                  <a:ext uri="{0D108BD9-81ED-4DB2-BD59-A6C34878D82A}">
+                    <a16:rowId xmlns:a16="http://schemas.microsoft.com/office/drawing/2014/main" val="4057235985"/>
+                  </a:ext>
+                </a:extLst>
+              </a:tr>
+              <a:tr h="157480">
+                <a:tc>
+                  <a:txBody>
+                    <a:bodyPr/>
+                    <a:lstStyle/>
+                    <a:p>
+                      <a:pPr marL="0" marR="0" algn="ctr">
+                        <a:lnSpc>
+                          <a:spcPct val="107000"/>
+                        </a:lnSpc>
+                        <a:spcBef>
+                          <a:spcPts val="0"/>
+                        </a:spcBef>
+                        <a:spcAft>
+                          <a:spcPts val="0"/>
+                        </a:spcAft>
+                      </a:pPr>
+                      <a:r>
+                        <a:rPr lang="en-US" sz="800" kern="100" dirty="0">
+                          <a:solidFill>
+                            <a:srgbClr val="000000"/>
+                          </a:solidFill>
+                          <a:effectLst/>
+                          <a:latin typeface="Calibri" panose="020F0502020204030204" pitchFamily="34" charset="0"/>
+                          <a:ea typeface="Times New Roman" panose="02020603050405020304" pitchFamily="18" charset="0"/>
+                        </a:rPr>
+                        <a:t>Pos. Charge</a:t>
+                      </a:r>
+                      <a:endParaRPr lang="en-US" sz="1000" kern="100" dirty="0">
+                        <a:effectLst/>
+                        <a:latin typeface="Times New Roman" panose="02020603050405020304" pitchFamily="18" charset="0"/>
+                        <a:ea typeface="SimSun" panose="02010600030101010101" pitchFamily="2" charset="-122"/>
+                      </a:endParaRPr>
+                    </a:p>
+                  </a:txBody>
+                  <a:tcPr marL="68580" marR="68580" marT="0" marB="0" anchor="b">
+                    <a:lnL w="12700" cap="flat" cmpd="sng" algn="ctr">
+                      <a:solidFill>
+                        <a:srgbClr val="000000"/>
+                      </a:solidFill>
+                      <a:prstDash val="solid"/>
+                      <a:round/>
+                      <a:headEnd type="none" w="med" len="med"/>
+                      <a:tailEnd type="none" w="med" len="med"/>
+                    </a:lnL>
+                    <a:lnR w="12700" cap="flat" cmpd="sng" algn="ctr">
+                      <a:solidFill>
+                        <a:srgbClr val="000000"/>
+                      </a:solidFill>
+                      <a:prstDash val="solid"/>
+                      <a:round/>
+                      <a:headEnd type="none" w="med" len="med"/>
+                      <a:tailEnd type="none" w="med" len="med"/>
+                    </a:lnR>
+                    <a:lnT w="12700" cap="flat" cmpd="sng" algn="ctr">
+                      <a:solidFill>
+                        <a:srgbClr val="000000"/>
+                      </a:solidFill>
+                      <a:prstDash val="solid"/>
+                      <a:round/>
+                      <a:headEnd type="none" w="med" len="med"/>
+                      <a:tailEnd type="none" w="med" len="med"/>
+                    </a:lnT>
+                    <a:lnB w="12700" cap="flat" cmpd="sng" algn="ctr">
+                      <a:solidFill>
+                        <a:srgbClr val="000000"/>
+                      </a:solidFill>
+                      <a:prstDash val="solid"/>
+                      <a:round/>
+                      <a:headEnd type="none" w="med" len="med"/>
+                      <a:tailEnd type="none" w="med" len="med"/>
+                    </a:lnB>
+                  </a:tcPr>
+                </a:tc>
+                <a:tc>
+                  <a:txBody>
+                    <a:bodyPr/>
+                    <a:lstStyle/>
+                    <a:p>
+                      <a:pPr marL="0" marR="0" algn="ctr">
+                        <a:lnSpc>
+                          <a:spcPct val="107000"/>
+                        </a:lnSpc>
+                        <a:spcBef>
+                          <a:spcPts val="0"/>
+                        </a:spcBef>
+                        <a:spcAft>
+                          <a:spcPts val="0"/>
+                        </a:spcAft>
+                      </a:pPr>
+                      <a:r>
+                        <a:rPr lang="en-US" sz="800" kern="100" dirty="0">
+                          <a:solidFill>
+                            <a:srgbClr val="000000"/>
+                          </a:solidFill>
+                          <a:effectLst/>
+                          <a:latin typeface="Calibri" panose="020F0502020204030204" pitchFamily="34" charset="0"/>
+                          <a:ea typeface="Times New Roman" panose="02020603050405020304" pitchFamily="18" charset="0"/>
+                        </a:rPr>
+                        <a:t>[C+]</a:t>
+                      </a:r>
+                      <a:endParaRPr lang="en-US" sz="1000" kern="100" dirty="0">
+                        <a:effectLst/>
+                        <a:latin typeface="Times New Roman" panose="02020603050405020304" pitchFamily="18" charset="0"/>
+                        <a:ea typeface="SimSun" panose="02010600030101010101" pitchFamily="2" charset="-122"/>
+                      </a:endParaRPr>
+                    </a:p>
+                  </a:txBody>
+                  <a:tcPr marL="68580" marR="68580" marT="0" marB="0" anchor="b">
+                    <a:lnL w="12700" cap="flat" cmpd="sng" algn="ctr">
+                      <a:solidFill>
+                        <a:srgbClr val="000000"/>
+                      </a:solidFill>
+                      <a:prstDash val="solid"/>
+                      <a:round/>
+                      <a:headEnd type="none" w="med" len="med"/>
+                      <a:tailEnd type="none" w="med" len="med"/>
+                    </a:lnL>
+                    <a:lnR w="12700" cap="flat" cmpd="sng" algn="ctr">
+                      <a:solidFill>
+                        <a:srgbClr val="000000"/>
+                      </a:solidFill>
+                      <a:prstDash val="solid"/>
+                      <a:round/>
+                      <a:headEnd type="none" w="med" len="med"/>
+                      <a:tailEnd type="none" w="med" len="med"/>
+                    </a:lnR>
+                    <a:lnT w="12700" cap="flat" cmpd="sng" algn="ctr">
+                      <a:solidFill>
+                        <a:srgbClr val="000000"/>
+                      </a:solidFill>
+                      <a:prstDash val="solid"/>
+                      <a:round/>
+                      <a:headEnd type="none" w="med" len="med"/>
+                      <a:tailEnd type="none" w="med" len="med"/>
+                    </a:lnT>
+                    <a:lnB w="12700" cap="flat" cmpd="sng" algn="ctr">
+                      <a:solidFill>
+                        <a:srgbClr val="000000"/>
+                      </a:solidFill>
+                      <a:prstDash val="solid"/>
+                      <a:round/>
+                      <a:headEnd type="none" w="med" len="med"/>
+                      <a:tailEnd type="none" w="med" len="med"/>
+                    </a:lnB>
+                  </a:tcPr>
+                </a:tc>
+                <a:extLst>
+                  <a:ext uri="{0D108BD9-81ED-4DB2-BD59-A6C34878D82A}">
+                    <a16:rowId xmlns:a16="http://schemas.microsoft.com/office/drawing/2014/main" val="3389873849"/>
+                  </a:ext>
+                </a:extLst>
+              </a:tr>
+              <a:tr h="157480">
+                <a:tc>
+                  <a:txBody>
+                    <a:bodyPr/>
+                    <a:lstStyle/>
+                    <a:p>
+                      <a:pPr marL="0" marR="0" algn="ctr">
+                        <a:lnSpc>
+                          <a:spcPct val="107000"/>
+                        </a:lnSpc>
+                        <a:spcBef>
+                          <a:spcPts val="0"/>
+                        </a:spcBef>
+                        <a:spcAft>
+                          <a:spcPts val="0"/>
+                        </a:spcAft>
+                      </a:pPr>
+                      <a:r>
+                        <a:rPr lang="en-US" sz="800" kern="100">
+                          <a:solidFill>
+                            <a:srgbClr val="000000"/>
+                          </a:solidFill>
+                          <a:effectLst/>
+                          <a:latin typeface="Calibri" panose="020F0502020204030204" pitchFamily="34" charset="0"/>
+                          <a:ea typeface="Times New Roman" panose="02020603050405020304" pitchFamily="18" charset="0"/>
+                        </a:rPr>
+                        <a:t>Neg. Charge</a:t>
+                      </a:r>
+                      <a:endParaRPr lang="en-US" sz="1000" kern="100">
+                        <a:effectLst/>
+                        <a:latin typeface="Times New Roman" panose="02020603050405020304" pitchFamily="18" charset="0"/>
+                        <a:ea typeface="SimSun" panose="02010600030101010101" pitchFamily="2" charset="-122"/>
+                      </a:endParaRPr>
+                    </a:p>
+                  </a:txBody>
+                  <a:tcPr marL="68580" marR="68580" marT="0" marB="0" anchor="b">
+                    <a:lnL w="12700" cap="flat" cmpd="sng" algn="ctr">
+                      <a:solidFill>
+                        <a:srgbClr val="000000"/>
+                      </a:solidFill>
+                      <a:prstDash val="solid"/>
+                      <a:round/>
+                      <a:headEnd type="none" w="med" len="med"/>
+                      <a:tailEnd type="none" w="med" len="med"/>
+                    </a:lnL>
+                    <a:lnR w="12700" cap="flat" cmpd="sng" algn="ctr">
+                      <a:solidFill>
+                        <a:srgbClr val="000000"/>
+                      </a:solidFill>
+                      <a:prstDash val="solid"/>
+                      <a:round/>
+                      <a:headEnd type="none" w="med" len="med"/>
+                      <a:tailEnd type="none" w="med" len="med"/>
+                    </a:lnR>
+                    <a:lnT w="12700" cap="flat" cmpd="sng" algn="ctr">
+                      <a:solidFill>
+                        <a:srgbClr val="000000"/>
+                      </a:solidFill>
+                      <a:prstDash val="solid"/>
+                      <a:round/>
+                      <a:headEnd type="none" w="med" len="med"/>
+                      <a:tailEnd type="none" w="med" len="med"/>
+                    </a:lnT>
+                    <a:lnB w="12700" cap="flat" cmpd="sng" algn="ctr">
+                      <a:solidFill>
+                        <a:srgbClr val="000000"/>
+                      </a:solidFill>
+                      <a:prstDash val="solid"/>
+                      <a:round/>
+                      <a:headEnd type="none" w="med" len="med"/>
+                      <a:tailEnd type="none" w="med" len="med"/>
+                    </a:lnB>
+                    <a:solidFill>
+                      <a:srgbClr val="F2F2F2"/>
+                    </a:solidFill>
+                  </a:tcPr>
+                </a:tc>
+                <a:tc>
+                  <a:txBody>
+                    <a:bodyPr/>
+                    <a:lstStyle/>
+                    <a:p>
+                      <a:pPr marL="0" marR="0" algn="ctr">
+                        <a:lnSpc>
+                          <a:spcPct val="107000"/>
+                        </a:lnSpc>
+                        <a:spcBef>
+                          <a:spcPts val="0"/>
+                        </a:spcBef>
+                        <a:spcAft>
+                          <a:spcPts val="0"/>
+                        </a:spcAft>
+                      </a:pPr>
+                      <a:r>
+                        <a:rPr lang="en-US" sz="800" kern="100">
+                          <a:solidFill>
+                            <a:srgbClr val="000000"/>
+                          </a:solidFill>
+                          <a:effectLst/>
+                          <a:latin typeface="Calibri" panose="020F0502020204030204" pitchFamily="34" charset="0"/>
+                          <a:ea typeface="Times New Roman" panose="02020603050405020304" pitchFamily="18" charset="0"/>
+                        </a:rPr>
+                        <a:t>[C-]</a:t>
+                      </a:r>
+                      <a:endParaRPr lang="en-US" sz="1000" kern="100">
+                        <a:effectLst/>
+                        <a:latin typeface="Times New Roman" panose="02020603050405020304" pitchFamily="18" charset="0"/>
+                        <a:ea typeface="SimSun" panose="02010600030101010101" pitchFamily="2" charset="-122"/>
+                      </a:endParaRPr>
+                    </a:p>
+                  </a:txBody>
+                  <a:tcPr marL="68580" marR="68580" marT="0" marB="0" anchor="b">
+                    <a:lnL w="12700" cap="flat" cmpd="sng" algn="ctr">
+                      <a:solidFill>
+                        <a:srgbClr val="000000"/>
+                      </a:solidFill>
+                      <a:prstDash val="solid"/>
+                      <a:round/>
+                      <a:headEnd type="none" w="med" len="med"/>
+                      <a:tailEnd type="none" w="med" len="med"/>
+                    </a:lnL>
+                    <a:lnR w="12700" cap="flat" cmpd="sng" algn="ctr">
+                      <a:solidFill>
+                        <a:srgbClr val="000000"/>
+                      </a:solidFill>
+                      <a:prstDash val="solid"/>
+                      <a:round/>
+                      <a:headEnd type="none" w="med" len="med"/>
+                      <a:tailEnd type="none" w="med" len="med"/>
+                    </a:lnR>
+                    <a:lnT w="12700" cap="flat" cmpd="sng" algn="ctr">
+                      <a:solidFill>
+                        <a:srgbClr val="000000"/>
+                      </a:solidFill>
+                      <a:prstDash val="solid"/>
+                      <a:round/>
+                      <a:headEnd type="none" w="med" len="med"/>
+                      <a:tailEnd type="none" w="med" len="med"/>
+                    </a:lnT>
+                    <a:lnB w="12700" cap="flat" cmpd="sng" algn="ctr">
+                      <a:solidFill>
+                        <a:srgbClr val="000000"/>
+                      </a:solidFill>
+                      <a:prstDash val="solid"/>
+                      <a:round/>
+                      <a:headEnd type="none" w="med" len="med"/>
+                      <a:tailEnd type="none" w="med" len="med"/>
+                    </a:lnB>
+                    <a:solidFill>
+                      <a:srgbClr val="F2F2F2"/>
+                    </a:solidFill>
+                  </a:tcPr>
+                </a:tc>
+                <a:extLst>
+                  <a:ext uri="{0D108BD9-81ED-4DB2-BD59-A6C34878D82A}">
+                    <a16:rowId xmlns:a16="http://schemas.microsoft.com/office/drawing/2014/main" val="3526923680"/>
+                  </a:ext>
+                </a:extLst>
+              </a:tr>
+              <a:tr h="157480">
+                <a:tc>
+                  <a:txBody>
+                    <a:bodyPr/>
+                    <a:lstStyle/>
+                    <a:p>
+                      <a:pPr marL="0" marR="0" algn="ctr">
+                        <a:lnSpc>
+                          <a:spcPct val="107000"/>
+                        </a:lnSpc>
+                        <a:spcBef>
+                          <a:spcPts val="0"/>
+                        </a:spcBef>
+                        <a:spcAft>
+                          <a:spcPts val="0"/>
+                        </a:spcAft>
+                      </a:pPr>
+                      <a:r>
+                        <a:rPr lang="en-US" sz="800" kern="100">
+                          <a:solidFill>
+                            <a:srgbClr val="000000"/>
+                          </a:solidFill>
+                          <a:effectLst/>
+                          <a:latin typeface="Calibri" panose="020F0502020204030204" pitchFamily="34" charset="0"/>
+                          <a:ea typeface="Times New Roman" panose="02020603050405020304" pitchFamily="18" charset="0"/>
+                        </a:rPr>
+                        <a:t>Arom. Carb.</a:t>
+                      </a:r>
+                      <a:endParaRPr lang="en-US" sz="1000" kern="100">
+                        <a:effectLst/>
+                        <a:latin typeface="Times New Roman" panose="02020603050405020304" pitchFamily="18" charset="0"/>
+                        <a:ea typeface="SimSun" panose="02010600030101010101" pitchFamily="2" charset="-122"/>
+                      </a:endParaRPr>
+                    </a:p>
+                  </a:txBody>
+                  <a:tcPr marL="68580" marR="68580" marT="0" marB="0" anchor="b">
+                    <a:lnL w="12700" cap="flat" cmpd="sng" algn="ctr">
+                      <a:solidFill>
+                        <a:srgbClr val="000000"/>
+                      </a:solidFill>
+                      <a:prstDash val="solid"/>
+                      <a:round/>
+                      <a:headEnd type="none" w="med" len="med"/>
+                      <a:tailEnd type="none" w="med" len="med"/>
+                    </a:lnL>
+                    <a:lnR w="12700" cap="flat" cmpd="sng" algn="ctr">
+                      <a:solidFill>
+                        <a:srgbClr val="000000"/>
+                      </a:solidFill>
+                      <a:prstDash val="solid"/>
+                      <a:round/>
+                      <a:headEnd type="none" w="med" len="med"/>
+                      <a:tailEnd type="none" w="med" len="med"/>
+                    </a:lnR>
+                    <a:lnT w="12700" cap="flat" cmpd="sng" algn="ctr">
+                      <a:solidFill>
+                        <a:srgbClr val="000000"/>
+                      </a:solidFill>
+                      <a:prstDash val="solid"/>
+                      <a:round/>
+                      <a:headEnd type="none" w="med" len="med"/>
+                      <a:tailEnd type="none" w="med" len="med"/>
+                    </a:lnT>
+                    <a:lnB w="12700" cap="flat" cmpd="sng" algn="ctr">
+                      <a:solidFill>
+                        <a:srgbClr val="000000"/>
+                      </a:solidFill>
+                      <a:prstDash val="solid"/>
+                      <a:round/>
+                      <a:headEnd type="none" w="med" len="med"/>
+                      <a:tailEnd type="none" w="med" len="med"/>
+                    </a:lnB>
+                  </a:tcPr>
+                </a:tc>
+                <a:tc>
+                  <a:txBody>
+                    <a:bodyPr/>
+                    <a:lstStyle/>
+                    <a:p>
+                      <a:pPr marL="0" marR="0" algn="ctr">
+                        <a:lnSpc>
+                          <a:spcPct val="107000"/>
+                        </a:lnSpc>
+                        <a:spcBef>
+                          <a:spcPts val="0"/>
+                        </a:spcBef>
+                        <a:spcAft>
+                          <a:spcPts val="0"/>
+                        </a:spcAft>
+                      </a:pPr>
+                      <a:r>
+                        <a:rPr lang="en-US" sz="800" kern="100" dirty="0">
+                          <a:solidFill>
+                            <a:srgbClr val="000000"/>
+                          </a:solidFill>
+                          <a:effectLst/>
+                          <a:latin typeface="Calibri" panose="020F0502020204030204" pitchFamily="34" charset="0"/>
+                          <a:ea typeface="Times New Roman" panose="02020603050405020304" pitchFamily="18" charset="0"/>
+                        </a:rPr>
+                        <a:t>c (lowercase)</a:t>
+                      </a:r>
+                      <a:endParaRPr lang="en-US" sz="1000" kern="100" dirty="0">
+                        <a:effectLst/>
+                        <a:latin typeface="Times New Roman" panose="02020603050405020304" pitchFamily="18" charset="0"/>
+                        <a:ea typeface="SimSun" panose="02010600030101010101" pitchFamily="2" charset="-122"/>
+                      </a:endParaRPr>
+                    </a:p>
+                  </a:txBody>
+                  <a:tcPr marL="68580" marR="68580" marT="0" marB="0" anchor="b">
+                    <a:lnL w="12700" cap="flat" cmpd="sng" algn="ctr">
+                      <a:solidFill>
+                        <a:srgbClr val="000000"/>
+                      </a:solidFill>
+                      <a:prstDash val="solid"/>
+                      <a:round/>
+                      <a:headEnd type="none" w="med" len="med"/>
+                      <a:tailEnd type="none" w="med" len="med"/>
+                    </a:lnL>
+                    <a:lnR w="12700" cap="flat" cmpd="sng" algn="ctr">
+                      <a:solidFill>
+                        <a:srgbClr val="000000"/>
+                      </a:solidFill>
+                      <a:prstDash val="solid"/>
+                      <a:round/>
+                      <a:headEnd type="none" w="med" len="med"/>
+                      <a:tailEnd type="none" w="med" len="med"/>
+                    </a:lnR>
+                    <a:lnT w="12700" cap="flat" cmpd="sng" algn="ctr">
+                      <a:solidFill>
+                        <a:srgbClr val="000000"/>
+                      </a:solidFill>
+                      <a:prstDash val="solid"/>
+                      <a:round/>
+                      <a:headEnd type="none" w="med" len="med"/>
+                      <a:tailEnd type="none" w="med" len="med"/>
+                    </a:lnT>
+                    <a:lnB w="12700" cap="flat" cmpd="sng" algn="ctr">
+                      <a:solidFill>
+                        <a:srgbClr val="000000"/>
+                      </a:solidFill>
+                      <a:prstDash val="solid"/>
+                      <a:round/>
+                      <a:headEnd type="none" w="med" len="med"/>
+                      <a:tailEnd type="none" w="med" len="med"/>
+                    </a:lnB>
+                  </a:tcPr>
+                </a:tc>
+                <a:extLst>
+                  <a:ext uri="{0D108BD9-81ED-4DB2-BD59-A6C34878D82A}">
+                    <a16:rowId xmlns:a16="http://schemas.microsoft.com/office/drawing/2014/main" val="2763420640"/>
+                  </a:ext>
+                </a:extLst>
+              </a:tr>
+            </a:tbl>
+          </a:graphicData>
+        </a:graphic>
+      </p:graphicFrame>
+      <p:sp>
+        <p:nvSpPr>
+          <p:cNvPr id="16" name="TextBox 15">
+            <a:extLst>
+              <a:ext uri="{FF2B5EF4-FFF2-40B4-BE49-F238E27FC236}">
+                <a16:creationId xmlns:a16="http://schemas.microsoft.com/office/drawing/2014/main" id="{347D8B4D-D079-4174-B8C5-A97834DE9FB5}"/>
+              </a:ext>
+            </a:extLst>
+          </p:cNvPr>
+          <p:cNvSpPr txBox="1"/>
+          <p:nvPr/>
+        </p:nvSpPr>
+        <p:spPr>
+          <a:xfrm>
+            <a:off x="9565524" y="2119960"/>
+            <a:ext cx="1866121" cy="738664"/>
+          </a:xfrm>
+          <a:prstGeom prst="rect">
+            <a:avLst/>
+          </a:prstGeom>
+          <a:noFill/>
+        </p:spPr>
+        <p:txBody>
+          <a:bodyPr wrap="square" rtlCol="0">
+            <a:spAutoFit/>
+          </a:bodyPr>
+          <a:lstStyle/>
+          <a:p>
+            <a:pPr algn="ctr"/>
+            <a:r>
+              <a:rPr lang="en-US" sz="1400" dirty="0"/>
+              <a:t>Table of Common </a:t>
+            </a:r>
+          </a:p>
+          <a:p>
+            <a:pPr algn="ctr"/>
+            <a:r>
+              <a:rPr lang="en-US" sz="1400" dirty="0"/>
+              <a:t>Symbol and Meaning</a:t>
+            </a:r>
+          </a:p>
+          <a:p>
+            <a:pPr algn="ctr"/>
+            <a:r>
+              <a:rPr lang="en-US" sz="1400" dirty="0"/>
+              <a:t>(Not Exhaustive)</a:t>
             </a:r>
           </a:p>
         </p:txBody>
@@ -6447,7 +9393,7 @@
     </p:spTree>
     <p:extLst>
       <p:ext uri="{BB962C8B-B14F-4D97-AF65-F5344CB8AC3E}">
-        <p14:creationId xmlns:p14="http://schemas.microsoft.com/office/powerpoint/2010/main" val="935595663"/>
+        <p14:creationId xmlns:p14="http://schemas.microsoft.com/office/powerpoint/2010/main" val="1000119936"/>
       </p:ext>
     </p:extLst>
   </p:cSld>
@@ -6479,7 +9425,7 @@
           <p:cNvPr id="2" name="Title 1">
             <a:extLst>
               <a:ext uri="{FF2B5EF4-FFF2-40B4-BE49-F238E27FC236}">
-                <a16:creationId xmlns:a16="http://schemas.microsoft.com/office/drawing/2014/main" id="{2C0D3ACB-7E4B-46AF-852B-A443D5B23E68}"/>
+                <a16:creationId xmlns:a16="http://schemas.microsoft.com/office/drawing/2014/main" id="{DDB5B0CA-BBBB-4B87-9602-ADA0A79D868C}"/>
               </a:ext>
             </a:extLst>
           </p:cNvPr>
@@ -6497,43 +9443,45 @@
           <a:p>
             <a:r>
               <a:rPr lang="en-US" dirty="0"/>
-              <a:t>Related Work Continued</a:t>
-            </a:r>
-          </a:p>
-        </p:txBody>
-      </p:sp>
-      <p:sp>
-        <p:nvSpPr>
-          <p:cNvPr id="3" name="Content Placeholder 2">
+              <a:t>Data Randomly Selected from Dataset: </a:t>
+            </a:r>
+          </a:p>
+        </p:txBody>
+      </p:sp>
+      <p:pic>
+        <p:nvPicPr>
+          <p:cNvPr id="5" name="Picture 4">
             <a:extLst>
               <a:ext uri="{FF2B5EF4-FFF2-40B4-BE49-F238E27FC236}">
-                <a16:creationId xmlns:a16="http://schemas.microsoft.com/office/drawing/2014/main" id="{539798E4-F935-48AF-ADB1-5491EA1641E7}"/>
+                <a16:creationId xmlns:a16="http://schemas.microsoft.com/office/drawing/2014/main" id="{8290DB89-83B7-4AF8-BF79-33A61CC341C4}"/>
               </a:ext>
             </a:extLst>
           </p:cNvPr>
-          <p:cNvSpPr>
-            <a:spLocks noGrp="1"/>
-          </p:cNvSpPr>
-          <p:nvPr>
-            <p:ph idx="1"/>
-          </p:nvPr>
-        </p:nvSpPr>
-        <p:spPr/>
-        <p:txBody>
-          <a:bodyPr/>
-          <a:lstStyle/>
-          <a:p>
-            <a:r>
-              <a:rPr lang="en-US" dirty="0"/>
-              <a:t>MolGAN</a:t>
-            </a:r>
-          </a:p>
-        </p:txBody>
-      </p:sp>
+          <p:cNvPicPr>
+            <a:picLocks noChangeAspect="1"/>
+          </p:cNvPicPr>
+          <p:nvPr/>
+        </p:nvPicPr>
+        <p:blipFill>
+          <a:blip r:embed="rId2"/>
+          <a:stretch>
+            <a:fillRect/>
+          </a:stretch>
+        </p:blipFill>
+        <p:spPr>
+          <a:xfrm>
+            <a:off x="2125578" y="1862529"/>
+            <a:ext cx="7502325" cy="4209408"/>
+          </a:xfrm>
+          <a:prstGeom prst="rect">
+            <a:avLst/>
+          </a:prstGeom>
+        </p:spPr>
+      </p:pic>
     </p:spTree>
     <p:extLst>
       <p:ext uri="{BB962C8B-B14F-4D97-AF65-F5344CB8AC3E}">
-        <p14:creationId xmlns:p14="http://schemas.microsoft.com/office/powerpoint/2010/main" val="59159141"/>
+        <p14:creationId xmlns:p14="http://schemas.microsoft.com/office/powerpoint/2010/main" val="1193369814"/>
       </p:ext>
     </p:extLst>
   </p:cSld>
@@ -6554,34 +9502,34 @@
         <a:sysClr val="window" lastClr="FFFFFF"/>
       </a:lt1>
       <a:dk2>
-        <a:srgbClr val="514949"/>
+        <a:srgbClr val="455F51"/>
       </a:dk2>
       <a:lt2>
-        <a:srgbClr val="E1E1DB"/>
+        <a:srgbClr val="E2DFCC"/>
       </a:lt2>
       <a:accent1>
-        <a:srgbClr val="9DBFBE"/>
+        <a:srgbClr val="99CB38"/>
       </a:accent1>
       <a:accent2>
-        <a:srgbClr val="DB8631"/>
+        <a:srgbClr val="63A537"/>
       </a:accent2>
       <a:accent3>
-        <a:srgbClr val="E3CC5A"/>
+        <a:srgbClr val="37A76F"/>
       </a:accent3>
       <a:accent4>
-        <a:srgbClr val="ACADA8"/>
+        <a:srgbClr val="44C1A3"/>
       </a:accent4>
       <a:accent5>
-        <a:srgbClr val="927C61"/>
+        <a:srgbClr val="4EB3CF"/>
       </a:accent5>
       <a:accent6>
-        <a:srgbClr val="B3B435"/>
+        <a:srgbClr val="51C3F9"/>
       </a:accent6>
       <a:hlink>
-        <a:srgbClr val="0000FF"/>
+        <a:srgbClr val="6B9F25"/>
       </a:hlink>
       <a:folHlink>
-        <a:srgbClr val="800080"/>
+        <a:srgbClr val="B26B02"/>
       </a:folHlink>
     </a:clrScheme>
     <a:fontScheme name="Retrospect">
@@ -6820,7 +9768,7 @@
   <a:extraClrSchemeLst/>
   <a:extLst>
     <a:ext uri="{05A4C25C-085E-4340-85A3-A5531E510DB2}">
-      <thm15:themeFamily xmlns:thm15="http://schemas.microsoft.com/office/thememl/2012/main" name="Retrospect" id="{5F128B03-DCCA-4EEB-AB3B-CF2899314A46}" vid="{243AF7DC-D15B-41C0-AE81-23980D1B9FC4}"/>
+      <thm15:themeFamily xmlns:thm15="http://schemas.microsoft.com/office/thememl/2012/main" name="Retrospect" id="{5F128B03-DCCA-4EEB-AB3B-CF2899314A46}" vid="{D26EA377-59BD-4C9C-9D94-EE8416EE4C79}"/>
     </a:ext>
   </a:extLst>
 </a:theme>

</xml_diff>

<commit_message>
fixed generator network to be smaller.
</commit_message>
<xml_diff>
--- a/SMGAN.pptx
+++ b/SMGAN.pptx
@@ -5,7 +5,7 @@
     <p:sldMasterId id="2147484224" r:id="rId1"/>
   </p:sldMasterIdLst>
   <p:notesMasterIdLst>
-    <p:notesMasterId r:id="rId22"/>
+    <p:notesMasterId r:id="rId23"/>
   </p:notesMasterIdLst>
   <p:sldIdLst>
     <p:sldId id="256" r:id="rId2"/>
@@ -19,15 +19,16 @@
     <p:sldId id="271" r:id="rId10"/>
     <p:sldId id="262" r:id="rId11"/>
     <p:sldId id="263" r:id="rId12"/>
-    <p:sldId id="274" r:id="rId13"/>
-    <p:sldId id="275" r:id="rId14"/>
-    <p:sldId id="264" r:id="rId15"/>
-    <p:sldId id="272" r:id="rId16"/>
-    <p:sldId id="277" r:id="rId17"/>
-    <p:sldId id="266" r:id="rId18"/>
-    <p:sldId id="276" r:id="rId19"/>
-    <p:sldId id="268" r:id="rId20"/>
-    <p:sldId id="269" r:id="rId21"/>
+    <p:sldId id="275" r:id="rId13"/>
+    <p:sldId id="264" r:id="rId14"/>
+    <p:sldId id="272" r:id="rId15"/>
+    <p:sldId id="277" r:id="rId16"/>
+    <p:sldId id="266" r:id="rId17"/>
+    <p:sldId id="276" r:id="rId18"/>
+    <p:sldId id="279" r:id="rId19"/>
+    <p:sldId id="278" r:id="rId20"/>
+    <p:sldId id="268" r:id="rId21"/>
+    <p:sldId id="269" r:id="rId22"/>
   </p:sldIdLst>
   <p:sldSz cx="12192000" cy="6858000"/>
   <p:notesSz cx="6858000" cy="9144000"/>
@@ -216,7 +217,7 @@
           <a:p>
             <a:fld id="{2DFEB8E8-C4F6-4428-AC29-98E179DDE321}" type="datetimeFigureOut">
               <a:rPr lang="en-US" smtClean="0"/>
-              <a:t>8/27/2024</a:t>
+              <a:t>8/28/2024</a:t>
             </a:fld>
             <a:endParaRPr lang="en-US"/>
           </a:p>
@@ -709,7 +710,7 @@
           <a:p>
             <a:fld id="{4F40F2FB-AF60-4DCA-8F1D-6E4E169D5979}" type="datetimeFigureOut">
               <a:rPr lang="en-US" smtClean="0"/>
-              <a:t>8/27/2024</a:t>
+              <a:t>8/28/2024</a:t>
             </a:fld>
             <a:endParaRPr lang="en-US"/>
           </a:p>
@@ -917,7 +918,7 @@
           <a:p>
             <a:fld id="{4F40F2FB-AF60-4DCA-8F1D-6E4E169D5979}" type="datetimeFigureOut">
               <a:rPr lang="en-US" smtClean="0"/>
-              <a:t>8/27/2024</a:t>
+              <a:t>8/28/2024</a:t>
             </a:fld>
             <a:endParaRPr lang="en-US"/>
           </a:p>
@@ -1173,7 +1174,7 @@
           <a:p>
             <a:fld id="{4F40F2FB-AF60-4DCA-8F1D-6E4E169D5979}" type="datetimeFigureOut">
               <a:rPr lang="en-US" smtClean="0"/>
-              <a:t>8/27/2024</a:t>
+              <a:t>8/28/2024</a:t>
             </a:fld>
             <a:endParaRPr lang="en-US"/>
           </a:p>
@@ -1343,7 +1344,7 @@
           <a:p>
             <a:fld id="{4F40F2FB-AF60-4DCA-8F1D-6E4E169D5979}" type="datetimeFigureOut">
               <a:rPr lang="en-US" smtClean="0"/>
-              <a:t>8/27/2024</a:t>
+              <a:t>8/28/2024</a:t>
             </a:fld>
             <a:endParaRPr lang="en-US"/>
           </a:p>
@@ -1686,7 +1687,7 @@
           <a:p>
             <a:fld id="{4F40F2FB-AF60-4DCA-8F1D-6E4E169D5979}" type="datetimeFigureOut">
               <a:rPr lang="en-US" smtClean="0"/>
-              <a:t>8/27/2024</a:t>
+              <a:t>8/28/2024</a:t>
             </a:fld>
             <a:endParaRPr lang="en-US"/>
           </a:p>
@@ -1961,7 +1962,7 @@
           <a:p>
             <a:fld id="{4F40F2FB-AF60-4DCA-8F1D-6E4E169D5979}" type="datetimeFigureOut">
               <a:rPr lang="en-US" smtClean="0"/>
-              <a:t>8/27/2024</a:t>
+              <a:t>8/28/2024</a:t>
             </a:fld>
             <a:endParaRPr lang="en-US"/>
           </a:p>
@@ -2340,7 +2341,7 @@
           <a:p>
             <a:fld id="{4F40F2FB-AF60-4DCA-8F1D-6E4E169D5979}" type="datetimeFigureOut">
               <a:rPr lang="en-US" smtClean="0"/>
-              <a:t>8/27/2024</a:t>
+              <a:t>8/28/2024</a:t>
             </a:fld>
             <a:endParaRPr lang="en-US"/>
           </a:p>
@@ -2458,7 +2459,7 @@
           <a:p>
             <a:fld id="{4F40F2FB-AF60-4DCA-8F1D-6E4E169D5979}" type="datetimeFigureOut">
               <a:rPr lang="en-US" smtClean="0"/>
-              <a:t>8/27/2024</a:t>
+              <a:t>8/28/2024</a:t>
             </a:fld>
             <a:endParaRPr lang="en-US"/>
           </a:p>
@@ -2629,7 +2630,7 @@
           <a:p>
             <a:fld id="{4F40F2FB-AF60-4DCA-8F1D-6E4E169D5979}" type="datetimeFigureOut">
               <a:rPr lang="en-US" smtClean="0"/>
-              <a:t>8/27/2024</a:t>
+              <a:t>8/28/2024</a:t>
             </a:fld>
             <a:endParaRPr lang="en-US"/>
           </a:p>
@@ -2983,7 +2984,7 @@
           <a:p>
             <a:fld id="{4F40F2FB-AF60-4DCA-8F1D-6E4E169D5979}" type="datetimeFigureOut">
               <a:rPr lang="en-US" smtClean="0"/>
-              <a:t>8/27/2024</a:t>
+              <a:t>8/28/2024</a:t>
             </a:fld>
             <a:endParaRPr lang="en-US"/>
           </a:p>
@@ -3360,7 +3361,7 @@
           <a:p>
             <a:fld id="{4F40F2FB-AF60-4DCA-8F1D-6E4E169D5979}" type="datetimeFigureOut">
               <a:rPr lang="en-US" smtClean="0"/>
-              <a:t>8/27/2024</a:t>
+              <a:t>8/28/2024</a:t>
             </a:fld>
             <a:endParaRPr lang="en-US"/>
           </a:p>
@@ -3647,7 +3648,7 @@
           <a:p>
             <a:fld id="{4F40F2FB-AF60-4DCA-8F1D-6E4E169D5979}" type="datetimeFigureOut">
               <a:rPr lang="en-US" smtClean="0"/>
-              <a:t>8/27/2024</a:t>
+              <a:t>8/28/2024</a:t>
             </a:fld>
             <a:endParaRPr lang="en-US"/>
           </a:p>
@@ -4222,8 +4223,13 @@
           <a:p>
             <a:r>
               <a:rPr lang="en-US" dirty="0"/>
-              <a:t>Anthony J Vasquez</a:t>
-            </a:r>
+              <a:t>Anthony </a:t>
+            </a:r>
+            <a:r>
+              <a:rPr lang="en-US"/>
+              <a:t>J Vasquez, TBD</a:t>
+            </a:r>
+            <a:endParaRPr lang="en-US" dirty="0"/>
           </a:p>
         </p:txBody>
       </p:sp>
@@ -4821,89 +4827,6 @@
           <p:cNvPr id="2" name="Title 1">
             <a:extLst>
               <a:ext uri="{FF2B5EF4-FFF2-40B4-BE49-F238E27FC236}">
-                <a16:creationId xmlns:a16="http://schemas.microsoft.com/office/drawing/2014/main" id="{822F7B17-23A6-4DA2-934E-857576E0858F}"/>
-              </a:ext>
-            </a:extLst>
-          </p:cNvPr>
-          <p:cNvSpPr>
-            <a:spLocks noGrp="1"/>
-          </p:cNvSpPr>
-          <p:nvPr>
-            <p:ph type="title"/>
-          </p:nvPr>
-        </p:nvSpPr>
-        <p:spPr/>
-        <p:txBody>
-          <a:bodyPr/>
-          <a:lstStyle/>
-          <a:p>
-            <a:r>
-              <a:rPr lang="en-US" dirty="0"/>
-              <a:t>Generator Network</a:t>
-            </a:r>
-          </a:p>
-        </p:txBody>
-      </p:sp>
-      <p:sp>
-        <p:nvSpPr>
-          <p:cNvPr id="3" name="Content Placeholder 2">
-            <a:extLst>
-              <a:ext uri="{FF2B5EF4-FFF2-40B4-BE49-F238E27FC236}">
-                <a16:creationId xmlns:a16="http://schemas.microsoft.com/office/drawing/2014/main" id="{A6484DE4-963E-4838-B668-7717AD1AE319}"/>
-              </a:ext>
-            </a:extLst>
-          </p:cNvPr>
-          <p:cNvSpPr>
-            <a:spLocks noGrp="1"/>
-          </p:cNvSpPr>
-          <p:nvPr>
-            <p:ph idx="1"/>
-          </p:nvPr>
-        </p:nvSpPr>
-        <p:spPr/>
-        <p:txBody>
-          <a:bodyPr/>
-          <a:lstStyle/>
-          <a:p>
-            <a:endParaRPr lang="en-US"/>
-          </a:p>
-        </p:txBody>
-      </p:sp>
-    </p:spTree>
-    <p:extLst>
-      <p:ext uri="{BB962C8B-B14F-4D97-AF65-F5344CB8AC3E}">
-        <p14:creationId xmlns:p14="http://schemas.microsoft.com/office/powerpoint/2010/main" val="782862083"/>
-      </p:ext>
-    </p:extLst>
-  </p:cSld>
-  <p:clrMapOvr>
-    <a:masterClrMapping/>
-  </p:clrMapOvr>
-</p:sld>
-</file>
-
-<file path=ppt/slides/slide13.xml><?xml version="1.0" encoding="utf-8"?>
-<p:sld xmlns:a="http://schemas.openxmlformats.org/drawingml/2006/main" xmlns:r="http://schemas.openxmlformats.org/officeDocument/2006/relationships" xmlns:p="http://schemas.openxmlformats.org/presentationml/2006/main">
-  <p:cSld>
-    <p:spTree>
-      <p:nvGrpSpPr>
-        <p:cNvPr id="1" name=""/>
-        <p:cNvGrpSpPr/>
-        <p:nvPr/>
-      </p:nvGrpSpPr>
-      <p:grpSpPr>
-        <a:xfrm>
-          <a:off x="0" y="0"/>
-          <a:ext cx="0" cy="0"/>
-          <a:chOff x="0" y="0"/>
-          <a:chExt cx="0" cy="0"/>
-        </a:xfrm>
-      </p:grpSpPr>
-      <p:sp>
-        <p:nvSpPr>
-          <p:cNvPr id="2" name="Title 1">
-            <a:extLst>
-              <a:ext uri="{FF2B5EF4-FFF2-40B4-BE49-F238E27FC236}">
                 <a16:creationId xmlns:a16="http://schemas.microsoft.com/office/drawing/2014/main" id="{E21CEF7B-BE4B-4F37-B27C-4272410CC2D3}"/>
               </a:ext>
             </a:extLst>
@@ -4922,36 +4845,142 @@
           <a:p>
             <a:r>
               <a:rPr lang="en-US" dirty="0"/>
-              <a:t>Discriminator Network</a:t>
+              <a:t>Architecture</a:t>
             </a:r>
           </a:p>
         </p:txBody>
       </p:sp>
       <p:sp>
         <p:nvSpPr>
-          <p:cNvPr id="3" name="Content Placeholder 2">
+          <p:cNvPr id="7" name="TextBox 6">
             <a:extLst>
               <a:ext uri="{FF2B5EF4-FFF2-40B4-BE49-F238E27FC236}">
-                <a16:creationId xmlns:a16="http://schemas.microsoft.com/office/drawing/2014/main" id="{7C399800-0AED-465D-AA5E-518AC5FF8596}"/>
+                <a16:creationId xmlns:a16="http://schemas.microsoft.com/office/drawing/2014/main" id="{9B4CDA0B-4B9D-407F-8BFD-96D09EA68AD9}"/>
               </a:ext>
             </a:extLst>
           </p:cNvPr>
-          <p:cNvSpPr>
-            <a:spLocks noGrp="1"/>
-          </p:cNvSpPr>
+          <p:cNvSpPr txBox="1"/>
+          <p:nvPr/>
+        </p:nvSpPr>
+        <p:spPr>
+          <a:xfrm>
+            <a:off x="2059772" y="1980844"/>
+            <a:ext cx="3094522" cy="369332"/>
+          </a:xfrm>
+          <a:prstGeom prst="rect">
+            <a:avLst/>
+          </a:prstGeom>
+          <a:noFill/>
+        </p:spPr>
+        <p:txBody>
+          <a:bodyPr wrap="square" rtlCol="0">
+            <a:spAutoFit/>
+          </a:bodyPr>
+          <a:lstStyle/>
+          <a:p>
+            <a:pPr algn="ctr"/>
+            <a:r>
+              <a:rPr lang="en-US" dirty="0"/>
+              <a:t>Generator</a:t>
+            </a:r>
+          </a:p>
+        </p:txBody>
+      </p:sp>
+      <p:sp>
+        <p:nvSpPr>
+          <p:cNvPr id="8" name="TextBox 7">
+            <a:extLst>
+              <a:ext uri="{FF2B5EF4-FFF2-40B4-BE49-F238E27FC236}">
+                <a16:creationId xmlns:a16="http://schemas.microsoft.com/office/drawing/2014/main" id="{59CEA9B7-1B5E-41E9-88E0-0AC8646F9C73}"/>
+              </a:ext>
+            </a:extLst>
+          </p:cNvPr>
+          <p:cNvSpPr txBox="1"/>
+          <p:nvPr/>
+        </p:nvSpPr>
+        <p:spPr>
+          <a:xfrm>
+            <a:off x="6553423" y="2013166"/>
+            <a:ext cx="3094522" cy="369332"/>
+          </a:xfrm>
+          <a:prstGeom prst="rect">
+            <a:avLst/>
+          </a:prstGeom>
+          <a:noFill/>
+        </p:spPr>
+        <p:txBody>
+          <a:bodyPr wrap="square" rtlCol="0">
+            <a:spAutoFit/>
+          </a:bodyPr>
+          <a:lstStyle/>
+          <a:p>
+            <a:pPr algn="ctr"/>
+            <a:r>
+              <a:rPr lang="en-US" dirty="0"/>
+              <a:t>Discriminator</a:t>
+            </a:r>
+          </a:p>
+        </p:txBody>
+      </p:sp>
+      <p:pic>
+        <p:nvPicPr>
+          <p:cNvPr id="12" name="Content Placeholder 11">
+            <a:extLst>
+              <a:ext uri="{FF2B5EF4-FFF2-40B4-BE49-F238E27FC236}">
+                <a16:creationId xmlns:a16="http://schemas.microsoft.com/office/drawing/2014/main" id="{2E0CFD0F-6181-44F0-B60C-AAEEA254185F}"/>
+              </a:ext>
+            </a:extLst>
+          </p:cNvPr>
+          <p:cNvPicPr>
+            <a:picLocks noGrp="1" noChangeAspect="1"/>
+          </p:cNvPicPr>
           <p:nvPr>
             <p:ph idx="1"/>
           </p:nvPr>
-        </p:nvSpPr>
-        <p:spPr/>
-        <p:txBody>
-          <a:bodyPr/>
-          <a:lstStyle/>
-          <a:p>
-            <a:endParaRPr lang="en-US"/>
-          </a:p>
-        </p:txBody>
-      </p:sp>
+        </p:nvPicPr>
+        <p:blipFill>
+          <a:blip r:embed="rId2"/>
+          <a:stretch>
+            <a:fillRect/>
+          </a:stretch>
+        </p:blipFill>
+        <p:spPr>
+          <a:xfrm>
+            <a:off x="1450317" y="2390474"/>
+            <a:ext cx="4193562" cy="2974006"/>
+          </a:xfrm>
+        </p:spPr>
+      </p:pic>
+      <p:pic>
+        <p:nvPicPr>
+          <p:cNvPr id="14" name="Picture 13">
+            <a:extLst>
+              <a:ext uri="{FF2B5EF4-FFF2-40B4-BE49-F238E27FC236}">
+                <a16:creationId xmlns:a16="http://schemas.microsoft.com/office/drawing/2014/main" id="{20AF621B-0A0C-45A7-AC96-11E4C51CD81A}"/>
+              </a:ext>
+            </a:extLst>
+          </p:cNvPr>
+          <p:cNvPicPr>
+            <a:picLocks noChangeAspect="1"/>
+          </p:cNvPicPr>
+          <p:nvPr/>
+        </p:nvPicPr>
+        <p:blipFill>
+          <a:blip r:embed="rId3"/>
+          <a:stretch>
+            <a:fillRect/>
+          </a:stretch>
+        </p:blipFill>
+        <p:spPr>
+          <a:xfrm>
+            <a:off x="6003903" y="2350176"/>
+            <a:ext cx="4193562" cy="3064526"/>
+          </a:xfrm>
+          <a:prstGeom prst="rect">
+            <a:avLst/>
+          </a:prstGeom>
+        </p:spPr>
+      </p:pic>
     </p:spTree>
     <p:extLst>
       <p:ext uri="{BB962C8B-B14F-4D97-AF65-F5344CB8AC3E}">
@@ -4965,7 +4994,7 @@
 </p:sld>
 </file>
 
-<file path=ppt/slides/slide14.xml><?xml version="1.0" encoding="utf-8"?>
+<file path=ppt/slides/slide13.xml><?xml version="1.0" encoding="utf-8"?>
 <p:sld xmlns:a="http://schemas.openxmlformats.org/drawingml/2006/main" xmlns:r="http://schemas.openxmlformats.org/officeDocument/2006/relationships" xmlns:p="http://schemas.openxmlformats.org/presentationml/2006/main">
   <p:cSld>
     <p:spTree>
@@ -5744,7 +5773,7 @@
 </p:sld>
 </file>
 
-<file path=ppt/slides/slide15.xml><?xml version="1.0" encoding="utf-8"?>
+<file path=ppt/slides/slide14.xml><?xml version="1.0" encoding="utf-8"?>
 <p:sld xmlns:a="http://schemas.openxmlformats.org/drawingml/2006/main" xmlns:r="http://schemas.openxmlformats.org/officeDocument/2006/relationships" xmlns:p="http://schemas.openxmlformats.org/presentationml/2006/main">
   <p:cSld>
     <p:spTree>
@@ -10917,7 +10946,7 @@
 </p:sld>
 </file>
 
-<file path=ppt/slides/slide16.xml><?xml version="1.0" encoding="utf-8"?>
+<file path=ppt/slides/slide15.xml><?xml version="1.0" encoding="utf-8"?>
 <p:sld xmlns:a="http://schemas.openxmlformats.org/drawingml/2006/main" xmlns:r="http://schemas.openxmlformats.org/officeDocument/2006/relationships" xmlns:p="http://schemas.openxmlformats.org/presentationml/2006/main">
   <p:cSld>
     <p:spTree>
@@ -11123,7 +11152,7 @@
 </p:sld>
 </file>
 
-<file path=ppt/slides/slide17.xml><?xml version="1.0" encoding="utf-8"?>
+<file path=ppt/slides/slide16.xml><?xml version="1.0" encoding="utf-8"?>
 <p:sld xmlns:a="http://schemas.openxmlformats.org/drawingml/2006/main" xmlns:r="http://schemas.openxmlformats.org/officeDocument/2006/relationships" xmlns:p="http://schemas.openxmlformats.org/presentationml/2006/main">
   <p:cSld>
     <p:spTree>
@@ -11168,31 +11197,1761 @@
           </a:p>
         </p:txBody>
       </p:sp>
-      <p:sp>
-        <p:nvSpPr>
-          <p:cNvPr id="3" name="Content Placeholder 2">
+      <p:graphicFrame>
+        <p:nvGraphicFramePr>
+          <p:cNvPr id="4" name="Table 3">
             <a:extLst>
               <a:ext uri="{FF2B5EF4-FFF2-40B4-BE49-F238E27FC236}">
-                <a16:creationId xmlns:a16="http://schemas.microsoft.com/office/drawing/2014/main" id="{6B169074-D98A-4A0D-9E2D-AA1882EC5FA2}"/>
+                <a16:creationId xmlns:a16="http://schemas.microsoft.com/office/drawing/2014/main" id="{BB70C7B0-D767-44F9-B788-8904144B9C69}"/>
               </a:ext>
             </a:extLst>
           </p:cNvPr>
-          <p:cNvSpPr>
-            <a:spLocks noGrp="1"/>
-          </p:cNvSpPr>
+          <p:cNvGraphicFramePr>
+            <a:graphicFrameLocks noGrp="1"/>
+          </p:cNvGraphicFramePr>
           <p:nvPr>
-            <p:ph idx="1"/>
+            <p:extLst>
+              <p:ext uri="{D42A27DB-BD31-4B8C-83A1-F6EECF244321}">
+                <p14:modId xmlns:p14="http://schemas.microsoft.com/office/powerpoint/2010/main" val="4005867037"/>
+              </p:ext>
+            </p:extLst>
           </p:nvPr>
-        </p:nvSpPr>
-        <p:spPr/>
-        <p:txBody>
-          <a:bodyPr/>
-          <a:lstStyle/>
-          <a:p>
-            <a:endParaRPr lang="en-US"/>
-          </a:p>
-        </p:txBody>
-      </p:sp>
+        </p:nvGraphicFramePr>
+        <p:xfrm>
+          <a:off x="3520440" y="2712721"/>
+          <a:ext cx="4808220" cy="2134960"/>
+        </p:xfrm>
+        <a:graphic>
+          <a:graphicData uri="http://schemas.openxmlformats.org/drawingml/2006/table">
+            <a:tbl>
+              <a:tblPr/>
+              <a:tblGrid>
+                <a:gridCol w="1450656">
+                  <a:extLst>
+                    <a:ext uri="{9D8B030D-6E8A-4147-A177-3AD203B41FA5}">
+                      <a16:colId xmlns:a16="http://schemas.microsoft.com/office/drawing/2014/main" val="2359479184"/>
+                    </a:ext>
+                  </a:extLst>
+                </a:gridCol>
+                <a:gridCol w="1450656">
+                  <a:extLst>
+                    <a:ext uri="{9D8B030D-6E8A-4147-A177-3AD203B41FA5}">
+                      <a16:colId xmlns:a16="http://schemas.microsoft.com/office/drawing/2014/main" val="829347169"/>
+                    </a:ext>
+                  </a:extLst>
+                </a:gridCol>
+                <a:gridCol w="1158183">
+                  <a:extLst>
+                    <a:ext uri="{9D8B030D-6E8A-4147-A177-3AD203B41FA5}">
+                      <a16:colId xmlns:a16="http://schemas.microsoft.com/office/drawing/2014/main" val="3074992829"/>
+                    </a:ext>
+                  </a:extLst>
+                </a:gridCol>
+                <a:gridCol w="748725">
+                  <a:extLst>
+                    <a:ext uri="{9D8B030D-6E8A-4147-A177-3AD203B41FA5}">
+                      <a16:colId xmlns:a16="http://schemas.microsoft.com/office/drawing/2014/main" val="913600405"/>
+                    </a:ext>
+                  </a:extLst>
+                </a:gridCol>
+              </a:tblGrid>
+              <a:tr h="469780">
+                <a:tc>
+                  <a:txBody>
+                    <a:bodyPr/>
+                    <a:lstStyle/>
+                    <a:p>
+                      <a:pPr algn="ctr" fontAlgn="ctr"/>
+                      <a:r>
+                        <a:rPr lang="en-US" sz="1400" b="1" i="0" u="none" strike="noStrike" dirty="0">
+                          <a:solidFill>
+                            <a:srgbClr val="000000"/>
+                          </a:solidFill>
+                          <a:effectLst/>
+                          <a:latin typeface="Calibri" panose="020F0502020204030204" pitchFamily="34" charset="0"/>
+                        </a:rPr>
+                        <a:t>Metric</a:t>
+                      </a:r>
+                    </a:p>
+                  </a:txBody>
+                  <a:tcPr marL="9525" marR="9525" marT="9525" marB="0" anchor="ctr">
+                    <a:lnL w="6350" cap="flat" cmpd="sng" algn="ctr">
+                      <a:solidFill>
+                        <a:srgbClr val="000000"/>
+                      </a:solidFill>
+                      <a:prstDash val="solid"/>
+                      <a:round/>
+                      <a:headEnd type="none" w="med" len="med"/>
+                      <a:tailEnd type="none" w="med" len="med"/>
+                    </a:lnL>
+                    <a:lnR w="6350" cap="flat" cmpd="sng" algn="ctr">
+                      <a:solidFill>
+                        <a:srgbClr val="000000"/>
+                      </a:solidFill>
+                      <a:prstDash val="solid"/>
+                      <a:round/>
+                      <a:headEnd type="none" w="med" len="med"/>
+                      <a:tailEnd type="none" w="med" len="med"/>
+                    </a:lnR>
+                    <a:lnT w="6350" cap="flat" cmpd="sng" algn="ctr">
+                      <a:solidFill>
+                        <a:srgbClr val="000000"/>
+                      </a:solidFill>
+                      <a:prstDash val="solid"/>
+                      <a:round/>
+                      <a:headEnd type="none" w="med" len="med"/>
+                      <a:tailEnd type="none" w="med" len="med"/>
+                    </a:lnT>
+                    <a:lnB w="6350" cap="flat" cmpd="sng" algn="ctr">
+                      <a:solidFill>
+                        <a:srgbClr val="000000"/>
+                      </a:solidFill>
+                      <a:prstDash val="solid"/>
+                      <a:round/>
+                      <a:headEnd type="none" w="med" len="med"/>
+                      <a:tailEnd type="none" w="med" len="med"/>
+                    </a:lnB>
+                    <a:solidFill>
+                      <a:srgbClr val="D0CECE"/>
+                    </a:solidFill>
+                  </a:tcPr>
+                </a:tc>
+                <a:tc>
+                  <a:txBody>
+                    <a:bodyPr/>
+                    <a:lstStyle/>
+                    <a:p>
+                      <a:pPr algn="ctr" fontAlgn="ctr"/>
+                      <a:r>
+                        <a:rPr lang="en-US" sz="1400" b="1" i="0" u="none" strike="noStrike">
+                          <a:solidFill>
+                            <a:srgbClr val="000000"/>
+                          </a:solidFill>
+                          <a:effectLst/>
+                          <a:latin typeface="Calibri" panose="020F0502020204030204" pitchFamily="34" charset="0"/>
+                        </a:rPr>
+                        <a:t>SMGAN BASELINE</a:t>
+                      </a:r>
+                    </a:p>
+                  </a:txBody>
+                  <a:tcPr marL="9525" marR="9525" marT="9525" marB="0" anchor="ctr">
+                    <a:lnL w="6350" cap="flat" cmpd="sng" algn="ctr">
+                      <a:solidFill>
+                        <a:srgbClr val="000000"/>
+                      </a:solidFill>
+                      <a:prstDash val="solid"/>
+                      <a:round/>
+                      <a:headEnd type="none" w="med" len="med"/>
+                      <a:tailEnd type="none" w="med" len="med"/>
+                    </a:lnL>
+                    <a:lnR w="6350" cap="flat" cmpd="sng" algn="ctr">
+                      <a:solidFill>
+                        <a:srgbClr val="000000"/>
+                      </a:solidFill>
+                      <a:prstDash val="solid"/>
+                      <a:round/>
+                      <a:headEnd type="none" w="med" len="med"/>
+                      <a:tailEnd type="none" w="med" len="med"/>
+                    </a:lnR>
+                    <a:lnT w="6350" cap="flat" cmpd="sng" algn="ctr">
+                      <a:solidFill>
+                        <a:srgbClr val="000000"/>
+                      </a:solidFill>
+                      <a:prstDash val="solid"/>
+                      <a:round/>
+                      <a:headEnd type="none" w="med" len="med"/>
+                      <a:tailEnd type="none" w="med" len="med"/>
+                    </a:lnT>
+                    <a:lnB w="6350" cap="flat" cmpd="sng" algn="ctr">
+                      <a:solidFill>
+                        <a:srgbClr val="000000"/>
+                      </a:solidFill>
+                      <a:prstDash val="solid"/>
+                      <a:round/>
+                      <a:headEnd type="none" w="med" len="med"/>
+                      <a:tailEnd type="none" w="med" len="med"/>
+                    </a:lnB>
+                    <a:solidFill>
+                      <a:srgbClr val="D0CECE"/>
+                    </a:solidFill>
+                  </a:tcPr>
+                </a:tc>
+                <a:tc>
+                  <a:txBody>
+                    <a:bodyPr/>
+                    <a:lstStyle/>
+                    <a:p>
+                      <a:pPr algn="ctr" fontAlgn="ctr"/>
+                      <a:r>
+                        <a:rPr lang="en-US" sz="1400" b="1" i="0" u="none" strike="noStrike">
+                          <a:solidFill>
+                            <a:srgbClr val="000000"/>
+                          </a:solidFill>
+                          <a:effectLst/>
+                          <a:latin typeface="Calibri" panose="020F0502020204030204" pitchFamily="34" charset="0"/>
+                        </a:rPr>
+                        <a:t>SMGAN Tuned</a:t>
+                      </a:r>
+                    </a:p>
+                  </a:txBody>
+                  <a:tcPr marL="9525" marR="9525" marT="9525" marB="0" anchor="ctr">
+                    <a:lnL w="6350" cap="flat" cmpd="sng" algn="ctr">
+                      <a:solidFill>
+                        <a:srgbClr val="000000"/>
+                      </a:solidFill>
+                      <a:prstDash val="solid"/>
+                      <a:round/>
+                      <a:headEnd type="none" w="med" len="med"/>
+                      <a:tailEnd type="none" w="med" len="med"/>
+                    </a:lnL>
+                    <a:lnR w="6350" cap="flat" cmpd="sng" algn="ctr">
+                      <a:solidFill>
+                        <a:srgbClr val="000000"/>
+                      </a:solidFill>
+                      <a:prstDash val="solid"/>
+                      <a:round/>
+                      <a:headEnd type="none" w="med" len="med"/>
+                      <a:tailEnd type="none" w="med" len="med"/>
+                    </a:lnR>
+                    <a:lnT w="6350" cap="flat" cmpd="sng" algn="ctr">
+                      <a:solidFill>
+                        <a:srgbClr val="000000"/>
+                      </a:solidFill>
+                      <a:prstDash val="solid"/>
+                      <a:round/>
+                      <a:headEnd type="none" w="med" len="med"/>
+                      <a:tailEnd type="none" w="med" len="med"/>
+                    </a:lnT>
+                    <a:lnB w="6350" cap="flat" cmpd="sng" algn="ctr">
+                      <a:solidFill>
+                        <a:srgbClr val="000000"/>
+                      </a:solidFill>
+                      <a:prstDash val="solid"/>
+                      <a:round/>
+                      <a:headEnd type="none" w="med" len="med"/>
+                      <a:tailEnd type="none" w="med" len="med"/>
+                    </a:lnB>
+                    <a:solidFill>
+                      <a:srgbClr val="D0CECE"/>
+                    </a:solidFill>
+                  </a:tcPr>
+                </a:tc>
+                <a:tc>
+                  <a:txBody>
+                    <a:bodyPr/>
+                    <a:lstStyle/>
+                    <a:p>
+                      <a:pPr algn="ctr" fontAlgn="b"/>
+                      <a:r>
+                        <a:rPr lang="en-US" sz="1400" b="1" i="0" u="none" strike="noStrike" dirty="0">
+                          <a:solidFill>
+                            <a:srgbClr val="000000"/>
+                          </a:solidFill>
+                          <a:effectLst/>
+                          <a:latin typeface="Calibri" panose="020F0502020204030204" pitchFamily="34" charset="0"/>
+                        </a:rPr>
+                        <a:t>MolGAN</a:t>
+                      </a:r>
+                    </a:p>
+                  </a:txBody>
+                  <a:tcPr marL="9525" marR="9525" marT="9525" marB="0" anchor="b">
+                    <a:lnL w="6350" cap="flat" cmpd="sng" algn="ctr">
+                      <a:solidFill>
+                        <a:srgbClr val="000000"/>
+                      </a:solidFill>
+                      <a:prstDash val="solid"/>
+                      <a:round/>
+                      <a:headEnd type="none" w="med" len="med"/>
+                      <a:tailEnd type="none" w="med" len="med"/>
+                    </a:lnL>
+                    <a:lnR w="6350" cap="flat" cmpd="sng" algn="ctr">
+                      <a:solidFill>
+                        <a:srgbClr val="000000"/>
+                      </a:solidFill>
+                      <a:prstDash val="solid"/>
+                      <a:round/>
+                      <a:headEnd type="none" w="med" len="med"/>
+                      <a:tailEnd type="none" w="med" len="med"/>
+                    </a:lnR>
+                    <a:lnT w="6350" cap="flat" cmpd="sng" algn="ctr">
+                      <a:solidFill>
+                        <a:srgbClr val="000000"/>
+                      </a:solidFill>
+                      <a:prstDash val="solid"/>
+                      <a:round/>
+                      <a:headEnd type="none" w="med" len="med"/>
+                      <a:tailEnd type="none" w="med" len="med"/>
+                    </a:lnT>
+                    <a:lnB w="6350" cap="flat" cmpd="sng" algn="ctr">
+                      <a:solidFill>
+                        <a:srgbClr val="000000"/>
+                      </a:solidFill>
+                      <a:prstDash val="solid"/>
+                      <a:round/>
+                      <a:headEnd type="none" w="med" len="med"/>
+                      <a:tailEnd type="none" w="med" len="med"/>
+                    </a:lnB>
+                    <a:solidFill>
+                      <a:srgbClr val="D0CECE"/>
+                    </a:solidFill>
+                  </a:tcPr>
+                </a:tc>
+                <a:extLst>
+                  <a:ext uri="{0D108BD9-81ED-4DB2-BD59-A6C34878D82A}">
+                    <a16:rowId xmlns:a16="http://schemas.microsoft.com/office/drawing/2014/main" val="4155815044"/>
+                  </a:ext>
+                </a:extLst>
+              </a:tr>
+              <a:tr h="277530">
+                <a:tc>
+                  <a:txBody>
+                    <a:bodyPr/>
+                    <a:lstStyle/>
+                    <a:p>
+                      <a:pPr algn="ctr" fontAlgn="ctr"/>
+                      <a:r>
+                        <a:rPr lang="en-US" sz="1400" b="0" i="0" u="none" strike="noStrike" dirty="0">
+                          <a:solidFill>
+                            <a:srgbClr val="000000"/>
+                          </a:solidFill>
+                          <a:effectLst/>
+                          <a:latin typeface="Calibri" panose="020F0502020204030204" pitchFamily="34" charset="0"/>
+                        </a:rPr>
+                        <a:t>Valid (%)</a:t>
+                      </a:r>
+                    </a:p>
+                  </a:txBody>
+                  <a:tcPr marL="9525" marR="9525" marT="9525" marB="0" anchor="ctr">
+                    <a:lnL w="6350" cap="flat" cmpd="sng" algn="ctr">
+                      <a:solidFill>
+                        <a:srgbClr val="000000"/>
+                      </a:solidFill>
+                      <a:prstDash val="solid"/>
+                      <a:round/>
+                      <a:headEnd type="none" w="med" len="med"/>
+                      <a:tailEnd type="none" w="med" len="med"/>
+                    </a:lnL>
+                    <a:lnR w="6350" cap="flat" cmpd="sng" algn="ctr">
+                      <a:solidFill>
+                        <a:srgbClr val="000000"/>
+                      </a:solidFill>
+                      <a:prstDash val="solid"/>
+                      <a:round/>
+                      <a:headEnd type="none" w="med" len="med"/>
+                      <a:tailEnd type="none" w="med" len="med"/>
+                    </a:lnR>
+                    <a:lnT w="6350" cap="flat" cmpd="sng" algn="ctr">
+                      <a:solidFill>
+                        <a:srgbClr val="000000"/>
+                      </a:solidFill>
+                      <a:prstDash val="solid"/>
+                      <a:round/>
+                      <a:headEnd type="none" w="med" len="med"/>
+                      <a:tailEnd type="none" w="med" len="med"/>
+                    </a:lnT>
+                    <a:lnB w="6350" cap="flat" cmpd="sng" algn="ctr">
+                      <a:solidFill>
+                        <a:srgbClr val="000000"/>
+                      </a:solidFill>
+                      <a:prstDash val="solid"/>
+                      <a:round/>
+                      <a:headEnd type="none" w="med" len="med"/>
+                      <a:tailEnd type="none" w="med" len="med"/>
+                    </a:lnB>
+                  </a:tcPr>
+                </a:tc>
+                <a:tc>
+                  <a:txBody>
+                    <a:bodyPr/>
+                    <a:lstStyle/>
+                    <a:p>
+                      <a:pPr algn="ctr" fontAlgn="ctr"/>
+                      <a:r>
+                        <a:rPr lang="en-US" sz="1400" b="0" i="0" u="none" strike="noStrike">
+                          <a:solidFill>
+                            <a:srgbClr val="000000"/>
+                          </a:solidFill>
+                          <a:effectLst/>
+                          <a:latin typeface="Calibri" panose="020F0502020204030204" pitchFamily="34" charset="0"/>
+                        </a:rPr>
+                        <a:t>17.5</a:t>
+                      </a:r>
+                    </a:p>
+                  </a:txBody>
+                  <a:tcPr marL="9525" marR="9525" marT="9525" marB="0" anchor="ctr">
+                    <a:lnL w="6350" cap="flat" cmpd="sng" algn="ctr">
+                      <a:solidFill>
+                        <a:srgbClr val="000000"/>
+                      </a:solidFill>
+                      <a:prstDash val="solid"/>
+                      <a:round/>
+                      <a:headEnd type="none" w="med" len="med"/>
+                      <a:tailEnd type="none" w="med" len="med"/>
+                    </a:lnL>
+                    <a:lnR w="6350" cap="flat" cmpd="sng" algn="ctr">
+                      <a:solidFill>
+                        <a:srgbClr val="000000"/>
+                      </a:solidFill>
+                      <a:prstDash val="solid"/>
+                      <a:round/>
+                      <a:headEnd type="none" w="med" len="med"/>
+                      <a:tailEnd type="none" w="med" len="med"/>
+                    </a:lnR>
+                    <a:lnT w="6350" cap="flat" cmpd="sng" algn="ctr">
+                      <a:solidFill>
+                        <a:srgbClr val="000000"/>
+                      </a:solidFill>
+                      <a:prstDash val="solid"/>
+                      <a:round/>
+                      <a:headEnd type="none" w="med" len="med"/>
+                      <a:tailEnd type="none" w="med" len="med"/>
+                    </a:lnT>
+                    <a:lnB w="6350" cap="flat" cmpd="sng" algn="ctr">
+                      <a:solidFill>
+                        <a:srgbClr val="000000"/>
+                      </a:solidFill>
+                      <a:prstDash val="solid"/>
+                      <a:round/>
+                      <a:headEnd type="none" w="med" len="med"/>
+                      <a:tailEnd type="none" w="med" len="med"/>
+                    </a:lnB>
+                  </a:tcPr>
+                </a:tc>
+                <a:tc>
+                  <a:txBody>
+                    <a:bodyPr/>
+                    <a:lstStyle/>
+                    <a:p>
+                      <a:pPr algn="ctr" fontAlgn="ctr"/>
+                      <a:r>
+                        <a:rPr lang="en-US" sz="1400" b="0" i="0" u="none" strike="noStrike">
+                          <a:solidFill>
+                            <a:srgbClr val="000000"/>
+                          </a:solidFill>
+                          <a:effectLst/>
+                          <a:latin typeface="Calibri" panose="020F0502020204030204" pitchFamily="34" charset="0"/>
+                        </a:rPr>
+                        <a:t>31.20</a:t>
+                      </a:r>
+                    </a:p>
+                  </a:txBody>
+                  <a:tcPr marL="9525" marR="9525" marT="9525" marB="0" anchor="ctr">
+                    <a:lnL w="6350" cap="flat" cmpd="sng" algn="ctr">
+                      <a:solidFill>
+                        <a:srgbClr val="000000"/>
+                      </a:solidFill>
+                      <a:prstDash val="solid"/>
+                      <a:round/>
+                      <a:headEnd type="none" w="med" len="med"/>
+                      <a:tailEnd type="none" w="med" len="med"/>
+                    </a:lnL>
+                    <a:lnR w="6350" cap="flat" cmpd="sng" algn="ctr">
+                      <a:solidFill>
+                        <a:srgbClr val="000000"/>
+                      </a:solidFill>
+                      <a:prstDash val="solid"/>
+                      <a:round/>
+                      <a:headEnd type="none" w="med" len="med"/>
+                      <a:tailEnd type="none" w="med" len="med"/>
+                    </a:lnR>
+                    <a:lnT w="6350" cap="flat" cmpd="sng" algn="ctr">
+                      <a:solidFill>
+                        <a:srgbClr val="000000"/>
+                      </a:solidFill>
+                      <a:prstDash val="solid"/>
+                      <a:round/>
+                      <a:headEnd type="none" w="med" len="med"/>
+                      <a:tailEnd type="none" w="med" len="med"/>
+                    </a:lnT>
+                    <a:lnB w="6350" cap="flat" cmpd="sng" algn="ctr">
+                      <a:solidFill>
+                        <a:srgbClr val="000000"/>
+                      </a:solidFill>
+                      <a:prstDash val="solid"/>
+                      <a:round/>
+                      <a:headEnd type="none" w="med" len="med"/>
+                      <a:tailEnd type="none" w="med" len="med"/>
+                    </a:lnB>
+                  </a:tcPr>
+                </a:tc>
+                <a:tc>
+                  <a:txBody>
+                    <a:bodyPr/>
+                    <a:lstStyle/>
+                    <a:p>
+                      <a:pPr algn="ctr" fontAlgn="b"/>
+                      <a:r>
+                        <a:rPr lang="en-US" sz="1400" b="0" i="0" u="none" strike="noStrike">
+                          <a:solidFill>
+                            <a:srgbClr val="000000"/>
+                          </a:solidFill>
+                          <a:effectLst/>
+                          <a:latin typeface="Calibri" panose="020F0502020204030204" pitchFamily="34" charset="0"/>
+                        </a:rPr>
+                        <a:t>100.00</a:t>
+                      </a:r>
+                    </a:p>
+                  </a:txBody>
+                  <a:tcPr marL="9525" marR="9525" marT="9525" marB="0" anchor="b">
+                    <a:lnL w="6350" cap="flat" cmpd="sng" algn="ctr">
+                      <a:solidFill>
+                        <a:srgbClr val="000000"/>
+                      </a:solidFill>
+                      <a:prstDash val="solid"/>
+                      <a:round/>
+                      <a:headEnd type="none" w="med" len="med"/>
+                      <a:tailEnd type="none" w="med" len="med"/>
+                    </a:lnL>
+                    <a:lnR w="6350" cap="flat" cmpd="sng" algn="ctr">
+                      <a:solidFill>
+                        <a:srgbClr val="000000"/>
+                      </a:solidFill>
+                      <a:prstDash val="solid"/>
+                      <a:round/>
+                      <a:headEnd type="none" w="med" len="med"/>
+                      <a:tailEnd type="none" w="med" len="med"/>
+                    </a:lnR>
+                    <a:lnT w="6350" cap="flat" cmpd="sng" algn="ctr">
+                      <a:solidFill>
+                        <a:srgbClr val="000000"/>
+                      </a:solidFill>
+                      <a:prstDash val="solid"/>
+                      <a:round/>
+                      <a:headEnd type="none" w="med" len="med"/>
+                      <a:tailEnd type="none" w="med" len="med"/>
+                    </a:lnT>
+                    <a:lnB w="6350" cap="flat" cmpd="sng" algn="ctr">
+                      <a:solidFill>
+                        <a:srgbClr val="000000"/>
+                      </a:solidFill>
+                      <a:prstDash val="solid"/>
+                      <a:round/>
+                      <a:headEnd type="none" w="med" len="med"/>
+                      <a:tailEnd type="none" w="med" len="med"/>
+                    </a:lnB>
+                  </a:tcPr>
+                </a:tc>
+                <a:extLst>
+                  <a:ext uri="{0D108BD9-81ED-4DB2-BD59-A6C34878D82A}">
+                    <a16:rowId xmlns:a16="http://schemas.microsoft.com/office/drawing/2014/main" val="3968071481"/>
+                  </a:ext>
+                </a:extLst>
+              </a:tr>
+              <a:tr h="277530">
+                <a:tc>
+                  <a:txBody>
+                    <a:bodyPr/>
+                    <a:lstStyle/>
+                    <a:p>
+                      <a:pPr algn="ctr" fontAlgn="ctr"/>
+                      <a:r>
+                        <a:rPr lang="en-US" sz="1400" b="0" i="0" u="none" strike="noStrike" dirty="0">
+                          <a:solidFill>
+                            <a:srgbClr val="000000"/>
+                          </a:solidFill>
+                          <a:effectLst/>
+                          <a:latin typeface="Calibri" panose="020F0502020204030204" pitchFamily="34" charset="0"/>
+                        </a:rPr>
+                        <a:t>Unique (%)</a:t>
+                      </a:r>
+                    </a:p>
+                  </a:txBody>
+                  <a:tcPr marL="9525" marR="9525" marT="9525" marB="0" anchor="ctr">
+                    <a:lnL w="6350" cap="flat" cmpd="sng" algn="ctr">
+                      <a:solidFill>
+                        <a:srgbClr val="000000"/>
+                      </a:solidFill>
+                      <a:prstDash val="solid"/>
+                      <a:round/>
+                      <a:headEnd type="none" w="med" len="med"/>
+                      <a:tailEnd type="none" w="med" len="med"/>
+                    </a:lnL>
+                    <a:lnR w="6350" cap="flat" cmpd="sng" algn="ctr">
+                      <a:solidFill>
+                        <a:srgbClr val="000000"/>
+                      </a:solidFill>
+                      <a:prstDash val="solid"/>
+                      <a:round/>
+                      <a:headEnd type="none" w="med" len="med"/>
+                      <a:tailEnd type="none" w="med" len="med"/>
+                    </a:lnR>
+                    <a:lnT w="6350" cap="flat" cmpd="sng" algn="ctr">
+                      <a:solidFill>
+                        <a:srgbClr val="000000"/>
+                      </a:solidFill>
+                      <a:prstDash val="solid"/>
+                      <a:round/>
+                      <a:headEnd type="none" w="med" len="med"/>
+                      <a:tailEnd type="none" w="med" len="med"/>
+                    </a:lnT>
+                    <a:lnB w="6350" cap="flat" cmpd="sng" algn="ctr">
+                      <a:solidFill>
+                        <a:srgbClr val="000000"/>
+                      </a:solidFill>
+                      <a:prstDash val="solid"/>
+                      <a:round/>
+                      <a:headEnd type="none" w="med" len="med"/>
+                      <a:tailEnd type="none" w="med" len="med"/>
+                    </a:lnB>
+                    <a:solidFill>
+                      <a:srgbClr val="F2F2F2"/>
+                    </a:solidFill>
+                  </a:tcPr>
+                </a:tc>
+                <a:tc>
+                  <a:txBody>
+                    <a:bodyPr/>
+                    <a:lstStyle/>
+                    <a:p>
+                      <a:pPr algn="ctr" fontAlgn="ctr"/>
+                      <a:r>
+                        <a:rPr lang="en-US" sz="1400" b="0" i="0" u="none" strike="noStrike" dirty="0">
+                          <a:solidFill>
+                            <a:srgbClr val="000000"/>
+                          </a:solidFill>
+                          <a:effectLst/>
+                          <a:latin typeface="Calibri" panose="020F0502020204030204" pitchFamily="34" charset="0"/>
+                        </a:rPr>
+                        <a:t>0.02</a:t>
+                      </a:r>
+                    </a:p>
+                  </a:txBody>
+                  <a:tcPr marL="9525" marR="9525" marT="9525" marB="0" anchor="ctr">
+                    <a:lnL w="6350" cap="flat" cmpd="sng" algn="ctr">
+                      <a:solidFill>
+                        <a:srgbClr val="000000"/>
+                      </a:solidFill>
+                      <a:prstDash val="solid"/>
+                      <a:round/>
+                      <a:headEnd type="none" w="med" len="med"/>
+                      <a:tailEnd type="none" w="med" len="med"/>
+                    </a:lnL>
+                    <a:lnR w="6350" cap="flat" cmpd="sng" algn="ctr">
+                      <a:solidFill>
+                        <a:srgbClr val="000000"/>
+                      </a:solidFill>
+                      <a:prstDash val="solid"/>
+                      <a:round/>
+                      <a:headEnd type="none" w="med" len="med"/>
+                      <a:tailEnd type="none" w="med" len="med"/>
+                    </a:lnR>
+                    <a:lnT w="6350" cap="flat" cmpd="sng" algn="ctr">
+                      <a:solidFill>
+                        <a:srgbClr val="000000"/>
+                      </a:solidFill>
+                      <a:prstDash val="solid"/>
+                      <a:round/>
+                      <a:headEnd type="none" w="med" len="med"/>
+                      <a:tailEnd type="none" w="med" len="med"/>
+                    </a:lnT>
+                    <a:lnB w="6350" cap="flat" cmpd="sng" algn="ctr">
+                      <a:solidFill>
+                        <a:srgbClr val="000000"/>
+                      </a:solidFill>
+                      <a:prstDash val="solid"/>
+                      <a:round/>
+                      <a:headEnd type="none" w="med" len="med"/>
+                      <a:tailEnd type="none" w="med" len="med"/>
+                    </a:lnB>
+                    <a:solidFill>
+                      <a:srgbClr val="F2F2F2"/>
+                    </a:solidFill>
+                  </a:tcPr>
+                </a:tc>
+                <a:tc>
+                  <a:txBody>
+                    <a:bodyPr/>
+                    <a:lstStyle/>
+                    <a:p>
+                      <a:pPr algn="ctr" fontAlgn="ctr"/>
+                      <a:r>
+                        <a:rPr lang="en-US" sz="1400" b="0" i="0" u="none" strike="noStrike">
+                          <a:solidFill>
+                            <a:srgbClr val="000000"/>
+                          </a:solidFill>
+                          <a:effectLst/>
+                          <a:latin typeface="Calibri" panose="020F0502020204030204" pitchFamily="34" charset="0"/>
+                        </a:rPr>
+                        <a:t>0.05</a:t>
+                      </a:r>
+                    </a:p>
+                  </a:txBody>
+                  <a:tcPr marL="9525" marR="9525" marT="9525" marB="0" anchor="ctr">
+                    <a:lnL w="6350" cap="flat" cmpd="sng" algn="ctr">
+                      <a:solidFill>
+                        <a:srgbClr val="000000"/>
+                      </a:solidFill>
+                      <a:prstDash val="solid"/>
+                      <a:round/>
+                      <a:headEnd type="none" w="med" len="med"/>
+                      <a:tailEnd type="none" w="med" len="med"/>
+                    </a:lnL>
+                    <a:lnR w="6350" cap="flat" cmpd="sng" algn="ctr">
+                      <a:solidFill>
+                        <a:srgbClr val="000000"/>
+                      </a:solidFill>
+                      <a:prstDash val="solid"/>
+                      <a:round/>
+                      <a:headEnd type="none" w="med" len="med"/>
+                      <a:tailEnd type="none" w="med" len="med"/>
+                    </a:lnR>
+                    <a:lnT w="6350" cap="flat" cmpd="sng" algn="ctr">
+                      <a:solidFill>
+                        <a:srgbClr val="000000"/>
+                      </a:solidFill>
+                      <a:prstDash val="solid"/>
+                      <a:round/>
+                      <a:headEnd type="none" w="med" len="med"/>
+                      <a:tailEnd type="none" w="med" len="med"/>
+                    </a:lnT>
+                    <a:lnB w="6350" cap="flat" cmpd="sng" algn="ctr">
+                      <a:solidFill>
+                        <a:srgbClr val="000000"/>
+                      </a:solidFill>
+                      <a:prstDash val="solid"/>
+                      <a:round/>
+                      <a:headEnd type="none" w="med" len="med"/>
+                      <a:tailEnd type="none" w="med" len="med"/>
+                    </a:lnB>
+                    <a:solidFill>
+                      <a:srgbClr val="F2F2F2"/>
+                    </a:solidFill>
+                  </a:tcPr>
+                </a:tc>
+                <a:tc>
+                  <a:txBody>
+                    <a:bodyPr/>
+                    <a:lstStyle/>
+                    <a:p>
+                      <a:pPr algn="ctr" fontAlgn="b"/>
+                      <a:r>
+                        <a:rPr lang="en-US" sz="1400" b="0" i="0" u="none" strike="noStrike">
+                          <a:solidFill>
+                            <a:srgbClr val="000000"/>
+                          </a:solidFill>
+                          <a:effectLst/>
+                          <a:latin typeface="Calibri" panose="020F0502020204030204" pitchFamily="34" charset="0"/>
+                        </a:rPr>
+                        <a:t>0.03</a:t>
+                      </a:r>
+                    </a:p>
+                  </a:txBody>
+                  <a:tcPr marL="9525" marR="9525" marT="9525" marB="0" anchor="b">
+                    <a:lnL w="6350" cap="flat" cmpd="sng" algn="ctr">
+                      <a:solidFill>
+                        <a:srgbClr val="000000"/>
+                      </a:solidFill>
+                      <a:prstDash val="solid"/>
+                      <a:round/>
+                      <a:headEnd type="none" w="med" len="med"/>
+                      <a:tailEnd type="none" w="med" len="med"/>
+                    </a:lnL>
+                    <a:lnR w="6350" cap="flat" cmpd="sng" algn="ctr">
+                      <a:solidFill>
+                        <a:srgbClr val="000000"/>
+                      </a:solidFill>
+                      <a:prstDash val="solid"/>
+                      <a:round/>
+                      <a:headEnd type="none" w="med" len="med"/>
+                      <a:tailEnd type="none" w="med" len="med"/>
+                    </a:lnR>
+                    <a:lnT w="6350" cap="flat" cmpd="sng" algn="ctr">
+                      <a:solidFill>
+                        <a:srgbClr val="000000"/>
+                      </a:solidFill>
+                      <a:prstDash val="solid"/>
+                      <a:round/>
+                      <a:headEnd type="none" w="med" len="med"/>
+                      <a:tailEnd type="none" w="med" len="med"/>
+                    </a:lnT>
+                    <a:lnB w="6350" cap="flat" cmpd="sng" algn="ctr">
+                      <a:solidFill>
+                        <a:srgbClr val="000000"/>
+                      </a:solidFill>
+                      <a:prstDash val="solid"/>
+                      <a:round/>
+                      <a:headEnd type="none" w="med" len="med"/>
+                      <a:tailEnd type="none" w="med" len="med"/>
+                    </a:lnB>
+                    <a:solidFill>
+                      <a:srgbClr val="F2F2F2"/>
+                    </a:solidFill>
+                  </a:tcPr>
+                </a:tc>
+                <a:extLst>
+                  <a:ext uri="{0D108BD9-81ED-4DB2-BD59-A6C34878D82A}">
+                    <a16:rowId xmlns:a16="http://schemas.microsoft.com/office/drawing/2014/main" val="200074580"/>
+                  </a:ext>
+                </a:extLst>
+              </a:tr>
+              <a:tr h="277530">
+                <a:tc>
+                  <a:txBody>
+                    <a:bodyPr/>
+                    <a:lstStyle/>
+                    <a:p>
+                      <a:pPr algn="ctr" fontAlgn="ctr"/>
+                      <a:r>
+                        <a:rPr lang="en-US" sz="1400" b="0" i="0" u="none" strike="noStrike">
+                          <a:solidFill>
+                            <a:srgbClr val="000000"/>
+                          </a:solidFill>
+                          <a:effectLst/>
+                          <a:latin typeface="Calibri" panose="020F0502020204030204" pitchFamily="34" charset="0"/>
+                        </a:rPr>
+                        <a:t> Novel (%)</a:t>
+                      </a:r>
+                    </a:p>
+                  </a:txBody>
+                  <a:tcPr marL="9525" marR="9525" marT="9525" marB="0" anchor="ctr">
+                    <a:lnL w="6350" cap="flat" cmpd="sng" algn="ctr">
+                      <a:solidFill>
+                        <a:srgbClr val="000000"/>
+                      </a:solidFill>
+                      <a:prstDash val="solid"/>
+                      <a:round/>
+                      <a:headEnd type="none" w="med" len="med"/>
+                      <a:tailEnd type="none" w="med" len="med"/>
+                    </a:lnL>
+                    <a:lnR w="6350" cap="flat" cmpd="sng" algn="ctr">
+                      <a:solidFill>
+                        <a:srgbClr val="000000"/>
+                      </a:solidFill>
+                      <a:prstDash val="solid"/>
+                      <a:round/>
+                      <a:headEnd type="none" w="med" len="med"/>
+                      <a:tailEnd type="none" w="med" len="med"/>
+                    </a:lnR>
+                    <a:lnT w="6350" cap="flat" cmpd="sng" algn="ctr">
+                      <a:solidFill>
+                        <a:srgbClr val="000000"/>
+                      </a:solidFill>
+                      <a:prstDash val="solid"/>
+                      <a:round/>
+                      <a:headEnd type="none" w="med" len="med"/>
+                      <a:tailEnd type="none" w="med" len="med"/>
+                    </a:lnT>
+                    <a:lnB w="6350" cap="flat" cmpd="sng" algn="ctr">
+                      <a:solidFill>
+                        <a:srgbClr val="000000"/>
+                      </a:solidFill>
+                      <a:prstDash val="solid"/>
+                      <a:round/>
+                      <a:headEnd type="none" w="med" len="med"/>
+                      <a:tailEnd type="none" w="med" len="med"/>
+                    </a:lnB>
+                  </a:tcPr>
+                </a:tc>
+                <a:tc>
+                  <a:txBody>
+                    <a:bodyPr/>
+                    <a:lstStyle/>
+                    <a:p>
+                      <a:pPr algn="ctr" fontAlgn="ctr"/>
+                      <a:r>
+                        <a:rPr lang="en-US" sz="1400" b="0" i="0" u="none" strike="noStrike" dirty="0">
+                          <a:solidFill>
+                            <a:srgbClr val="000000"/>
+                          </a:solidFill>
+                          <a:effectLst/>
+                          <a:latin typeface="Calibri" panose="020F0502020204030204" pitchFamily="34" charset="0"/>
+                        </a:rPr>
+                        <a:t>100</a:t>
+                      </a:r>
+                    </a:p>
+                  </a:txBody>
+                  <a:tcPr marL="9525" marR="9525" marT="9525" marB="0" anchor="ctr">
+                    <a:lnL w="6350" cap="flat" cmpd="sng" algn="ctr">
+                      <a:solidFill>
+                        <a:srgbClr val="000000"/>
+                      </a:solidFill>
+                      <a:prstDash val="solid"/>
+                      <a:round/>
+                      <a:headEnd type="none" w="med" len="med"/>
+                      <a:tailEnd type="none" w="med" len="med"/>
+                    </a:lnL>
+                    <a:lnR w="6350" cap="flat" cmpd="sng" algn="ctr">
+                      <a:solidFill>
+                        <a:srgbClr val="000000"/>
+                      </a:solidFill>
+                      <a:prstDash val="solid"/>
+                      <a:round/>
+                      <a:headEnd type="none" w="med" len="med"/>
+                      <a:tailEnd type="none" w="med" len="med"/>
+                    </a:lnR>
+                    <a:lnT w="6350" cap="flat" cmpd="sng" algn="ctr">
+                      <a:solidFill>
+                        <a:srgbClr val="000000"/>
+                      </a:solidFill>
+                      <a:prstDash val="solid"/>
+                      <a:round/>
+                      <a:headEnd type="none" w="med" len="med"/>
+                      <a:tailEnd type="none" w="med" len="med"/>
+                    </a:lnT>
+                    <a:lnB w="6350" cap="flat" cmpd="sng" algn="ctr">
+                      <a:solidFill>
+                        <a:srgbClr val="000000"/>
+                      </a:solidFill>
+                      <a:prstDash val="solid"/>
+                      <a:round/>
+                      <a:headEnd type="none" w="med" len="med"/>
+                      <a:tailEnd type="none" w="med" len="med"/>
+                    </a:lnB>
+                  </a:tcPr>
+                </a:tc>
+                <a:tc>
+                  <a:txBody>
+                    <a:bodyPr/>
+                    <a:lstStyle/>
+                    <a:p>
+                      <a:pPr algn="ctr" fontAlgn="ctr"/>
+                      <a:r>
+                        <a:rPr lang="en-US" sz="1400" b="0" i="0" u="none" strike="noStrike">
+                          <a:solidFill>
+                            <a:srgbClr val="000000"/>
+                          </a:solidFill>
+                          <a:effectLst/>
+                          <a:latin typeface="Calibri" panose="020F0502020204030204" pitchFamily="34" charset="0"/>
+                        </a:rPr>
+                        <a:t>100.00</a:t>
+                      </a:r>
+                    </a:p>
+                  </a:txBody>
+                  <a:tcPr marL="9525" marR="9525" marT="9525" marB="0" anchor="ctr">
+                    <a:lnL w="6350" cap="flat" cmpd="sng" algn="ctr">
+                      <a:solidFill>
+                        <a:srgbClr val="000000"/>
+                      </a:solidFill>
+                      <a:prstDash val="solid"/>
+                      <a:round/>
+                      <a:headEnd type="none" w="med" len="med"/>
+                      <a:tailEnd type="none" w="med" len="med"/>
+                    </a:lnL>
+                    <a:lnR w="6350" cap="flat" cmpd="sng" algn="ctr">
+                      <a:solidFill>
+                        <a:srgbClr val="000000"/>
+                      </a:solidFill>
+                      <a:prstDash val="solid"/>
+                      <a:round/>
+                      <a:headEnd type="none" w="med" len="med"/>
+                      <a:tailEnd type="none" w="med" len="med"/>
+                    </a:lnR>
+                    <a:lnT w="6350" cap="flat" cmpd="sng" algn="ctr">
+                      <a:solidFill>
+                        <a:srgbClr val="000000"/>
+                      </a:solidFill>
+                      <a:prstDash val="solid"/>
+                      <a:round/>
+                      <a:headEnd type="none" w="med" len="med"/>
+                      <a:tailEnd type="none" w="med" len="med"/>
+                    </a:lnT>
+                    <a:lnB w="6350" cap="flat" cmpd="sng" algn="ctr">
+                      <a:solidFill>
+                        <a:srgbClr val="000000"/>
+                      </a:solidFill>
+                      <a:prstDash val="solid"/>
+                      <a:round/>
+                      <a:headEnd type="none" w="med" len="med"/>
+                      <a:tailEnd type="none" w="med" len="med"/>
+                    </a:lnB>
+                  </a:tcPr>
+                </a:tc>
+                <a:tc>
+                  <a:txBody>
+                    <a:bodyPr/>
+                    <a:lstStyle/>
+                    <a:p>
+                      <a:pPr algn="ctr" fontAlgn="b"/>
+                      <a:r>
+                        <a:rPr lang="en-US" sz="1400" b="0" i="0" u="none" strike="noStrike">
+                          <a:solidFill>
+                            <a:srgbClr val="000000"/>
+                          </a:solidFill>
+                          <a:effectLst/>
+                          <a:latin typeface="Calibri" panose="020F0502020204030204" pitchFamily="34" charset="0"/>
+                        </a:rPr>
+                        <a:t>100.00</a:t>
+                      </a:r>
+                    </a:p>
+                  </a:txBody>
+                  <a:tcPr marL="9525" marR="9525" marT="9525" marB="0" anchor="b">
+                    <a:lnL w="6350" cap="flat" cmpd="sng" algn="ctr">
+                      <a:solidFill>
+                        <a:srgbClr val="000000"/>
+                      </a:solidFill>
+                      <a:prstDash val="solid"/>
+                      <a:round/>
+                      <a:headEnd type="none" w="med" len="med"/>
+                      <a:tailEnd type="none" w="med" len="med"/>
+                    </a:lnL>
+                    <a:lnR w="6350" cap="flat" cmpd="sng" algn="ctr">
+                      <a:solidFill>
+                        <a:srgbClr val="000000"/>
+                      </a:solidFill>
+                      <a:prstDash val="solid"/>
+                      <a:round/>
+                      <a:headEnd type="none" w="med" len="med"/>
+                      <a:tailEnd type="none" w="med" len="med"/>
+                    </a:lnR>
+                    <a:lnT w="6350" cap="flat" cmpd="sng" algn="ctr">
+                      <a:solidFill>
+                        <a:srgbClr val="000000"/>
+                      </a:solidFill>
+                      <a:prstDash val="solid"/>
+                      <a:round/>
+                      <a:headEnd type="none" w="med" len="med"/>
+                      <a:tailEnd type="none" w="med" len="med"/>
+                    </a:lnT>
+                    <a:lnB w="6350" cap="flat" cmpd="sng" algn="ctr">
+                      <a:solidFill>
+                        <a:srgbClr val="000000"/>
+                      </a:solidFill>
+                      <a:prstDash val="solid"/>
+                      <a:round/>
+                      <a:headEnd type="none" w="med" len="med"/>
+                      <a:tailEnd type="none" w="med" len="med"/>
+                    </a:lnB>
+                  </a:tcPr>
+                </a:tc>
+                <a:extLst>
+                  <a:ext uri="{0D108BD9-81ED-4DB2-BD59-A6C34878D82A}">
+                    <a16:rowId xmlns:a16="http://schemas.microsoft.com/office/drawing/2014/main" val="518785645"/>
+                  </a:ext>
+                </a:extLst>
+              </a:tr>
+              <a:tr h="277530">
+                <a:tc>
+                  <a:txBody>
+                    <a:bodyPr/>
+                    <a:lstStyle/>
+                    <a:p>
+                      <a:pPr algn="ctr" fontAlgn="ctr"/>
+                      <a:r>
+                        <a:rPr lang="en-US" sz="1400" b="0" i="0" u="none" strike="noStrike">
+                          <a:solidFill>
+                            <a:srgbClr val="000000"/>
+                          </a:solidFill>
+                          <a:effectLst/>
+                          <a:latin typeface="Calibri" panose="020F0502020204030204" pitchFamily="34" charset="0"/>
+                        </a:rPr>
+                        <a:t>Solubility</a:t>
+                      </a:r>
+                    </a:p>
+                  </a:txBody>
+                  <a:tcPr marL="9525" marR="9525" marT="9525" marB="0" anchor="ctr">
+                    <a:lnL w="6350" cap="flat" cmpd="sng" algn="ctr">
+                      <a:solidFill>
+                        <a:srgbClr val="000000"/>
+                      </a:solidFill>
+                      <a:prstDash val="solid"/>
+                      <a:round/>
+                      <a:headEnd type="none" w="med" len="med"/>
+                      <a:tailEnd type="none" w="med" len="med"/>
+                    </a:lnL>
+                    <a:lnR w="6350" cap="flat" cmpd="sng" algn="ctr">
+                      <a:solidFill>
+                        <a:srgbClr val="000000"/>
+                      </a:solidFill>
+                      <a:prstDash val="solid"/>
+                      <a:round/>
+                      <a:headEnd type="none" w="med" len="med"/>
+                      <a:tailEnd type="none" w="med" len="med"/>
+                    </a:lnR>
+                    <a:lnT w="6350" cap="flat" cmpd="sng" algn="ctr">
+                      <a:solidFill>
+                        <a:srgbClr val="000000"/>
+                      </a:solidFill>
+                      <a:prstDash val="solid"/>
+                      <a:round/>
+                      <a:headEnd type="none" w="med" len="med"/>
+                      <a:tailEnd type="none" w="med" len="med"/>
+                    </a:lnT>
+                    <a:lnB w="6350" cap="flat" cmpd="sng" algn="ctr">
+                      <a:solidFill>
+                        <a:srgbClr val="000000"/>
+                      </a:solidFill>
+                      <a:prstDash val="solid"/>
+                      <a:round/>
+                      <a:headEnd type="none" w="med" len="med"/>
+                      <a:tailEnd type="none" w="med" len="med"/>
+                    </a:lnB>
+                    <a:solidFill>
+                      <a:srgbClr val="F2F2F2"/>
+                    </a:solidFill>
+                  </a:tcPr>
+                </a:tc>
+                <a:tc>
+                  <a:txBody>
+                    <a:bodyPr/>
+                    <a:lstStyle/>
+                    <a:p>
+                      <a:pPr algn="ctr" fontAlgn="ctr"/>
+                      <a:r>
+                        <a:rPr lang="en-US" sz="1400" b="0" i="0" u="none" strike="noStrike" dirty="0">
+                          <a:solidFill>
+                            <a:srgbClr val="000000"/>
+                          </a:solidFill>
+                          <a:effectLst/>
+                          <a:latin typeface="Calibri" panose="020F0502020204030204" pitchFamily="34" charset="0"/>
+                        </a:rPr>
+                        <a:t>0.58</a:t>
+                      </a:r>
+                    </a:p>
+                  </a:txBody>
+                  <a:tcPr marL="9525" marR="9525" marT="9525" marB="0" anchor="ctr">
+                    <a:lnL w="6350" cap="flat" cmpd="sng" algn="ctr">
+                      <a:solidFill>
+                        <a:srgbClr val="000000"/>
+                      </a:solidFill>
+                      <a:prstDash val="solid"/>
+                      <a:round/>
+                      <a:headEnd type="none" w="med" len="med"/>
+                      <a:tailEnd type="none" w="med" len="med"/>
+                    </a:lnL>
+                    <a:lnR w="6350" cap="flat" cmpd="sng" algn="ctr">
+                      <a:solidFill>
+                        <a:srgbClr val="000000"/>
+                      </a:solidFill>
+                      <a:prstDash val="solid"/>
+                      <a:round/>
+                      <a:headEnd type="none" w="med" len="med"/>
+                      <a:tailEnd type="none" w="med" len="med"/>
+                    </a:lnR>
+                    <a:lnT w="6350" cap="flat" cmpd="sng" algn="ctr">
+                      <a:solidFill>
+                        <a:srgbClr val="000000"/>
+                      </a:solidFill>
+                      <a:prstDash val="solid"/>
+                      <a:round/>
+                      <a:headEnd type="none" w="med" len="med"/>
+                      <a:tailEnd type="none" w="med" len="med"/>
+                    </a:lnT>
+                    <a:lnB w="6350" cap="flat" cmpd="sng" algn="ctr">
+                      <a:solidFill>
+                        <a:srgbClr val="000000"/>
+                      </a:solidFill>
+                      <a:prstDash val="solid"/>
+                      <a:round/>
+                      <a:headEnd type="none" w="med" len="med"/>
+                      <a:tailEnd type="none" w="med" len="med"/>
+                    </a:lnB>
+                    <a:solidFill>
+                      <a:srgbClr val="F2F2F2"/>
+                    </a:solidFill>
+                  </a:tcPr>
+                </a:tc>
+                <a:tc>
+                  <a:txBody>
+                    <a:bodyPr/>
+                    <a:lstStyle/>
+                    <a:p>
+                      <a:pPr algn="ctr" fontAlgn="ctr"/>
+                      <a:r>
+                        <a:rPr lang="en-US" sz="1400" b="0" i="0" u="none" strike="noStrike">
+                          <a:solidFill>
+                            <a:srgbClr val="000000"/>
+                          </a:solidFill>
+                          <a:effectLst/>
+                          <a:latin typeface="Calibri" panose="020F0502020204030204" pitchFamily="34" charset="0"/>
+                        </a:rPr>
+                        <a:t>0.60</a:t>
+                      </a:r>
+                    </a:p>
+                  </a:txBody>
+                  <a:tcPr marL="9525" marR="9525" marT="9525" marB="0" anchor="ctr">
+                    <a:lnL w="6350" cap="flat" cmpd="sng" algn="ctr">
+                      <a:solidFill>
+                        <a:srgbClr val="000000"/>
+                      </a:solidFill>
+                      <a:prstDash val="solid"/>
+                      <a:round/>
+                      <a:headEnd type="none" w="med" len="med"/>
+                      <a:tailEnd type="none" w="med" len="med"/>
+                    </a:lnL>
+                    <a:lnR w="6350" cap="flat" cmpd="sng" algn="ctr">
+                      <a:solidFill>
+                        <a:srgbClr val="000000"/>
+                      </a:solidFill>
+                      <a:prstDash val="solid"/>
+                      <a:round/>
+                      <a:headEnd type="none" w="med" len="med"/>
+                      <a:tailEnd type="none" w="med" len="med"/>
+                    </a:lnR>
+                    <a:lnT w="6350" cap="flat" cmpd="sng" algn="ctr">
+                      <a:solidFill>
+                        <a:srgbClr val="000000"/>
+                      </a:solidFill>
+                      <a:prstDash val="solid"/>
+                      <a:round/>
+                      <a:headEnd type="none" w="med" len="med"/>
+                      <a:tailEnd type="none" w="med" len="med"/>
+                    </a:lnT>
+                    <a:lnB w="6350" cap="flat" cmpd="sng" algn="ctr">
+                      <a:solidFill>
+                        <a:srgbClr val="000000"/>
+                      </a:solidFill>
+                      <a:prstDash val="solid"/>
+                      <a:round/>
+                      <a:headEnd type="none" w="med" len="med"/>
+                      <a:tailEnd type="none" w="med" len="med"/>
+                    </a:lnB>
+                    <a:solidFill>
+                      <a:srgbClr val="F2F2F2"/>
+                    </a:solidFill>
+                  </a:tcPr>
+                </a:tc>
+                <a:tc>
+                  <a:txBody>
+                    <a:bodyPr/>
+                    <a:lstStyle/>
+                    <a:p>
+                      <a:pPr algn="ctr" fontAlgn="b"/>
+                      <a:r>
+                        <a:rPr lang="en-US" sz="1400" b="0" i="0" u="none" strike="noStrike">
+                          <a:solidFill>
+                            <a:srgbClr val="000000"/>
+                          </a:solidFill>
+                          <a:effectLst/>
+                          <a:latin typeface="Calibri" panose="020F0502020204030204" pitchFamily="34" charset="0"/>
+                        </a:rPr>
+                        <a:t>0.89</a:t>
+                      </a:r>
+                    </a:p>
+                  </a:txBody>
+                  <a:tcPr marL="9525" marR="9525" marT="9525" marB="0" anchor="b">
+                    <a:lnL w="6350" cap="flat" cmpd="sng" algn="ctr">
+                      <a:solidFill>
+                        <a:srgbClr val="000000"/>
+                      </a:solidFill>
+                      <a:prstDash val="solid"/>
+                      <a:round/>
+                      <a:headEnd type="none" w="med" len="med"/>
+                      <a:tailEnd type="none" w="med" len="med"/>
+                    </a:lnL>
+                    <a:lnR w="6350" cap="flat" cmpd="sng" algn="ctr">
+                      <a:solidFill>
+                        <a:srgbClr val="000000"/>
+                      </a:solidFill>
+                      <a:prstDash val="solid"/>
+                      <a:round/>
+                      <a:headEnd type="none" w="med" len="med"/>
+                      <a:tailEnd type="none" w="med" len="med"/>
+                    </a:lnR>
+                    <a:lnT w="6350" cap="flat" cmpd="sng" algn="ctr">
+                      <a:solidFill>
+                        <a:srgbClr val="000000"/>
+                      </a:solidFill>
+                      <a:prstDash val="solid"/>
+                      <a:round/>
+                      <a:headEnd type="none" w="med" len="med"/>
+                      <a:tailEnd type="none" w="med" len="med"/>
+                    </a:lnT>
+                    <a:lnB w="6350" cap="flat" cmpd="sng" algn="ctr">
+                      <a:solidFill>
+                        <a:srgbClr val="000000"/>
+                      </a:solidFill>
+                      <a:prstDash val="solid"/>
+                      <a:round/>
+                      <a:headEnd type="none" w="med" len="med"/>
+                      <a:tailEnd type="none" w="med" len="med"/>
+                    </a:lnB>
+                    <a:solidFill>
+                      <a:srgbClr val="F2F2F2"/>
+                    </a:solidFill>
+                  </a:tcPr>
+                </a:tc>
+                <a:extLst>
+                  <a:ext uri="{0D108BD9-81ED-4DB2-BD59-A6C34878D82A}">
+                    <a16:rowId xmlns:a16="http://schemas.microsoft.com/office/drawing/2014/main" val="265307410"/>
+                  </a:ext>
+                </a:extLst>
+              </a:tr>
+              <a:tr h="277530">
+                <a:tc>
+                  <a:txBody>
+                    <a:bodyPr/>
+                    <a:lstStyle/>
+                    <a:p>
+                      <a:pPr algn="ctr" fontAlgn="ctr"/>
+                      <a:r>
+                        <a:rPr lang="en-US" sz="1400" b="0" i="0" u="none" strike="noStrike">
+                          <a:solidFill>
+                            <a:srgbClr val="000000"/>
+                          </a:solidFill>
+                          <a:effectLst/>
+                          <a:latin typeface="Calibri" panose="020F0502020204030204" pitchFamily="34" charset="0"/>
+                        </a:rPr>
+                        <a:t>Druglikeness</a:t>
+                      </a:r>
+                    </a:p>
+                  </a:txBody>
+                  <a:tcPr marL="9525" marR="9525" marT="9525" marB="0" anchor="ctr">
+                    <a:lnL w="6350" cap="flat" cmpd="sng" algn="ctr">
+                      <a:solidFill>
+                        <a:srgbClr val="000000"/>
+                      </a:solidFill>
+                      <a:prstDash val="solid"/>
+                      <a:round/>
+                      <a:headEnd type="none" w="med" len="med"/>
+                      <a:tailEnd type="none" w="med" len="med"/>
+                    </a:lnL>
+                    <a:lnR w="6350" cap="flat" cmpd="sng" algn="ctr">
+                      <a:solidFill>
+                        <a:srgbClr val="000000"/>
+                      </a:solidFill>
+                      <a:prstDash val="solid"/>
+                      <a:round/>
+                      <a:headEnd type="none" w="med" len="med"/>
+                      <a:tailEnd type="none" w="med" len="med"/>
+                    </a:lnR>
+                    <a:lnT w="6350" cap="flat" cmpd="sng" algn="ctr">
+                      <a:solidFill>
+                        <a:srgbClr val="000000"/>
+                      </a:solidFill>
+                      <a:prstDash val="solid"/>
+                      <a:round/>
+                      <a:headEnd type="none" w="med" len="med"/>
+                      <a:tailEnd type="none" w="med" len="med"/>
+                    </a:lnT>
+                    <a:lnB w="6350" cap="flat" cmpd="sng" algn="ctr">
+                      <a:solidFill>
+                        <a:srgbClr val="000000"/>
+                      </a:solidFill>
+                      <a:prstDash val="solid"/>
+                      <a:round/>
+                      <a:headEnd type="none" w="med" len="med"/>
+                      <a:tailEnd type="none" w="med" len="med"/>
+                    </a:lnB>
+                  </a:tcPr>
+                </a:tc>
+                <a:tc>
+                  <a:txBody>
+                    <a:bodyPr/>
+                    <a:lstStyle/>
+                    <a:p>
+                      <a:pPr algn="ctr" fontAlgn="ctr"/>
+                      <a:r>
+                        <a:rPr lang="en-US" sz="1400" b="0" i="0" u="none" strike="noStrike">
+                          <a:solidFill>
+                            <a:srgbClr val="000000"/>
+                          </a:solidFill>
+                          <a:effectLst/>
+                          <a:latin typeface="Calibri" panose="020F0502020204030204" pitchFamily="34" charset="0"/>
+                        </a:rPr>
+                        <a:t>0.03</a:t>
+                      </a:r>
+                    </a:p>
+                  </a:txBody>
+                  <a:tcPr marL="9525" marR="9525" marT="9525" marB="0" anchor="ctr">
+                    <a:lnL w="6350" cap="flat" cmpd="sng" algn="ctr">
+                      <a:solidFill>
+                        <a:srgbClr val="000000"/>
+                      </a:solidFill>
+                      <a:prstDash val="solid"/>
+                      <a:round/>
+                      <a:headEnd type="none" w="med" len="med"/>
+                      <a:tailEnd type="none" w="med" len="med"/>
+                    </a:lnL>
+                    <a:lnR w="6350" cap="flat" cmpd="sng" algn="ctr">
+                      <a:solidFill>
+                        <a:srgbClr val="000000"/>
+                      </a:solidFill>
+                      <a:prstDash val="solid"/>
+                      <a:round/>
+                      <a:headEnd type="none" w="med" len="med"/>
+                      <a:tailEnd type="none" w="med" len="med"/>
+                    </a:lnR>
+                    <a:lnT w="6350" cap="flat" cmpd="sng" algn="ctr">
+                      <a:solidFill>
+                        <a:srgbClr val="000000"/>
+                      </a:solidFill>
+                      <a:prstDash val="solid"/>
+                      <a:round/>
+                      <a:headEnd type="none" w="med" len="med"/>
+                      <a:tailEnd type="none" w="med" len="med"/>
+                    </a:lnT>
+                    <a:lnB w="6350" cap="flat" cmpd="sng" algn="ctr">
+                      <a:solidFill>
+                        <a:srgbClr val="000000"/>
+                      </a:solidFill>
+                      <a:prstDash val="solid"/>
+                      <a:round/>
+                      <a:headEnd type="none" w="med" len="med"/>
+                      <a:tailEnd type="none" w="med" len="med"/>
+                    </a:lnB>
+                  </a:tcPr>
+                </a:tc>
+                <a:tc>
+                  <a:txBody>
+                    <a:bodyPr/>
+                    <a:lstStyle/>
+                    <a:p>
+                      <a:pPr algn="ctr" fontAlgn="ctr"/>
+                      <a:r>
+                        <a:rPr lang="en-US" sz="1400" b="0" i="0" u="none" strike="noStrike" dirty="0">
+                          <a:solidFill>
+                            <a:srgbClr val="000000"/>
+                          </a:solidFill>
+                          <a:effectLst/>
+                          <a:latin typeface="Calibri" panose="020F0502020204030204" pitchFamily="34" charset="0"/>
+                        </a:rPr>
+                        <a:t>0.02</a:t>
+                      </a:r>
+                    </a:p>
+                  </a:txBody>
+                  <a:tcPr marL="9525" marR="9525" marT="9525" marB="0" anchor="ctr">
+                    <a:lnL w="6350" cap="flat" cmpd="sng" algn="ctr">
+                      <a:solidFill>
+                        <a:srgbClr val="000000"/>
+                      </a:solidFill>
+                      <a:prstDash val="solid"/>
+                      <a:round/>
+                      <a:headEnd type="none" w="med" len="med"/>
+                      <a:tailEnd type="none" w="med" len="med"/>
+                    </a:lnL>
+                    <a:lnR w="6350" cap="flat" cmpd="sng" algn="ctr">
+                      <a:solidFill>
+                        <a:srgbClr val="000000"/>
+                      </a:solidFill>
+                      <a:prstDash val="solid"/>
+                      <a:round/>
+                      <a:headEnd type="none" w="med" len="med"/>
+                      <a:tailEnd type="none" w="med" len="med"/>
+                    </a:lnR>
+                    <a:lnT w="6350" cap="flat" cmpd="sng" algn="ctr">
+                      <a:solidFill>
+                        <a:srgbClr val="000000"/>
+                      </a:solidFill>
+                      <a:prstDash val="solid"/>
+                      <a:round/>
+                      <a:headEnd type="none" w="med" len="med"/>
+                      <a:tailEnd type="none" w="med" len="med"/>
+                    </a:lnT>
+                    <a:lnB w="6350" cap="flat" cmpd="sng" algn="ctr">
+                      <a:solidFill>
+                        <a:srgbClr val="000000"/>
+                      </a:solidFill>
+                      <a:prstDash val="solid"/>
+                      <a:round/>
+                      <a:headEnd type="none" w="med" len="med"/>
+                      <a:tailEnd type="none" w="med" len="med"/>
+                    </a:lnB>
+                  </a:tcPr>
+                </a:tc>
+                <a:tc>
+                  <a:txBody>
+                    <a:bodyPr/>
+                    <a:lstStyle/>
+                    <a:p>
+                      <a:pPr algn="ctr" fontAlgn="b"/>
+                      <a:r>
+                        <a:rPr lang="en-US" sz="1400" b="0" i="0" u="none" strike="noStrike">
+                          <a:solidFill>
+                            <a:srgbClr val="000000"/>
+                          </a:solidFill>
+                          <a:effectLst/>
+                          <a:latin typeface="Calibri" panose="020F0502020204030204" pitchFamily="34" charset="0"/>
+                        </a:rPr>
+                        <a:t>0.62</a:t>
+                      </a:r>
+                    </a:p>
+                  </a:txBody>
+                  <a:tcPr marL="9525" marR="9525" marT="9525" marB="0" anchor="b">
+                    <a:lnL w="6350" cap="flat" cmpd="sng" algn="ctr">
+                      <a:solidFill>
+                        <a:srgbClr val="000000"/>
+                      </a:solidFill>
+                      <a:prstDash val="solid"/>
+                      <a:round/>
+                      <a:headEnd type="none" w="med" len="med"/>
+                      <a:tailEnd type="none" w="med" len="med"/>
+                    </a:lnL>
+                    <a:lnR w="6350" cap="flat" cmpd="sng" algn="ctr">
+                      <a:solidFill>
+                        <a:srgbClr val="000000"/>
+                      </a:solidFill>
+                      <a:prstDash val="solid"/>
+                      <a:round/>
+                      <a:headEnd type="none" w="med" len="med"/>
+                      <a:tailEnd type="none" w="med" len="med"/>
+                    </a:lnR>
+                    <a:lnT w="6350" cap="flat" cmpd="sng" algn="ctr">
+                      <a:solidFill>
+                        <a:srgbClr val="000000"/>
+                      </a:solidFill>
+                      <a:prstDash val="solid"/>
+                      <a:round/>
+                      <a:headEnd type="none" w="med" len="med"/>
+                      <a:tailEnd type="none" w="med" len="med"/>
+                    </a:lnT>
+                    <a:lnB w="6350" cap="flat" cmpd="sng" algn="ctr">
+                      <a:solidFill>
+                        <a:srgbClr val="000000"/>
+                      </a:solidFill>
+                      <a:prstDash val="solid"/>
+                      <a:round/>
+                      <a:headEnd type="none" w="med" len="med"/>
+                      <a:tailEnd type="none" w="med" len="med"/>
+                    </a:lnB>
+                  </a:tcPr>
+                </a:tc>
+                <a:extLst>
+                  <a:ext uri="{0D108BD9-81ED-4DB2-BD59-A6C34878D82A}">
+                    <a16:rowId xmlns:a16="http://schemas.microsoft.com/office/drawing/2014/main" val="2190814968"/>
+                  </a:ext>
+                </a:extLst>
+              </a:tr>
+              <a:tr h="277530">
+                <a:tc>
+                  <a:txBody>
+                    <a:bodyPr/>
+                    <a:lstStyle/>
+                    <a:p>
+                      <a:pPr algn="ctr" fontAlgn="ctr"/>
+                      <a:r>
+                        <a:rPr lang="en-US" sz="1400" b="0" i="0" u="none" strike="noStrike">
+                          <a:solidFill>
+                            <a:srgbClr val="000000"/>
+                          </a:solidFill>
+                          <a:effectLst/>
+                          <a:latin typeface="Calibri" panose="020F0502020204030204" pitchFamily="34" charset="0"/>
+                        </a:rPr>
+                        <a:t>Synthesizeability</a:t>
+                      </a:r>
+                    </a:p>
+                  </a:txBody>
+                  <a:tcPr marL="9525" marR="9525" marT="9525" marB="0" anchor="ctr">
+                    <a:lnL w="6350" cap="flat" cmpd="sng" algn="ctr">
+                      <a:solidFill>
+                        <a:srgbClr val="000000"/>
+                      </a:solidFill>
+                      <a:prstDash val="solid"/>
+                      <a:round/>
+                      <a:headEnd type="none" w="med" len="med"/>
+                      <a:tailEnd type="none" w="med" len="med"/>
+                    </a:lnL>
+                    <a:lnR w="6350" cap="flat" cmpd="sng" algn="ctr">
+                      <a:solidFill>
+                        <a:srgbClr val="000000"/>
+                      </a:solidFill>
+                      <a:prstDash val="solid"/>
+                      <a:round/>
+                      <a:headEnd type="none" w="med" len="med"/>
+                      <a:tailEnd type="none" w="med" len="med"/>
+                    </a:lnR>
+                    <a:lnT w="6350" cap="flat" cmpd="sng" algn="ctr">
+                      <a:solidFill>
+                        <a:srgbClr val="000000"/>
+                      </a:solidFill>
+                      <a:prstDash val="solid"/>
+                      <a:round/>
+                      <a:headEnd type="none" w="med" len="med"/>
+                      <a:tailEnd type="none" w="med" len="med"/>
+                    </a:lnT>
+                    <a:lnB w="6350" cap="flat" cmpd="sng" algn="ctr">
+                      <a:solidFill>
+                        <a:srgbClr val="000000"/>
+                      </a:solidFill>
+                      <a:prstDash val="solid"/>
+                      <a:round/>
+                      <a:headEnd type="none" w="med" len="med"/>
+                      <a:tailEnd type="none" w="med" len="med"/>
+                    </a:lnB>
+                    <a:solidFill>
+                      <a:srgbClr val="F2F2F2"/>
+                    </a:solidFill>
+                  </a:tcPr>
+                </a:tc>
+                <a:tc>
+                  <a:txBody>
+                    <a:bodyPr/>
+                    <a:lstStyle/>
+                    <a:p>
+                      <a:pPr algn="ctr" fontAlgn="ctr"/>
+                      <a:r>
+                        <a:rPr lang="en-US" sz="1400" b="0" i="0" u="none" strike="noStrike">
+                          <a:solidFill>
+                            <a:srgbClr val="000000"/>
+                          </a:solidFill>
+                          <a:effectLst/>
+                          <a:latin typeface="Calibri" panose="020F0502020204030204" pitchFamily="34" charset="0"/>
+                        </a:rPr>
+                        <a:t>0.42</a:t>
+                      </a:r>
+                    </a:p>
+                  </a:txBody>
+                  <a:tcPr marL="9525" marR="9525" marT="9525" marB="0" anchor="ctr">
+                    <a:lnL w="6350" cap="flat" cmpd="sng" algn="ctr">
+                      <a:solidFill>
+                        <a:srgbClr val="000000"/>
+                      </a:solidFill>
+                      <a:prstDash val="solid"/>
+                      <a:round/>
+                      <a:headEnd type="none" w="med" len="med"/>
+                      <a:tailEnd type="none" w="med" len="med"/>
+                    </a:lnL>
+                    <a:lnR w="6350" cap="flat" cmpd="sng" algn="ctr">
+                      <a:solidFill>
+                        <a:srgbClr val="000000"/>
+                      </a:solidFill>
+                      <a:prstDash val="solid"/>
+                      <a:round/>
+                      <a:headEnd type="none" w="med" len="med"/>
+                      <a:tailEnd type="none" w="med" len="med"/>
+                    </a:lnR>
+                    <a:lnT w="6350" cap="flat" cmpd="sng" algn="ctr">
+                      <a:solidFill>
+                        <a:srgbClr val="000000"/>
+                      </a:solidFill>
+                      <a:prstDash val="solid"/>
+                      <a:round/>
+                      <a:headEnd type="none" w="med" len="med"/>
+                      <a:tailEnd type="none" w="med" len="med"/>
+                    </a:lnT>
+                    <a:lnB w="6350" cap="flat" cmpd="sng" algn="ctr">
+                      <a:solidFill>
+                        <a:srgbClr val="000000"/>
+                      </a:solidFill>
+                      <a:prstDash val="solid"/>
+                      <a:round/>
+                      <a:headEnd type="none" w="med" len="med"/>
+                      <a:tailEnd type="none" w="med" len="med"/>
+                    </a:lnB>
+                    <a:solidFill>
+                      <a:srgbClr val="F2F2F2"/>
+                    </a:solidFill>
+                  </a:tcPr>
+                </a:tc>
+                <a:tc>
+                  <a:txBody>
+                    <a:bodyPr/>
+                    <a:lstStyle/>
+                    <a:p>
+                      <a:pPr algn="ctr" fontAlgn="ctr"/>
+                      <a:r>
+                        <a:rPr lang="en-US" sz="1400" b="0" i="0" u="none" strike="noStrike">
+                          <a:solidFill>
+                            <a:srgbClr val="000000"/>
+                          </a:solidFill>
+                          <a:effectLst/>
+                          <a:latin typeface="Calibri" panose="020F0502020204030204" pitchFamily="34" charset="0"/>
+                        </a:rPr>
+                        <a:t>0.46</a:t>
+                      </a:r>
+                    </a:p>
+                  </a:txBody>
+                  <a:tcPr marL="9525" marR="9525" marT="9525" marB="0" anchor="ctr">
+                    <a:lnL w="6350" cap="flat" cmpd="sng" algn="ctr">
+                      <a:solidFill>
+                        <a:srgbClr val="000000"/>
+                      </a:solidFill>
+                      <a:prstDash val="solid"/>
+                      <a:round/>
+                      <a:headEnd type="none" w="med" len="med"/>
+                      <a:tailEnd type="none" w="med" len="med"/>
+                    </a:lnL>
+                    <a:lnR w="6350" cap="flat" cmpd="sng" algn="ctr">
+                      <a:solidFill>
+                        <a:srgbClr val="000000"/>
+                      </a:solidFill>
+                      <a:prstDash val="solid"/>
+                      <a:round/>
+                      <a:headEnd type="none" w="med" len="med"/>
+                      <a:tailEnd type="none" w="med" len="med"/>
+                    </a:lnR>
+                    <a:lnT w="6350" cap="flat" cmpd="sng" algn="ctr">
+                      <a:solidFill>
+                        <a:srgbClr val="000000"/>
+                      </a:solidFill>
+                      <a:prstDash val="solid"/>
+                      <a:round/>
+                      <a:headEnd type="none" w="med" len="med"/>
+                      <a:tailEnd type="none" w="med" len="med"/>
+                    </a:lnT>
+                    <a:lnB w="6350" cap="flat" cmpd="sng" algn="ctr">
+                      <a:solidFill>
+                        <a:srgbClr val="000000"/>
+                      </a:solidFill>
+                      <a:prstDash val="solid"/>
+                      <a:round/>
+                      <a:headEnd type="none" w="med" len="med"/>
+                      <a:tailEnd type="none" w="med" len="med"/>
+                    </a:lnB>
+                    <a:solidFill>
+                      <a:srgbClr val="F2F2F2"/>
+                    </a:solidFill>
+                  </a:tcPr>
+                </a:tc>
+                <a:tc>
+                  <a:txBody>
+                    <a:bodyPr/>
+                    <a:lstStyle/>
+                    <a:p>
+                      <a:pPr algn="ctr" fontAlgn="b"/>
+                      <a:r>
+                        <a:rPr lang="en-US" sz="1400" b="0" i="0" u="none" strike="noStrike" dirty="0">
+                          <a:solidFill>
+                            <a:srgbClr val="000000"/>
+                          </a:solidFill>
+                          <a:effectLst/>
+                          <a:latin typeface="Calibri" panose="020F0502020204030204" pitchFamily="34" charset="0"/>
+                        </a:rPr>
+                        <a:t>0.95</a:t>
+                      </a:r>
+                    </a:p>
+                  </a:txBody>
+                  <a:tcPr marL="9525" marR="9525" marT="9525" marB="0" anchor="b">
+                    <a:lnL w="6350" cap="flat" cmpd="sng" algn="ctr">
+                      <a:solidFill>
+                        <a:srgbClr val="000000"/>
+                      </a:solidFill>
+                      <a:prstDash val="solid"/>
+                      <a:round/>
+                      <a:headEnd type="none" w="med" len="med"/>
+                      <a:tailEnd type="none" w="med" len="med"/>
+                    </a:lnL>
+                    <a:lnR w="6350" cap="flat" cmpd="sng" algn="ctr">
+                      <a:solidFill>
+                        <a:srgbClr val="000000"/>
+                      </a:solidFill>
+                      <a:prstDash val="solid"/>
+                      <a:round/>
+                      <a:headEnd type="none" w="med" len="med"/>
+                      <a:tailEnd type="none" w="med" len="med"/>
+                    </a:lnR>
+                    <a:lnT w="6350" cap="flat" cmpd="sng" algn="ctr">
+                      <a:solidFill>
+                        <a:srgbClr val="000000"/>
+                      </a:solidFill>
+                      <a:prstDash val="solid"/>
+                      <a:round/>
+                      <a:headEnd type="none" w="med" len="med"/>
+                      <a:tailEnd type="none" w="med" len="med"/>
+                    </a:lnT>
+                    <a:lnB w="6350" cap="flat" cmpd="sng" algn="ctr">
+                      <a:solidFill>
+                        <a:srgbClr val="000000"/>
+                      </a:solidFill>
+                      <a:prstDash val="solid"/>
+                      <a:round/>
+                      <a:headEnd type="none" w="med" len="med"/>
+                      <a:tailEnd type="none" w="med" len="med"/>
+                    </a:lnB>
+                    <a:solidFill>
+                      <a:srgbClr val="F2F2F2"/>
+                    </a:solidFill>
+                  </a:tcPr>
+                </a:tc>
+                <a:extLst>
+                  <a:ext uri="{0D108BD9-81ED-4DB2-BD59-A6C34878D82A}">
+                    <a16:rowId xmlns:a16="http://schemas.microsoft.com/office/drawing/2014/main" val="4119010315"/>
+                  </a:ext>
+                </a:extLst>
+              </a:tr>
+            </a:tbl>
+          </a:graphicData>
+        </a:graphic>
+      </p:graphicFrame>
     </p:spTree>
     <p:extLst>
       <p:ext uri="{BB962C8B-B14F-4D97-AF65-F5344CB8AC3E}">
@@ -11206,7 +12965,7 @@
 </p:sld>
 </file>
 
-<file path=ppt/slides/slide18.xml><?xml version="1.0" encoding="utf-8"?>
+<file path=ppt/slides/slide17.xml><?xml version="1.0" encoding="utf-8"?>
 <p:sld xmlns:a="http://schemas.openxmlformats.org/drawingml/2006/main" xmlns:r="http://schemas.openxmlformats.org/officeDocument/2006/relationships" xmlns:p="http://schemas.openxmlformats.org/presentationml/2006/main">
   <p:cSld>
     <p:spTree>
@@ -11251,12 +13010,202 @@
           </a:p>
         </p:txBody>
       </p:sp>
+      <p:pic>
+        <p:nvPicPr>
+          <p:cNvPr id="5" name="Picture 4">
+            <a:extLst>
+              <a:ext uri="{FF2B5EF4-FFF2-40B4-BE49-F238E27FC236}">
+                <a16:creationId xmlns:a16="http://schemas.microsoft.com/office/drawing/2014/main" id="{8D1D8AB5-F70F-4062-9BF7-B3F3C22B6918}"/>
+              </a:ext>
+            </a:extLst>
+          </p:cNvPr>
+          <p:cNvPicPr>
+            <a:picLocks noChangeAspect="1"/>
+          </p:cNvPicPr>
+          <p:nvPr/>
+        </p:nvPicPr>
+        <p:blipFill>
+          <a:blip r:embed="rId2"/>
+          <a:stretch>
+            <a:fillRect/>
+          </a:stretch>
+        </p:blipFill>
+        <p:spPr>
+          <a:xfrm>
+            <a:off x="6260098" y="2318772"/>
+            <a:ext cx="5528042" cy="3153597"/>
+          </a:xfrm>
+          <a:prstGeom prst="rect">
+            <a:avLst/>
+          </a:prstGeom>
+        </p:spPr>
+      </p:pic>
+      <p:pic>
+        <p:nvPicPr>
+          <p:cNvPr id="6" name="Picture 5">
+            <a:extLst>
+              <a:ext uri="{FF2B5EF4-FFF2-40B4-BE49-F238E27FC236}">
+                <a16:creationId xmlns:a16="http://schemas.microsoft.com/office/drawing/2014/main" id="{3B55869F-9B2A-4EFD-9EDE-AEABE4A12408}"/>
+              </a:ext>
+            </a:extLst>
+          </p:cNvPr>
+          <p:cNvPicPr>
+            <a:picLocks noChangeAspect="1"/>
+          </p:cNvPicPr>
+          <p:nvPr/>
+        </p:nvPicPr>
+        <p:blipFill>
+          <a:blip r:embed="rId3"/>
+          <a:stretch>
+            <a:fillRect/>
+          </a:stretch>
+        </p:blipFill>
+        <p:spPr>
+          <a:xfrm>
+            <a:off x="598438" y="2370693"/>
+            <a:ext cx="5528042" cy="3101676"/>
+          </a:xfrm>
+          <a:prstGeom prst="rect">
+            <a:avLst/>
+          </a:prstGeom>
+        </p:spPr>
+      </p:pic>
+      <p:sp>
+        <p:nvSpPr>
+          <p:cNvPr id="7" name="TextBox 6">
+            <a:extLst>
+              <a:ext uri="{FF2B5EF4-FFF2-40B4-BE49-F238E27FC236}">
+                <a16:creationId xmlns:a16="http://schemas.microsoft.com/office/drawing/2014/main" id="{D07D8480-4D86-41F0-A0A7-C2CA282B8DD1}"/>
+              </a:ext>
+            </a:extLst>
+          </p:cNvPr>
+          <p:cNvSpPr txBox="1"/>
+          <p:nvPr/>
+        </p:nvSpPr>
+        <p:spPr>
+          <a:xfrm>
+            <a:off x="2076250" y="1949440"/>
+            <a:ext cx="3094522" cy="369332"/>
+          </a:xfrm>
+          <a:prstGeom prst="rect">
+            <a:avLst/>
+          </a:prstGeom>
+          <a:noFill/>
+        </p:spPr>
+        <p:txBody>
+          <a:bodyPr wrap="square" rtlCol="0">
+            <a:spAutoFit/>
+          </a:bodyPr>
+          <a:lstStyle/>
+          <a:p>
+            <a:pPr algn="ctr"/>
+            <a:r>
+              <a:rPr lang="en-US" dirty="0"/>
+              <a:t>Real Samples</a:t>
+            </a:r>
+          </a:p>
+        </p:txBody>
+      </p:sp>
+      <p:sp>
+        <p:nvSpPr>
+          <p:cNvPr id="8" name="TextBox 7">
+            <a:extLst>
+              <a:ext uri="{FF2B5EF4-FFF2-40B4-BE49-F238E27FC236}">
+                <a16:creationId xmlns:a16="http://schemas.microsoft.com/office/drawing/2014/main" id="{DE7B0B3E-E57F-49A5-B434-BBEF7DF3DCA8}"/>
+              </a:ext>
+            </a:extLst>
+          </p:cNvPr>
+          <p:cNvSpPr txBox="1"/>
+          <p:nvPr/>
+        </p:nvSpPr>
+        <p:spPr>
+          <a:xfrm>
+            <a:off x="7273090" y="1869360"/>
+            <a:ext cx="3094522" cy="369332"/>
+          </a:xfrm>
+          <a:prstGeom prst="rect">
+            <a:avLst/>
+          </a:prstGeom>
+          <a:noFill/>
+        </p:spPr>
+        <p:txBody>
+          <a:bodyPr wrap="square" rtlCol="0">
+            <a:spAutoFit/>
+          </a:bodyPr>
+          <a:lstStyle/>
+          <a:p>
+            <a:pPr algn="ctr"/>
+            <a:r>
+              <a:rPr lang="en-US" dirty="0"/>
+              <a:t>Generated Samples</a:t>
+            </a:r>
+          </a:p>
+        </p:txBody>
+      </p:sp>
+    </p:spTree>
+    <p:extLst>
+      <p:ext uri="{BB962C8B-B14F-4D97-AF65-F5344CB8AC3E}">
+        <p14:creationId xmlns:p14="http://schemas.microsoft.com/office/powerpoint/2010/main" val="3574000326"/>
+      </p:ext>
+    </p:extLst>
+  </p:cSld>
+  <p:clrMapOvr>
+    <a:masterClrMapping/>
+  </p:clrMapOvr>
+</p:sld>
+</file>
+
+<file path=ppt/slides/slide18.xml><?xml version="1.0" encoding="utf-8"?>
+<p:sld xmlns:a="http://schemas.openxmlformats.org/drawingml/2006/main" xmlns:r="http://schemas.openxmlformats.org/officeDocument/2006/relationships" xmlns:p="http://schemas.openxmlformats.org/presentationml/2006/main">
+  <p:cSld>
+    <p:spTree>
+      <p:nvGrpSpPr>
+        <p:cNvPr id="1" name=""/>
+        <p:cNvGrpSpPr/>
+        <p:nvPr/>
+      </p:nvGrpSpPr>
+      <p:grpSpPr>
+        <a:xfrm>
+          <a:off x="0" y="0"/>
+          <a:ext cx="0" cy="0"/>
+          <a:chOff x="0" y="0"/>
+          <a:chExt cx="0" cy="0"/>
+        </a:xfrm>
+      </p:grpSpPr>
+      <p:sp>
+        <p:nvSpPr>
+          <p:cNvPr id="2" name="Title 1">
+            <a:extLst>
+              <a:ext uri="{FF2B5EF4-FFF2-40B4-BE49-F238E27FC236}">
+                <a16:creationId xmlns:a16="http://schemas.microsoft.com/office/drawing/2014/main" id="{167DA2D6-64EF-4974-86EE-28AE823AC6C8}"/>
+              </a:ext>
+            </a:extLst>
+          </p:cNvPr>
+          <p:cNvSpPr>
+            <a:spLocks noGrp="1"/>
+          </p:cNvSpPr>
+          <p:nvPr>
+            <p:ph type="title"/>
+          </p:nvPr>
+        </p:nvSpPr>
+        <p:spPr/>
+        <p:txBody>
+          <a:bodyPr/>
+          <a:lstStyle/>
+          <a:p>
+            <a:r>
+              <a:rPr lang="en-US" dirty="0"/>
+              <a:t>Future Work</a:t>
+            </a:r>
+          </a:p>
+        </p:txBody>
+      </p:sp>
       <p:sp>
         <p:nvSpPr>
           <p:cNvPr id="3" name="Content Placeholder 2">
             <a:extLst>
               <a:ext uri="{FF2B5EF4-FFF2-40B4-BE49-F238E27FC236}">
-                <a16:creationId xmlns:a16="http://schemas.microsoft.com/office/drawing/2014/main" id="{39CF2E8A-C913-4AAA-9B99-6DBE37A3D088}"/>
+                <a16:creationId xmlns:a16="http://schemas.microsoft.com/office/drawing/2014/main" id="{FA490476-588C-4843-B55B-CD10ADEC23CA}"/>
               </a:ext>
             </a:extLst>
           </p:cNvPr>
@@ -11279,7 +13228,7 @@
     </p:spTree>
     <p:extLst>
       <p:ext uri="{BB962C8B-B14F-4D97-AF65-F5344CB8AC3E}">
-        <p14:creationId xmlns:p14="http://schemas.microsoft.com/office/powerpoint/2010/main" val="3574000326"/>
+        <p14:creationId xmlns:p14="http://schemas.microsoft.com/office/powerpoint/2010/main" val="2216371067"/>
       </p:ext>
     </p:extLst>
   </p:cSld>
@@ -11311,7 +13260,7 @@
           <p:cNvPr id="2" name="Title 1">
             <a:extLst>
               <a:ext uri="{FF2B5EF4-FFF2-40B4-BE49-F238E27FC236}">
-                <a16:creationId xmlns:a16="http://schemas.microsoft.com/office/drawing/2014/main" id="{F1C20DE3-FA25-40C0-B1AD-10D4C014441B}"/>
+                <a16:creationId xmlns:a16="http://schemas.microsoft.com/office/drawing/2014/main" id="{8A98A5EE-231E-491B-9D0D-CD3FB52B7AA9}"/>
               </a:ext>
             </a:extLst>
           </p:cNvPr>
@@ -11329,7 +13278,7 @@
           <a:p>
             <a:r>
               <a:rPr lang="en-US" dirty="0"/>
-              <a:t>References</a:t>
+              <a:t>Conclusion</a:t>
             </a:r>
           </a:p>
         </p:txBody>
@@ -11339,7 +13288,7 @@
           <p:cNvPr id="3" name="Content Placeholder 2">
             <a:extLst>
               <a:ext uri="{FF2B5EF4-FFF2-40B4-BE49-F238E27FC236}">
-                <a16:creationId xmlns:a16="http://schemas.microsoft.com/office/drawing/2014/main" id="{A6043FFD-EDB8-4B43-8A79-752324CA3720}"/>
+                <a16:creationId xmlns:a16="http://schemas.microsoft.com/office/drawing/2014/main" id="{1743DC5B-DB2B-4585-9819-8E2F5E860AD6}"/>
               </a:ext>
             </a:extLst>
           </p:cNvPr>
@@ -11352,374 +13301,17 @@
         </p:nvSpPr>
         <p:spPr/>
         <p:txBody>
-          <a:bodyPr>
-            <a:normAutofit fontScale="77500" lnSpcReduction="20000"/>
-          </a:bodyPr>
+          <a:bodyPr/>
           <a:lstStyle/>
           <a:p>
-            <a:r>
-              <a:rPr lang="es-ES" sz="1800" dirty="0">
-                <a:effectLst/>
-                <a:latin typeface="Times New Roman" panose="02020603050405020304" pitchFamily="18" charset="0"/>
-                <a:ea typeface="SimSun" panose="02010600030101010101" pitchFamily="2" charset="-122"/>
-              </a:rPr>
-              <a:t>Alqahtani, H. E. (19 Dec</a:t>
-            </a:r>
-            <a:r>
-              <a:rPr lang="es-ES" sz="1800" dirty="0">
-                <a:latin typeface="Times New Roman" panose="02020603050405020304" pitchFamily="18" charset="0"/>
-                <a:ea typeface="SimSun" panose="02010600030101010101" pitchFamily="2" charset="-122"/>
-              </a:rPr>
-              <a:t>.</a:t>
-            </a:r>
-            <a:r>
-              <a:rPr lang="es-ES" sz="1800" dirty="0">
-                <a:effectLst/>
-                <a:latin typeface="Times New Roman" panose="02020603050405020304" pitchFamily="18" charset="0"/>
-                <a:ea typeface="SimSun" panose="02010600030101010101" pitchFamily="2" charset="-122"/>
-              </a:rPr>
-              <a:t> 2019). </a:t>
-            </a:r>
-            <a:r>
-              <a:rPr lang="en-US" sz="1800" dirty="0">
-                <a:effectLst/>
-                <a:latin typeface="Times New Roman" panose="02020603050405020304" pitchFamily="18" charset="0"/>
-                <a:ea typeface="SimSun" panose="02010600030101010101" pitchFamily="2" charset="-122"/>
-              </a:rPr>
-              <a:t>Applications of Generative Adversarial Networks (GANS): An Updated Review.</a:t>
-            </a:r>
-            <a:endParaRPr lang="de-DE" sz="1800" dirty="0">
-              <a:effectLst/>
-              <a:latin typeface="Times New Roman" panose="02020603050405020304" pitchFamily="18" charset="0"/>
-              <a:ea typeface="SimSun" panose="02010600030101010101" pitchFamily="2" charset="-122"/>
-            </a:endParaRPr>
-          </a:p>
-          <a:p>
-            <a:r>
-              <a:rPr lang="de-DE" sz="1800" dirty="0">
-                <a:effectLst/>
-                <a:latin typeface="Times New Roman" panose="02020603050405020304" pitchFamily="18" charset="0"/>
-                <a:ea typeface="SimSun" panose="02010600030101010101" pitchFamily="2" charset="-122"/>
-              </a:rPr>
-              <a:t>Bickerton, G. R. (2012). </a:t>
-            </a:r>
-            <a:r>
-              <a:rPr lang="en-US" sz="1800" dirty="0">
-                <a:effectLst/>
-                <a:latin typeface="Times New Roman" panose="02020603050405020304" pitchFamily="18" charset="0"/>
-                <a:ea typeface="SimSun" panose="02010600030101010101" pitchFamily="2" charset="-122"/>
-              </a:rPr>
-              <a:t>Quantifying the chemical beauty of drugs.</a:t>
-            </a:r>
-          </a:p>
-          <a:p>
-            <a:r>
-              <a:rPr lang="en-US" sz="1800" dirty="0">
-                <a:effectLst/>
-                <a:latin typeface="Times New Roman" panose="02020603050405020304" pitchFamily="18" charset="0"/>
-                <a:ea typeface="SimSun" panose="02010600030101010101" pitchFamily="2" charset="-122"/>
-              </a:rPr>
-              <a:t>Bidisha, S. (2019). NeVAE: A Deep Generative Model for Molecular Graphs.</a:t>
-            </a:r>
-          </a:p>
-          <a:p>
-            <a:r>
-              <a:rPr lang="en-US" sz="1800" dirty="0">
-                <a:effectLst/>
-                <a:latin typeface="Times New Roman" panose="02020603050405020304" pitchFamily="18" charset="0"/>
-                <a:ea typeface="SimSun" panose="02010600030101010101" pitchFamily="2" charset="-122"/>
-              </a:rPr>
-              <a:t>Comer, J. a. (2001). Lipophiicity profiles: theory and measurement. Zurich, Switzerland.</a:t>
-            </a:r>
-          </a:p>
-          <a:p>
-            <a:r>
-              <a:rPr lang="en-US" sz="1800" dirty="0">
-                <a:effectLst/>
-                <a:latin typeface="Times New Roman" panose="02020603050405020304" pitchFamily="18" charset="0"/>
-                <a:ea typeface="SimSun" panose="02010600030101010101" pitchFamily="2" charset="-122"/>
-              </a:rPr>
-              <a:t>Ertl, P. a. (2009). Estimation of synthetic accessibility score of drug-like molecules based on molecular complexity and fragment contributions. </a:t>
-            </a:r>
-            <a:r>
-              <a:rPr lang="en-US" sz="1800" i="1" dirty="0">
-                <a:effectLst/>
-                <a:latin typeface="Times New Roman" panose="02020603050405020304" pitchFamily="18" charset="0"/>
-                <a:ea typeface="SimSun" panose="02010600030101010101" pitchFamily="2" charset="-122"/>
-              </a:rPr>
-              <a:t>Journal of Cheminformatics</a:t>
-            </a:r>
-            <a:r>
-              <a:rPr lang="en-US" sz="1800" dirty="0">
-                <a:effectLst/>
-                <a:latin typeface="Times New Roman" panose="02020603050405020304" pitchFamily="18" charset="0"/>
-                <a:ea typeface="SimSun" panose="02010600030101010101" pitchFamily="2" charset="-122"/>
-              </a:rPr>
-              <a:t>, 1-8.</a:t>
-            </a:r>
-          </a:p>
-          <a:p>
-            <a:r>
-              <a:rPr lang="en-US" sz="1800" dirty="0">
-                <a:effectLst/>
-                <a:latin typeface="Times New Roman" panose="02020603050405020304" pitchFamily="18" charset="0"/>
-                <a:ea typeface="SimSun" panose="02010600030101010101" pitchFamily="2" charset="-122"/>
-              </a:rPr>
-              <a:t>Phrma. (22 de July de 2024). </a:t>
-            </a:r>
-            <a:r>
-              <a:rPr lang="en-US" sz="1800" i="1" dirty="0">
-                <a:effectLst/>
-                <a:latin typeface="Times New Roman" panose="02020603050405020304" pitchFamily="18" charset="0"/>
-                <a:ea typeface="SimSun" panose="02010600030101010101" pitchFamily="2" charset="-122"/>
-              </a:rPr>
-              <a:t>Research &amp; Development Policy Framework</a:t>
-            </a:r>
-            <a:r>
-              <a:rPr lang="en-US" sz="1800" dirty="0">
-                <a:effectLst/>
-                <a:latin typeface="Times New Roman" panose="02020603050405020304" pitchFamily="18" charset="0"/>
-                <a:ea typeface="SimSun" panose="02010600030101010101" pitchFamily="2" charset="-122"/>
-              </a:rPr>
-              <a:t>. </a:t>
-            </a:r>
-            <a:r>
-              <a:rPr lang="es-ES" sz="1800" dirty="0">
-                <a:effectLst/>
-                <a:latin typeface="Times New Roman" panose="02020603050405020304" pitchFamily="18" charset="0"/>
-                <a:ea typeface="SimSun" panose="02010600030101010101" pitchFamily="2" charset="-122"/>
-              </a:rPr>
-              <a:t>Obtenido de phrma.org: </a:t>
-            </a:r>
-            <a:r>
-              <a:rPr lang="es-ES" sz="1800" dirty="0">
-                <a:effectLst/>
-                <a:latin typeface="Times New Roman" panose="02020603050405020304" pitchFamily="18" charset="0"/>
-                <a:ea typeface="SimSun" panose="02010600030101010101" pitchFamily="2" charset="-122"/>
-                <a:hlinkClick r:id="rId2"/>
-              </a:rPr>
-              <a:t>https://phrma.org/policy-issues/Research-and-Development-Policy-Framework</a:t>
-            </a:r>
-            <a:endParaRPr lang="es-ES" sz="1800" dirty="0">
-              <a:effectLst/>
-              <a:latin typeface="Times New Roman" panose="02020603050405020304" pitchFamily="18" charset="0"/>
-              <a:ea typeface="SimSun" panose="02010600030101010101" pitchFamily="2" charset="-122"/>
-            </a:endParaRPr>
-          </a:p>
-          <a:p>
-            <a:r>
-              <a:rPr lang="en-US" sz="1800" dirty="0">
-                <a:effectLst/>
-                <a:latin typeface="Times New Roman" panose="02020603050405020304" pitchFamily="18" charset="0"/>
-                <a:ea typeface="SimSun" panose="02010600030101010101" pitchFamily="2" charset="-122"/>
-              </a:rPr>
-              <a:t>RayTune. (20 de 8 de 2024). </a:t>
-            </a:r>
-            <a:r>
-              <a:rPr lang="en-US" sz="1800" i="1" dirty="0">
-                <a:effectLst/>
-                <a:latin typeface="Times New Roman" panose="02020603050405020304" pitchFamily="18" charset="0"/>
-                <a:ea typeface="SimSun" panose="02010600030101010101" pitchFamily="2" charset="-122"/>
-              </a:rPr>
-              <a:t>Tune Trial Schedulers</a:t>
-            </a:r>
-            <a:r>
-              <a:rPr lang="en-US" sz="1800" dirty="0">
-                <a:effectLst/>
-                <a:latin typeface="Times New Roman" panose="02020603050405020304" pitchFamily="18" charset="0"/>
-                <a:ea typeface="SimSun" panose="02010600030101010101" pitchFamily="2" charset="-122"/>
-              </a:rPr>
-              <a:t>. </a:t>
-            </a:r>
-            <a:r>
-              <a:rPr lang="es-ES" sz="1800" dirty="0" err="1">
-                <a:latin typeface="Times New Roman" panose="02020603050405020304" pitchFamily="18" charset="0"/>
-                <a:ea typeface="SimSun" panose="02010600030101010101" pitchFamily="2" charset="-122"/>
-              </a:rPr>
-              <a:t>Obtained</a:t>
-            </a:r>
-            <a:r>
-              <a:rPr lang="es-ES" sz="1800" dirty="0">
-                <a:effectLst/>
-                <a:latin typeface="Times New Roman" panose="02020603050405020304" pitchFamily="18" charset="0"/>
-                <a:ea typeface="SimSun" panose="02010600030101010101" pitchFamily="2" charset="-122"/>
-              </a:rPr>
-              <a:t>: https://docs.ray.io/en/latest/tune/api/schedulers.html</a:t>
-            </a:r>
-          </a:p>
-          <a:p>
-            <a:r>
-              <a:rPr lang="es-ES" sz="1800" dirty="0">
-                <a:effectLst/>
-                <a:latin typeface="Times New Roman" panose="02020603050405020304" pitchFamily="18" charset="0"/>
-                <a:ea typeface="SimSun" panose="02010600030101010101" pitchFamily="2" charset="-122"/>
-              </a:rPr>
-              <a:t>RDKit. (2023). </a:t>
-            </a:r>
-            <a:r>
-              <a:rPr lang="es-ES" sz="1800" i="1" dirty="0">
-                <a:effectLst/>
-                <a:latin typeface="Times New Roman" panose="02020603050405020304" pitchFamily="18" charset="0"/>
-                <a:ea typeface="SimSun" panose="02010600030101010101" pitchFamily="2" charset="-122"/>
-              </a:rPr>
-              <a:t>rdkit.Chem.rdMolTransforms module</a:t>
-            </a:r>
-            <a:r>
-              <a:rPr lang="es-ES" sz="1800" dirty="0">
-                <a:effectLst/>
-                <a:latin typeface="Times New Roman" panose="02020603050405020304" pitchFamily="18" charset="0"/>
-                <a:ea typeface="SimSun" panose="02010600030101010101" pitchFamily="2" charset="-122"/>
-              </a:rPr>
-              <a:t>. Obtenido de rdkit.org: https://www.rdkit.org/docs/source/rdkit.Chem.rdMolTransforms.html</a:t>
-            </a:r>
-            <a:endParaRPr lang="en-US" sz="1800" dirty="0">
-              <a:effectLst/>
-              <a:latin typeface="Times New Roman" panose="02020603050405020304" pitchFamily="18" charset="0"/>
-              <a:ea typeface="SimSun" panose="02010600030101010101" pitchFamily="2" charset="-122"/>
-            </a:endParaRPr>
-          </a:p>
-          <a:p>
-            <a:r>
-              <a:rPr lang="en-US" sz="1800" dirty="0">
-                <a:effectLst/>
-                <a:latin typeface="Times New Roman" panose="02020603050405020304" pitchFamily="18" charset="0"/>
-                <a:ea typeface="SimSun" panose="02010600030101010101" pitchFamily="2" charset="-122"/>
-              </a:rPr>
-              <a:t>RDKit. (20 de August de 2024). </a:t>
-            </a:r>
-            <a:r>
-              <a:rPr lang="en-US" sz="1800" i="1" dirty="0">
-                <a:effectLst/>
-                <a:latin typeface="Times New Roman" panose="02020603050405020304" pitchFamily="18" charset="0"/>
-                <a:ea typeface="SimSun" panose="02010600030101010101" pitchFamily="2" charset="-122"/>
-              </a:rPr>
-              <a:t>RDKit: Open-Source Cheminformatics Software</a:t>
-            </a:r>
-            <a:r>
-              <a:rPr lang="en-US" sz="1800" dirty="0">
-                <a:effectLst/>
-                <a:latin typeface="Times New Roman" panose="02020603050405020304" pitchFamily="18" charset="0"/>
-                <a:ea typeface="SimSun" panose="02010600030101010101" pitchFamily="2" charset="-122"/>
-              </a:rPr>
-              <a:t>. </a:t>
-            </a:r>
-            <a:r>
-              <a:rPr lang="es-ES" sz="1800" dirty="0">
-                <a:effectLst/>
-                <a:latin typeface="Times New Roman" panose="02020603050405020304" pitchFamily="18" charset="0"/>
-                <a:ea typeface="SimSun" panose="02010600030101010101" pitchFamily="2" charset="-122"/>
-              </a:rPr>
-              <a:t>Obtenido de rdkit.org: 2024.</a:t>
-            </a:r>
-          </a:p>
-          <a:p>
-            <a:r>
-              <a:rPr lang="es-ES" sz="1800" dirty="0">
-                <a:effectLst/>
-                <a:latin typeface="Times New Roman" panose="02020603050405020304" pitchFamily="18" charset="0"/>
-                <a:ea typeface="SimSun" panose="02010600030101010101" pitchFamily="2" charset="-122"/>
-              </a:rPr>
-              <a:t>Nicola De Cao, T. K. (2018). </a:t>
-            </a:r>
-            <a:r>
-              <a:rPr lang="en-US" sz="1800" dirty="0">
-                <a:effectLst/>
-                <a:latin typeface="Times New Roman" panose="02020603050405020304" pitchFamily="18" charset="0"/>
-                <a:ea typeface="SimSun" panose="02010600030101010101" pitchFamily="2" charset="-122"/>
-              </a:rPr>
-              <a:t>MolGAN: An Implicit Generative Model for Small Molecular Graphs. Stockholm, Sweden.</a:t>
-            </a:r>
-          </a:p>
-          <a:p>
-            <a:r>
-              <a:rPr lang="es-ES" sz="1800" dirty="0">
-                <a:effectLst/>
-                <a:latin typeface="Times New Roman" panose="02020603050405020304" pitchFamily="18" charset="0"/>
-                <a:ea typeface="SimSun" panose="02010600030101010101" pitchFamily="2" charset="-122"/>
-              </a:rPr>
-              <a:t>Vasquez J, V. (22 de August de 2024). </a:t>
-            </a:r>
-            <a:r>
-              <a:rPr lang="es-ES" sz="1800" i="1" dirty="0">
-                <a:effectLst/>
-                <a:latin typeface="Times New Roman" panose="02020603050405020304" pitchFamily="18" charset="0"/>
-                <a:ea typeface="SimSun" panose="02010600030101010101" pitchFamily="2" charset="-122"/>
-              </a:rPr>
-              <a:t>SMGAN</a:t>
-            </a:r>
-            <a:r>
-              <a:rPr lang="es-ES" sz="1800" dirty="0">
-                <a:effectLst/>
-                <a:latin typeface="Times New Roman" panose="02020603050405020304" pitchFamily="18" charset="0"/>
-                <a:ea typeface="SimSun" panose="02010600030101010101" pitchFamily="2" charset="-122"/>
-              </a:rPr>
-              <a:t>. Obtenido de </a:t>
-            </a:r>
-            <a:r>
-              <a:rPr lang="es-ES" sz="1800" dirty="0" err="1">
-                <a:effectLst/>
-                <a:latin typeface="Times New Roman" panose="02020603050405020304" pitchFamily="18" charset="0"/>
-                <a:ea typeface="SimSun" panose="02010600030101010101" pitchFamily="2" charset="-122"/>
-              </a:rPr>
-              <a:t>github</a:t>
-            </a:r>
-            <a:r>
-              <a:rPr lang="es-ES" sz="1800" dirty="0">
-                <a:effectLst/>
-                <a:latin typeface="Times New Roman" panose="02020603050405020304" pitchFamily="18" charset="0"/>
-                <a:ea typeface="SimSun" panose="02010600030101010101" pitchFamily="2" charset="-122"/>
-              </a:rPr>
-              <a:t>: https://github.com/vanthony715/SMGAN</a:t>
-            </a:r>
-            <a:endParaRPr lang="en-US" sz="1800" dirty="0">
-              <a:effectLst/>
-              <a:latin typeface="Times New Roman" panose="02020603050405020304" pitchFamily="18" charset="0"/>
-              <a:ea typeface="SimSun" panose="02010600030101010101" pitchFamily="2" charset="-122"/>
-            </a:endParaRPr>
-          </a:p>
-          <a:p>
-            <a:endParaRPr lang="en-US" sz="1800" dirty="0">
-              <a:effectLst/>
-              <a:latin typeface="Times New Roman" panose="02020603050405020304" pitchFamily="18" charset="0"/>
-              <a:ea typeface="SimSun" panose="02010600030101010101" pitchFamily="2" charset="-122"/>
-            </a:endParaRPr>
-          </a:p>
-          <a:p>
-            <a:endParaRPr lang="es-ES" sz="1800" dirty="0">
-              <a:latin typeface="Times New Roman" panose="02020603050405020304" pitchFamily="18" charset="0"/>
-              <a:ea typeface="SimSun" panose="02010600030101010101" pitchFamily="2" charset="-122"/>
-            </a:endParaRPr>
-          </a:p>
-          <a:p>
-            <a:endParaRPr lang="en-US" sz="1800" dirty="0">
-              <a:effectLst/>
-              <a:latin typeface="Times New Roman" panose="02020603050405020304" pitchFamily="18" charset="0"/>
-              <a:ea typeface="SimSun" panose="02010600030101010101" pitchFamily="2" charset="-122"/>
-            </a:endParaRPr>
-          </a:p>
-          <a:p>
-            <a:endParaRPr lang="en-US" sz="1800" dirty="0">
-              <a:effectLst/>
-              <a:latin typeface="Times New Roman" panose="02020603050405020304" pitchFamily="18" charset="0"/>
-              <a:ea typeface="SimSun" panose="02010600030101010101" pitchFamily="2" charset="-122"/>
-            </a:endParaRPr>
-          </a:p>
-          <a:p>
-            <a:endParaRPr lang="en-US" sz="1800" dirty="0">
-              <a:effectLst/>
-              <a:latin typeface="Times New Roman" panose="02020603050405020304" pitchFamily="18" charset="0"/>
-              <a:ea typeface="SimSun" panose="02010600030101010101" pitchFamily="2" charset="-122"/>
-            </a:endParaRPr>
-          </a:p>
-          <a:p>
-            <a:endParaRPr lang="en-US" dirty="0"/>
+            <a:endParaRPr lang="en-US"/>
           </a:p>
         </p:txBody>
       </p:sp>
     </p:spTree>
     <p:extLst>
       <p:ext uri="{BB962C8B-B14F-4D97-AF65-F5344CB8AC3E}">
-        <p14:creationId xmlns:p14="http://schemas.microsoft.com/office/powerpoint/2010/main" val="847440139"/>
+        <p14:creationId xmlns:p14="http://schemas.microsoft.com/office/powerpoint/2010/main" val="3053324537"/>
       </p:ext>
     </p:extLst>
   </p:cSld>
@@ -12423,6 +14015,446 @@
           <p:cNvPr id="2" name="Title 1">
             <a:extLst>
               <a:ext uri="{FF2B5EF4-FFF2-40B4-BE49-F238E27FC236}">
+                <a16:creationId xmlns:a16="http://schemas.microsoft.com/office/drawing/2014/main" id="{F1C20DE3-FA25-40C0-B1AD-10D4C014441B}"/>
+              </a:ext>
+            </a:extLst>
+          </p:cNvPr>
+          <p:cNvSpPr>
+            <a:spLocks noGrp="1"/>
+          </p:cNvSpPr>
+          <p:nvPr>
+            <p:ph type="title"/>
+          </p:nvPr>
+        </p:nvSpPr>
+        <p:spPr/>
+        <p:txBody>
+          <a:bodyPr/>
+          <a:lstStyle/>
+          <a:p>
+            <a:r>
+              <a:rPr lang="en-US" dirty="0"/>
+              <a:t>References</a:t>
+            </a:r>
+          </a:p>
+        </p:txBody>
+      </p:sp>
+      <p:sp>
+        <p:nvSpPr>
+          <p:cNvPr id="3" name="Content Placeholder 2">
+            <a:extLst>
+              <a:ext uri="{FF2B5EF4-FFF2-40B4-BE49-F238E27FC236}">
+                <a16:creationId xmlns:a16="http://schemas.microsoft.com/office/drawing/2014/main" id="{A6043FFD-EDB8-4B43-8A79-752324CA3720}"/>
+              </a:ext>
+            </a:extLst>
+          </p:cNvPr>
+          <p:cNvSpPr>
+            <a:spLocks noGrp="1"/>
+          </p:cNvSpPr>
+          <p:nvPr>
+            <p:ph idx="1"/>
+          </p:nvPr>
+        </p:nvSpPr>
+        <p:spPr/>
+        <p:txBody>
+          <a:bodyPr>
+            <a:normAutofit fontScale="77500" lnSpcReduction="20000"/>
+          </a:bodyPr>
+          <a:lstStyle/>
+          <a:p>
+            <a:r>
+              <a:rPr lang="es-ES" sz="1800" dirty="0">
+                <a:effectLst/>
+                <a:latin typeface="Times New Roman" panose="02020603050405020304" pitchFamily="18" charset="0"/>
+                <a:ea typeface="SimSun" panose="02010600030101010101" pitchFamily="2" charset="-122"/>
+              </a:rPr>
+              <a:t>Alqahtani, H. E. (19 Dec</a:t>
+            </a:r>
+            <a:r>
+              <a:rPr lang="es-ES" sz="1800" dirty="0">
+                <a:latin typeface="Times New Roman" panose="02020603050405020304" pitchFamily="18" charset="0"/>
+                <a:ea typeface="SimSun" panose="02010600030101010101" pitchFamily="2" charset="-122"/>
+              </a:rPr>
+              <a:t>.</a:t>
+            </a:r>
+            <a:r>
+              <a:rPr lang="es-ES" sz="1800" dirty="0">
+                <a:effectLst/>
+                <a:latin typeface="Times New Roman" panose="02020603050405020304" pitchFamily="18" charset="0"/>
+                <a:ea typeface="SimSun" panose="02010600030101010101" pitchFamily="2" charset="-122"/>
+              </a:rPr>
+              <a:t> 2019). </a:t>
+            </a:r>
+            <a:r>
+              <a:rPr lang="en-US" sz="1800" dirty="0">
+                <a:effectLst/>
+                <a:latin typeface="Times New Roman" panose="02020603050405020304" pitchFamily="18" charset="0"/>
+                <a:ea typeface="SimSun" panose="02010600030101010101" pitchFamily="2" charset="-122"/>
+              </a:rPr>
+              <a:t>Applications of Generative Adversarial Networks (GANS): An Updated Review.</a:t>
+            </a:r>
+            <a:endParaRPr lang="de-DE" sz="1800" dirty="0">
+              <a:effectLst/>
+              <a:latin typeface="Times New Roman" panose="02020603050405020304" pitchFamily="18" charset="0"/>
+              <a:ea typeface="SimSun" panose="02010600030101010101" pitchFamily="2" charset="-122"/>
+            </a:endParaRPr>
+          </a:p>
+          <a:p>
+            <a:r>
+              <a:rPr lang="de-DE" sz="1800" dirty="0">
+                <a:effectLst/>
+                <a:latin typeface="Times New Roman" panose="02020603050405020304" pitchFamily="18" charset="0"/>
+                <a:ea typeface="SimSun" panose="02010600030101010101" pitchFamily="2" charset="-122"/>
+              </a:rPr>
+              <a:t>Bickerton, G. R. (2012). </a:t>
+            </a:r>
+            <a:r>
+              <a:rPr lang="en-US" sz="1800" dirty="0">
+                <a:effectLst/>
+                <a:latin typeface="Times New Roman" panose="02020603050405020304" pitchFamily="18" charset="0"/>
+                <a:ea typeface="SimSun" panose="02010600030101010101" pitchFamily="2" charset="-122"/>
+              </a:rPr>
+              <a:t>Quantifying the chemical beauty of drugs.</a:t>
+            </a:r>
+          </a:p>
+          <a:p>
+            <a:r>
+              <a:rPr lang="en-US" sz="1800" dirty="0">
+                <a:effectLst/>
+                <a:latin typeface="Times New Roman" panose="02020603050405020304" pitchFamily="18" charset="0"/>
+                <a:ea typeface="SimSun" panose="02010600030101010101" pitchFamily="2" charset="-122"/>
+              </a:rPr>
+              <a:t>Bidisha, S. (2019). NeVAE: A Deep Generative Model for Molecular Graphs.</a:t>
+            </a:r>
+          </a:p>
+          <a:p>
+            <a:r>
+              <a:rPr lang="en-US" sz="1800" dirty="0">
+                <a:effectLst/>
+                <a:latin typeface="Times New Roman" panose="02020603050405020304" pitchFamily="18" charset="0"/>
+                <a:ea typeface="SimSun" panose="02010600030101010101" pitchFamily="2" charset="-122"/>
+              </a:rPr>
+              <a:t>Comer, J. a. (2001). Lipophiicity profiles: theory and measurement. Zurich, Switzerland.</a:t>
+            </a:r>
+          </a:p>
+          <a:p>
+            <a:r>
+              <a:rPr lang="en-US" sz="1800" dirty="0">
+                <a:effectLst/>
+                <a:latin typeface="Times New Roman" panose="02020603050405020304" pitchFamily="18" charset="0"/>
+                <a:ea typeface="SimSun" panose="02010600030101010101" pitchFamily="2" charset="-122"/>
+              </a:rPr>
+              <a:t>Ertl, P. a. (2009). Estimation of synthetic accessibility score of drug-like molecules based on molecular complexity and fragment contributions. </a:t>
+            </a:r>
+            <a:r>
+              <a:rPr lang="en-US" sz="1800" i="1" dirty="0">
+                <a:effectLst/>
+                <a:latin typeface="Times New Roman" panose="02020603050405020304" pitchFamily="18" charset="0"/>
+                <a:ea typeface="SimSun" panose="02010600030101010101" pitchFamily="2" charset="-122"/>
+              </a:rPr>
+              <a:t>Journal of Cheminformatics</a:t>
+            </a:r>
+            <a:r>
+              <a:rPr lang="en-US" sz="1800" dirty="0">
+                <a:effectLst/>
+                <a:latin typeface="Times New Roman" panose="02020603050405020304" pitchFamily="18" charset="0"/>
+                <a:ea typeface="SimSun" panose="02010600030101010101" pitchFamily="2" charset="-122"/>
+              </a:rPr>
+              <a:t>, 1-8.</a:t>
+            </a:r>
+          </a:p>
+          <a:p>
+            <a:r>
+              <a:rPr lang="en-US" sz="1800" dirty="0">
+                <a:effectLst/>
+                <a:latin typeface="Times New Roman" panose="02020603050405020304" pitchFamily="18" charset="0"/>
+                <a:ea typeface="SimSun" panose="02010600030101010101" pitchFamily="2" charset="-122"/>
+              </a:rPr>
+              <a:t>Phrma. (22 de July de 2024). </a:t>
+            </a:r>
+            <a:r>
+              <a:rPr lang="en-US" sz="1800" i="1" dirty="0">
+                <a:effectLst/>
+                <a:latin typeface="Times New Roman" panose="02020603050405020304" pitchFamily="18" charset="0"/>
+                <a:ea typeface="SimSun" panose="02010600030101010101" pitchFamily="2" charset="-122"/>
+              </a:rPr>
+              <a:t>Research &amp; Development Policy Framework</a:t>
+            </a:r>
+            <a:r>
+              <a:rPr lang="en-US" sz="1800" dirty="0">
+                <a:effectLst/>
+                <a:latin typeface="Times New Roman" panose="02020603050405020304" pitchFamily="18" charset="0"/>
+                <a:ea typeface="SimSun" panose="02010600030101010101" pitchFamily="2" charset="-122"/>
+              </a:rPr>
+              <a:t>. </a:t>
+            </a:r>
+            <a:r>
+              <a:rPr lang="es-ES" sz="1800" dirty="0">
+                <a:effectLst/>
+                <a:latin typeface="Times New Roman" panose="02020603050405020304" pitchFamily="18" charset="0"/>
+                <a:ea typeface="SimSun" panose="02010600030101010101" pitchFamily="2" charset="-122"/>
+              </a:rPr>
+              <a:t>Obtenido de phrma.org: </a:t>
+            </a:r>
+            <a:r>
+              <a:rPr lang="es-ES" sz="1800" dirty="0">
+                <a:effectLst/>
+                <a:latin typeface="Times New Roman" panose="02020603050405020304" pitchFamily="18" charset="0"/>
+                <a:ea typeface="SimSun" panose="02010600030101010101" pitchFamily="2" charset="-122"/>
+                <a:hlinkClick r:id="rId2"/>
+              </a:rPr>
+              <a:t>https://phrma.org/policy-issues/Research-and-Development-Policy-Framework</a:t>
+            </a:r>
+            <a:endParaRPr lang="es-ES" sz="1800" dirty="0">
+              <a:effectLst/>
+              <a:latin typeface="Times New Roman" panose="02020603050405020304" pitchFamily="18" charset="0"/>
+              <a:ea typeface="SimSun" panose="02010600030101010101" pitchFamily="2" charset="-122"/>
+            </a:endParaRPr>
+          </a:p>
+          <a:p>
+            <a:r>
+              <a:rPr lang="en-US" sz="1800" dirty="0">
+                <a:effectLst/>
+                <a:latin typeface="Times New Roman" panose="02020603050405020304" pitchFamily="18" charset="0"/>
+                <a:ea typeface="SimSun" panose="02010600030101010101" pitchFamily="2" charset="-122"/>
+              </a:rPr>
+              <a:t>RayTune. (20 de 8 de 2024). </a:t>
+            </a:r>
+            <a:r>
+              <a:rPr lang="en-US" sz="1800" i="1" dirty="0">
+                <a:effectLst/>
+                <a:latin typeface="Times New Roman" panose="02020603050405020304" pitchFamily="18" charset="0"/>
+                <a:ea typeface="SimSun" panose="02010600030101010101" pitchFamily="2" charset="-122"/>
+              </a:rPr>
+              <a:t>Tune Trial Schedulers</a:t>
+            </a:r>
+            <a:r>
+              <a:rPr lang="en-US" sz="1800" dirty="0">
+                <a:effectLst/>
+                <a:latin typeface="Times New Roman" panose="02020603050405020304" pitchFamily="18" charset="0"/>
+                <a:ea typeface="SimSun" panose="02010600030101010101" pitchFamily="2" charset="-122"/>
+              </a:rPr>
+              <a:t>. </a:t>
+            </a:r>
+            <a:r>
+              <a:rPr lang="es-ES" sz="1800" dirty="0" err="1">
+                <a:latin typeface="Times New Roman" panose="02020603050405020304" pitchFamily="18" charset="0"/>
+                <a:ea typeface="SimSun" panose="02010600030101010101" pitchFamily="2" charset="-122"/>
+              </a:rPr>
+              <a:t>Obtained</a:t>
+            </a:r>
+            <a:r>
+              <a:rPr lang="es-ES" sz="1800" dirty="0">
+                <a:effectLst/>
+                <a:latin typeface="Times New Roman" panose="02020603050405020304" pitchFamily="18" charset="0"/>
+                <a:ea typeface="SimSun" panose="02010600030101010101" pitchFamily="2" charset="-122"/>
+              </a:rPr>
+              <a:t>: https://docs.ray.io/en/latest/tune/api/schedulers.html</a:t>
+            </a:r>
+          </a:p>
+          <a:p>
+            <a:r>
+              <a:rPr lang="es-ES" sz="1800" dirty="0">
+                <a:effectLst/>
+                <a:latin typeface="Times New Roman" panose="02020603050405020304" pitchFamily="18" charset="0"/>
+                <a:ea typeface="SimSun" panose="02010600030101010101" pitchFamily="2" charset="-122"/>
+              </a:rPr>
+              <a:t>RDKit. (2023). </a:t>
+            </a:r>
+            <a:r>
+              <a:rPr lang="es-ES" sz="1800" i="1" dirty="0">
+                <a:effectLst/>
+                <a:latin typeface="Times New Roman" panose="02020603050405020304" pitchFamily="18" charset="0"/>
+                <a:ea typeface="SimSun" panose="02010600030101010101" pitchFamily="2" charset="-122"/>
+              </a:rPr>
+              <a:t>rdkit.Chem.rdMolTransforms module</a:t>
+            </a:r>
+            <a:r>
+              <a:rPr lang="es-ES" sz="1800" dirty="0">
+                <a:effectLst/>
+                <a:latin typeface="Times New Roman" panose="02020603050405020304" pitchFamily="18" charset="0"/>
+                <a:ea typeface="SimSun" panose="02010600030101010101" pitchFamily="2" charset="-122"/>
+              </a:rPr>
+              <a:t>. Obtenido de rdkit.org: https://www.rdkit.org/docs/source/rdkit.Chem.rdMolTransforms.html</a:t>
+            </a:r>
+            <a:endParaRPr lang="en-US" sz="1800" dirty="0">
+              <a:effectLst/>
+              <a:latin typeface="Times New Roman" panose="02020603050405020304" pitchFamily="18" charset="0"/>
+              <a:ea typeface="SimSun" panose="02010600030101010101" pitchFamily="2" charset="-122"/>
+            </a:endParaRPr>
+          </a:p>
+          <a:p>
+            <a:r>
+              <a:rPr lang="en-US" sz="1800" dirty="0">
+                <a:effectLst/>
+                <a:latin typeface="Times New Roman" panose="02020603050405020304" pitchFamily="18" charset="0"/>
+                <a:ea typeface="SimSun" panose="02010600030101010101" pitchFamily="2" charset="-122"/>
+              </a:rPr>
+              <a:t>RDKit. (20 de August de 2024). </a:t>
+            </a:r>
+            <a:r>
+              <a:rPr lang="en-US" sz="1800" i="1" dirty="0">
+                <a:effectLst/>
+                <a:latin typeface="Times New Roman" panose="02020603050405020304" pitchFamily="18" charset="0"/>
+                <a:ea typeface="SimSun" panose="02010600030101010101" pitchFamily="2" charset="-122"/>
+              </a:rPr>
+              <a:t>RDKit: Open-Source Cheminformatics Software</a:t>
+            </a:r>
+            <a:r>
+              <a:rPr lang="en-US" sz="1800" dirty="0">
+                <a:effectLst/>
+                <a:latin typeface="Times New Roman" panose="02020603050405020304" pitchFamily="18" charset="0"/>
+                <a:ea typeface="SimSun" panose="02010600030101010101" pitchFamily="2" charset="-122"/>
+              </a:rPr>
+              <a:t>. </a:t>
+            </a:r>
+            <a:r>
+              <a:rPr lang="es-ES" sz="1800" dirty="0">
+                <a:effectLst/>
+                <a:latin typeface="Times New Roman" panose="02020603050405020304" pitchFamily="18" charset="0"/>
+                <a:ea typeface="SimSun" panose="02010600030101010101" pitchFamily="2" charset="-122"/>
+              </a:rPr>
+              <a:t>Obtenido de rdkit.org: 2024.</a:t>
+            </a:r>
+          </a:p>
+          <a:p>
+            <a:r>
+              <a:rPr lang="es-ES" sz="1800" dirty="0">
+                <a:effectLst/>
+                <a:latin typeface="Times New Roman" panose="02020603050405020304" pitchFamily="18" charset="0"/>
+                <a:ea typeface="SimSun" panose="02010600030101010101" pitchFamily="2" charset="-122"/>
+              </a:rPr>
+              <a:t>Nicola De Cao, T. K. (2018). </a:t>
+            </a:r>
+            <a:r>
+              <a:rPr lang="en-US" sz="1800" dirty="0">
+                <a:effectLst/>
+                <a:latin typeface="Times New Roman" panose="02020603050405020304" pitchFamily="18" charset="0"/>
+                <a:ea typeface="SimSun" panose="02010600030101010101" pitchFamily="2" charset="-122"/>
+              </a:rPr>
+              <a:t>MolGAN: An Implicit Generative Model for Small Molecular Graphs. Stockholm, Sweden.</a:t>
+            </a:r>
+          </a:p>
+          <a:p>
+            <a:r>
+              <a:rPr lang="es-ES" sz="1800" dirty="0">
+                <a:effectLst/>
+                <a:latin typeface="Times New Roman" panose="02020603050405020304" pitchFamily="18" charset="0"/>
+                <a:ea typeface="SimSun" panose="02010600030101010101" pitchFamily="2" charset="-122"/>
+              </a:rPr>
+              <a:t>Vasquez J, V. (22 de August de 2024). </a:t>
+            </a:r>
+            <a:r>
+              <a:rPr lang="es-ES" sz="1800" i="1" dirty="0">
+                <a:effectLst/>
+                <a:latin typeface="Times New Roman" panose="02020603050405020304" pitchFamily="18" charset="0"/>
+                <a:ea typeface="SimSun" panose="02010600030101010101" pitchFamily="2" charset="-122"/>
+              </a:rPr>
+              <a:t>SMGAN</a:t>
+            </a:r>
+            <a:r>
+              <a:rPr lang="es-ES" sz="1800" dirty="0">
+                <a:effectLst/>
+                <a:latin typeface="Times New Roman" panose="02020603050405020304" pitchFamily="18" charset="0"/>
+                <a:ea typeface="SimSun" panose="02010600030101010101" pitchFamily="2" charset="-122"/>
+              </a:rPr>
+              <a:t>. Obtenido de </a:t>
+            </a:r>
+            <a:r>
+              <a:rPr lang="es-ES" sz="1800" dirty="0" err="1">
+                <a:effectLst/>
+                <a:latin typeface="Times New Roman" panose="02020603050405020304" pitchFamily="18" charset="0"/>
+                <a:ea typeface="SimSun" panose="02010600030101010101" pitchFamily="2" charset="-122"/>
+              </a:rPr>
+              <a:t>github</a:t>
+            </a:r>
+            <a:r>
+              <a:rPr lang="es-ES" sz="1800" dirty="0">
+                <a:effectLst/>
+                <a:latin typeface="Times New Roman" panose="02020603050405020304" pitchFamily="18" charset="0"/>
+                <a:ea typeface="SimSun" panose="02010600030101010101" pitchFamily="2" charset="-122"/>
+              </a:rPr>
+              <a:t>: https://github.com/vanthony715/SMGAN</a:t>
+            </a:r>
+            <a:endParaRPr lang="en-US" sz="1800" dirty="0">
+              <a:effectLst/>
+              <a:latin typeface="Times New Roman" panose="02020603050405020304" pitchFamily="18" charset="0"/>
+              <a:ea typeface="SimSun" panose="02010600030101010101" pitchFamily="2" charset="-122"/>
+            </a:endParaRPr>
+          </a:p>
+          <a:p>
+            <a:endParaRPr lang="en-US" sz="1800" dirty="0">
+              <a:effectLst/>
+              <a:latin typeface="Times New Roman" panose="02020603050405020304" pitchFamily="18" charset="0"/>
+              <a:ea typeface="SimSun" panose="02010600030101010101" pitchFamily="2" charset="-122"/>
+            </a:endParaRPr>
+          </a:p>
+          <a:p>
+            <a:endParaRPr lang="es-ES" sz="1800" dirty="0">
+              <a:latin typeface="Times New Roman" panose="02020603050405020304" pitchFamily="18" charset="0"/>
+              <a:ea typeface="SimSun" panose="02010600030101010101" pitchFamily="2" charset="-122"/>
+            </a:endParaRPr>
+          </a:p>
+          <a:p>
+            <a:endParaRPr lang="en-US" sz="1800" dirty="0">
+              <a:effectLst/>
+              <a:latin typeface="Times New Roman" panose="02020603050405020304" pitchFamily="18" charset="0"/>
+              <a:ea typeface="SimSun" panose="02010600030101010101" pitchFamily="2" charset="-122"/>
+            </a:endParaRPr>
+          </a:p>
+          <a:p>
+            <a:endParaRPr lang="en-US" sz="1800" dirty="0">
+              <a:effectLst/>
+              <a:latin typeface="Times New Roman" panose="02020603050405020304" pitchFamily="18" charset="0"/>
+              <a:ea typeface="SimSun" panose="02010600030101010101" pitchFamily="2" charset="-122"/>
+            </a:endParaRPr>
+          </a:p>
+          <a:p>
+            <a:endParaRPr lang="en-US" sz="1800" dirty="0">
+              <a:effectLst/>
+              <a:latin typeface="Times New Roman" panose="02020603050405020304" pitchFamily="18" charset="0"/>
+              <a:ea typeface="SimSun" panose="02010600030101010101" pitchFamily="2" charset="-122"/>
+            </a:endParaRPr>
+          </a:p>
+          <a:p>
+            <a:endParaRPr lang="en-US" dirty="0"/>
+          </a:p>
+        </p:txBody>
+      </p:sp>
+    </p:spTree>
+    <p:extLst>
+      <p:ext uri="{BB962C8B-B14F-4D97-AF65-F5344CB8AC3E}">
+        <p14:creationId xmlns:p14="http://schemas.microsoft.com/office/powerpoint/2010/main" val="847440139"/>
+      </p:ext>
+    </p:extLst>
+  </p:cSld>
+  <p:clrMapOvr>
+    <a:masterClrMapping/>
+  </p:clrMapOvr>
+</p:sld>
+</file>
+
+<file path=ppt/slides/slide21.xml><?xml version="1.0" encoding="utf-8"?>
+<p:sld xmlns:a="http://schemas.openxmlformats.org/drawingml/2006/main" xmlns:r="http://schemas.openxmlformats.org/officeDocument/2006/relationships" xmlns:p="http://schemas.openxmlformats.org/presentationml/2006/main">
+  <p:cSld>
+    <p:spTree>
+      <p:nvGrpSpPr>
+        <p:cNvPr id="1" name=""/>
+        <p:cNvGrpSpPr/>
+        <p:nvPr/>
+      </p:nvGrpSpPr>
+      <p:grpSpPr>
+        <a:xfrm>
+          <a:off x="0" y="0"/>
+          <a:ext cx="0" cy="0"/>
+          <a:chOff x="0" y="0"/>
+          <a:chExt cx="0" cy="0"/>
+        </a:xfrm>
+      </p:grpSpPr>
+      <p:sp>
+        <p:nvSpPr>
+          <p:cNvPr id="2" name="Title 1">
+            <a:extLst>
+              <a:ext uri="{FF2B5EF4-FFF2-40B4-BE49-F238E27FC236}">
                 <a16:creationId xmlns:a16="http://schemas.microsoft.com/office/drawing/2014/main" id="{71DE96C2-3A10-40D3-8D05-5D67D9E840C5}"/>
               </a:ext>
             </a:extLst>
@@ -13100,7 +15132,7 @@
         </p:blipFill>
         <p:spPr>
           <a:xfrm>
-            <a:off x="4288380" y="1845734"/>
+            <a:off x="4625262" y="1805629"/>
             <a:ext cx="1964907" cy="302183"/>
           </a:xfrm>
           <a:prstGeom prst="rect">
@@ -13130,7 +15162,7 @@
         </p:blipFill>
         <p:spPr>
           <a:xfrm>
-            <a:off x="7087728" y="2390274"/>
+            <a:off x="4593180" y="2406316"/>
             <a:ext cx="1964907" cy="447153"/>
           </a:xfrm>
           <a:prstGeom prst="rect">
@@ -13190,7 +15222,7 @@
         </p:blipFill>
         <p:spPr>
           <a:xfrm>
-            <a:off x="2943727" y="4244244"/>
+            <a:off x="2927685" y="4220181"/>
             <a:ext cx="911139" cy="787210"/>
           </a:xfrm>
           <a:prstGeom prst="rect">

</xml_diff>